<commit_message>
Inclusão da tela de versão do sistema
</commit_message>
<xml_diff>
--- a/apresentacao/Slides_Apresentacao_TCC.pptx
+++ b/apresentacao/Slides_Apresentacao_TCC.pptx
@@ -7,6 +7,10 @@
   <p:sldIdLst>
     <p:sldId id="256" r:id="rId2"/>
     <p:sldId id="257" r:id="rId3"/>
+    <p:sldId id="259" r:id="rId4"/>
+    <p:sldId id="260" r:id="rId5"/>
+    <p:sldId id="261" r:id="rId6"/>
+    <p:sldId id="258" r:id="rId7"/>
   </p:sldIdLst>
   <p:sldSz cx="9144000" cy="6858000" type="screen4x3"/>
   <p:notesSz cx="6858000" cy="9144000"/>
@@ -289,7 +293,7 @@
           <a:p>
             <a:fld id="{CDE33518-2864-4E68-A1F0-D9842031A43F}" type="datetimeFigureOut">
               <a:rPr lang="pt-BR" smtClean="0"/>
-              <a:t>22/08/2020</a:t>
+              <a:t>23/08/2020</a:t>
             </a:fld>
             <a:endParaRPr lang="pt-BR"/>
           </a:p>
@@ -459,7 +463,7 @@
           <a:p>
             <a:fld id="{CDE33518-2864-4E68-A1F0-D9842031A43F}" type="datetimeFigureOut">
               <a:rPr lang="pt-BR" smtClean="0"/>
-              <a:t>22/08/2020</a:t>
+              <a:t>23/08/2020</a:t>
             </a:fld>
             <a:endParaRPr lang="pt-BR"/>
           </a:p>
@@ -639,7 +643,7 @@
           <a:p>
             <a:fld id="{CDE33518-2864-4E68-A1F0-D9842031A43F}" type="datetimeFigureOut">
               <a:rPr lang="pt-BR" smtClean="0"/>
-              <a:t>22/08/2020</a:t>
+              <a:t>23/08/2020</a:t>
             </a:fld>
             <a:endParaRPr lang="pt-BR"/>
           </a:p>
@@ -809,7 +813,7 @@
           <a:p>
             <a:fld id="{CDE33518-2864-4E68-A1F0-D9842031A43F}" type="datetimeFigureOut">
               <a:rPr lang="pt-BR" smtClean="0"/>
-              <a:t>22/08/2020</a:t>
+              <a:t>23/08/2020</a:t>
             </a:fld>
             <a:endParaRPr lang="pt-BR"/>
           </a:p>
@@ -1055,7 +1059,7 @@
           <a:p>
             <a:fld id="{CDE33518-2864-4E68-A1F0-D9842031A43F}" type="datetimeFigureOut">
               <a:rPr lang="pt-BR" smtClean="0"/>
-              <a:t>22/08/2020</a:t>
+              <a:t>23/08/2020</a:t>
             </a:fld>
             <a:endParaRPr lang="pt-BR"/>
           </a:p>
@@ -1343,7 +1347,7 @@
           <a:p>
             <a:fld id="{CDE33518-2864-4E68-A1F0-D9842031A43F}" type="datetimeFigureOut">
               <a:rPr lang="pt-BR" smtClean="0"/>
-              <a:t>22/08/2020</a:t>
+              <a:t>23/08/2020</a:t>
             </a:fld>
             <a:endParaRPr lang="pt-BR"/>
           </a:p>
@@ -1765,7 +1769,7 @@
           <a:p>
             <a:fld id="{CDE33518-2864-4E68-A1F0-D9842031A43F}" type="datetimeFigureOut">
               <a:rPr lang="pt-BR" smtClean="0"/>
-              <a:t>22/08/2020</a:t>
+              <a:t>23/08/2020</a:t>
             </a:fld>
             <a:endParaRPr lang="pt-BR"/>
           </a:p>
@@ -1883,7 +1887,7 @@
           <a:p>
             <a:fld id="{CDE33518-2864-4E68-A1F0-D9842031A43F}" type="datetimeFigureOut">
               <a:rPr lang="pt-BR" smtClean="0"/>
-              <a:t>22/08/2020</a:t>
+              <a:t>23/08/2020</a:t>
             </a:fld>
             <a:endParaRPr lang="pt-BR"/>
           </a:p>
@@ -1978,7 +1982,7 @@
           <a:p>
             <a:fld id="{CDE33518-2864-4E68-A1F0-D9842031A43F}" type="datetimeFigureOut">
               <a:rPr lang="pt-BR" smtClean="0"/>
-              <a:t>22/08/2020</a:t>
+              <a:t>23/08/2020</a:t>
             </a:fld>
             <a:endParaRPr lang="pt-BR"/>
           </a:p>
@@ -2255,7 +2259,7 @@
           <a:p>
             <a:fld id="{CDE33518-2864-4E68-A1F0-D9842031A43F}" type="datetimeFigureOut">
               <a:rPr lang="pt-BR" smtClean="0"/>
-              <a:t>22/08/2020</a:t>
+              <a:t>23/08/2020</a:t>
             </a:fld>
             <a:endParaRPr lang="pt-BR"/>
           </a:p>
@@ -2508,7 +2512,7 @@
           <a:p>
             <a:fld id="{CDE33518-2864-4E68-A1F0-D9842031A43F}" type="datetimeFigureOut">
               <a:rPr lang="pt-BR" smtClean="0"/>
-              <a:t>22/08/2020</a:t>
+              <a:t>23/08/2020</a:t>
             </a:fld>
             <a:endParaRPr lang="pt-BR"/>
           </a:p>
@@ -2724,7 +2728,7 @@
           <a:p>
             <a:fld id="{CDE33518-2864-4E68-A1F0-D9842031A43F}" type="datetimeFigureOut">
               <a:rPr lang="pt-BR" smtClean="0"/>
-              <a:t>22/08/2020</a:t>
+              <a:t>23/08/2020</a:t>
             </a:fld>
             <a:endParaRPr lang="pt-BR"/>
           </a:p>
@@ -3229,7 +3233,12 @@
             <p:ph type="title"/>
           </p:nvPr>
         </p:nvSpPr>
-        <p:spPr/>
+        <p:spPr>
+          <a:xfrm>
+            <a:off x="533400" y="1371918"/>
+            <a:ext cx="8229600" cy="1143000"/>
+          </a:xfrm>
+        </p:spPr>
         <p:txBody>
           <a:bodyPr>
             <a:normAutofit/>
@@ -3239,7 +3248,7 @@
             <a:pPr algn="l"/>
             <a:r>
               <a:rPr lang="pt-BR" sz="2000" b="1" dirty="0" smtClean="0"/>
-              <a:t>Objetivo do projeto</a:t>
+              <a:t>Requisitos Não-Funcionais</a:t>
             </a:r>
             <a:endParaRPr lang="pt-BR" sz="2000" b="1" dirty="0"/>
           </a:p>
@@ -3257,22 +3266,68 @@
         </p:nvSpPr>
         <p:spPr>
           <a:xfrm>
-            <a:off x="467544" y="2852936"/>
+            <a:off x="467544" y="2348880"/>
             <a:ext cx="8229600" cy="2016224"/>
           </a:xfrm>
         </p:spPr>
         <p:txBody>
           <a:bodyPr>
-            <a:normAutofit/>
+            <a:normAutofit fontScale="92500" lnSpcReduction="10000"/>
           </a:bodyPr>
           <a:lstStyle/>
           <a:p>
-            <a:pPr marL="0" indent="0" algn="just">
-              <a:buNone/>
-            </a:pPr>
+            <a:pPr algn="just"/>
             <a:r>
               <a:rPr lang="pt-BR" sz="2000" dirty="0" smtClean="0"/>
-              <a:t>Apresentar uma proposta de arquitetura para o desenvolvimento de um sistema de gestão ambiental com o objetivo de fornecer um controle das informações das diversas etapas de obtenção da licença ambiental do empreendimento.</a:t>
+              <a:t>O sistema deverá possuir um </a:t>
+            </a:r>
+            <a:r>
+              <a:rPr lang="pt-BR" sz="2000" i="1" dirty="0" smtClean="0"/>
+              <a:t>framework </a:t>
+            </a:r>
+            <a:r>
+              <a:rPr lang="pt-BR" sz="2000" dirty="0" smtClean="0"/>
+              <a:t>objeto-relacional</a:t>
+            </a:r>
+          </a:p>
+          <a:p>
+            <a:pPr algn="just"/>
+            <a:r>
+              <a:rPr lang="pt-BR" sz="2000" dirty="0" smtClean="0"/>
+              <a:t>Manutenabilidade – O sistema deverá ser fácil de se adaptar e de manutenção</a:t>
+            </a:r>
+          </a:p>
+          <a:p>
+            <a:pPr algn="just"/>
+            <a:r>
+              <a:rPr lang="pt-BR" sz="2000" dirty="0" smtClean="0"/>
+              <a:t>Segurança – O sistema deverá adotar uma implementação de </a:t>
+            </a:r>
+            <a:r>
+              <a:rPr lang="pt-BR" sz="2000" i="1" dirty="0" smtClean="0"/>
+              <a:t>Oauth2</a:t>
+            </a:r>
+            <a:endParaRPr lang="pt-BR" sz="2000" dirty="0" smtClean="0"/>
+          </a:p>
+          <a:p>
+            <a:pPr algn="just"/>
+            <a:r>
+              <a:rPr lang="pt-BR" sz="2000" dirty="0" smtClean="0"/>
+              <a:t>Desempenho – O sistema não deverá apresentar travamento ou lentidão</a:t>
+            </a:r>
+          </a:p>
+          <a:p>
+            <a:pPr algn="just"/>
+            <a:r>
+              <a:rPr lang="pt-BR" sz="2000" dirty="0" smtClean="0"/>
+              <a:t>Acessibilidade(Portabilidade)</a:t>
+            </a:r>
+          </a:p>
+          <a:p>
+            <a:pPr algn="just"/>
+            <a:r>
+              <a:rPr lang="pt-BR" sz="2000" dirty="0" smtClean="0"/>
+              <a:t>Interoperabilidade – O sistema deverá permitir a comunicação com terceiros</a:t>
             </a:r>
             <a:endParaRPr lang="pt-BR" sz="2000" dirty="0"/>
           </a:p>
@@ -3312,6 +3367,454 @@
     <p:extLst>
       <p:ext uri="{BB962C8B-B14F-4D97-AF65-F5344CB8AC3E}">
         <p14:creationId xmlns:p14="http://schemas.microsoft.com/office/powerpoint/2010/main" val="2807216151"/>
+      </p:ext>
+    </p:extLst>
+  </p:cSld>
+  <p:clrMapOvr>
+    <a:masterClrMapping/>
+  </p:clrMapOvr>
+</p:sld>
+</file>
+
+<file path=ppt/slides/slide3.xml><?xml version="1.0" encoding="utf-8"?>
+<p:sld xmlns:a="http://schemas.openxmlformats.org/drawingml/2006/main" xmlns:r="http://schemas.openxmlformats.org/officeDocument/2006/relationships" xmlns:p="http://schemas.openxmlformats.org/presentationml/2006/main">
+  <p:cSld>
+    <p:spTree>
+      <p:nvGrpSpPr>
+        <p:cNvPr id="1" name=""/>
+        <p:cNvGrpSpPr/>
+        <p:nvPr/>
+      </p:nvGrpSpPr>
+      <p:grpSpPr>
+        <a:xfrm>
+          <a:off x="0" y="0"/>
+          <a:ext cx="0" cy="0"/>
+          <a:chOff x="0" y="0"/>
+          <a:chExt cx="0" cy="0"/>
+        </a:xfrm>
+      </p:grpSpPr>
+      <p:sp>
+        <p:nvSpPr>
+          <p:cNvPr id="4" name="Título 1"/>
+          <p:cNvSpPr txBox="1">
+            <a:spLocks/>
+          </p:cNvSpPr>
+          <p:nvPr/>
+        </p:nvSpPr>
+        <p:spPr>
+          <a:xfrm>
+            <a:off x="575556" y="476672"/>
+            <a:ext cx="8229600" cy="1143000"/>
+          </a:xfrm>
+          <a:prstGeom prst="rect">
+            <a:avLst/>
+          </a:prstGeom>
+        </p:spPr>
+        <p:txBody>
+          <a:bodyPr vert="horz" lIns="91440" tIns="45720" rIns="91440" bIns="45720" rtlCol="0" anchor="ctr">
+            <a:normAutofit/>
+          </a:bodyPr>
+          <a:lstStyle>
+            <a:lvl1pPr algn="ctr" defTabSz="914400" rtl="0" eaLnBrk="1" latinLnBrk="0" hangingPunct="1">
+              <a:spcBef>
+                <a:spcPct val="0"/>
+              </a:spcBef>
+              <a:buNone/>
+              <a:defRPr sz="4400" kern="1200">
+                <a:solidFill>
+                  <a:schemeClr val="tx1"/>
+                </a:solidFill>
+                <a:latin typeface="+mj-lt"/>
+                <a:ea typeface="+mj-ea"/>
+                <a:cs typeface="+mj-cs"/>
+              </a:defRPr>
+            </a:lvl1pPr>
+          </a:lstStyle>
+          <a:p>
+            <a:pPr algn="l"/>
+            <a:r>
+              <a:rPr lang="pt-BR" sz="2000" b="1" dirty="0" smtClean="0"/>
+              <a:t>Autenticação e Autorização</a:t>
+            </a:r>
+            <a:endParaRPr lang="pt-BR" sz="2000" b="1" dirty="0"/>
+          </a:p>
+        </p:txBody>
+      </p:sp>
+      <p:pic>
+        <p:nvPicPr>
+          <p:cNvPr id="5" name="Imagem 4"/>
+          <p:cNvPicPr/>
+          <p:nvPr/>
+        </p:nvPicPr>
+        <p:blipFill>
+          <a:blip r:embed="rId2">
+            <a:extLst>
+              <a:ext uri="{28A0092B-C50C-407E-A947-70E740481C1C}">
+                <a14:useLocalDpi xmlns:a14="http://schemas.microsoft.com/office/drawing/2010/main" val="0"/>
+              </a:ext>
+            </a:extLst>
+          </a:blip>
+          <a:srcRect/>
+          <a:stretch>
+            <a:fillRect/>
+          </a:stretch>
+        </p:blipFill>
+        <p:spPr bwMode="auto">
+          <a:xfrm>
+            <a:off x="683568" y="1412776"/>
+            <a:ext cx="8013576" cy="4824536"/>
+          </a:xfrm>
+          <a:prstGeom prst="rect">
+            <a:avLst/>
+          </a:prstGeom>
+          <a:noFill/>
+          <a:ln>
+            <a:noFill/>
+          </a:ln>
+        </p:spPr>
+      </p:pic>
+    </p:spTree>
+    <p:extLst>
+      <p:ext uri="{BB962C8B-B14F-4D97-AF65-F5344CB8AC3E}">
+        <p14:creationId xmlns:p14="http://schemas.microsoft.com/office/powerpoint/2010/main" val="40154108"/>
+      </p:ext>
+    </p:extLst>
+  </p:cSld>
+  <p:clrMapOvr>
+    <a:masterClrMapping/>
+  </p:clrMapOvr>
+</p:sld>
+</file>
+
+<file path=ppt/slides/slide4.xml><?xml version="1.0" encoding="utf-8"?>
+<p:sld xmlns:a="http://schemas.openxmlformats.org/drawingml/2006/main" xmlns:r="http://schemas.openxmlformats.org/officeDocument/2006/relationships" xmlns:p="http://schemas.openxmlformats.org/presentationml/2006/main">
+  <p:cSld>
+    <p:spTree>
+      <p:nvGrpSpPr>
+        <p:cNvPr id="1" name=""/>
+        <p:cNvGrpSpPr/>
+        <p:nvPr/>
+      </p:nvGrpSpPr>
+      <p:grpSpPr>
+        <a:xfrm>
+          <a:off x="0" y="0"/>
+          <a:ext cx="0" cy="0"/>
+          <a:chOff x="0" y="0"/>
+          <a:chExt cx="0" cy="0"/>
+        </a:xfrm>
+      </p:grpSpPr>
+      <p:sp>
+        <p:nvSpPr>
+          <p:cNvPr id="4" name="Título 1"/>
+          <p:cNvSpPr txBox="1">
+            <a:spLocks/>
+          </p:cNvSpPr>
+          <p:nvPr/>
+        </p:nvSpPr>
+        <p:spPr>
+          <a:xfrm>
+            <a:off x="467544" y="476672"/>
+            <a:ext cx="8229600" cy="1143000"/>
+          </a:xfrm>
+          <a:prstGeom prst="rect">
+            <a:avLst/>
+          </a:prstGeom>
+        </p:spPr>
+        <p:txBody>
+          <a:bodyPr vert="horz" lIns="91440" tIns="45720" rIns="91440" bIns="45720" rtlCol="0" anchor="ctr">
+            <a:normAutofit/>
+          </a:bodyPr>
+          <a:lstStyle>
+            <a:lvl1pPr algn="ctr" defTabSz="914400" rtl="0" eaLnBrk="1" latinLnBrk="0" hangingPunct="1">
+              <a:spcBef>
+                <a:spcPct val="0"/>
+              </a:spcBef>
+              <a:buNone/>
+              <a:defRPr sz="4400" kern="1200">
+                <a:solidFill>
+                  <a:schemeClr val="tx1"/>
+                </a:solidFill>
+                <a:latin typeface="+mj-lt"/>
+                <a:ea typeface="+mj-ea"/>
+                <a:cs typeface="+mj-cs"/>
+              </a:defRPr>
+            </a:lvl1pPr>
+          </a:lstStyle>
+          <a:p>
+            <a:pPr algn="l"/>
+            <a:r>
+              <a:rPr lang="pt-BR" sz="2000" b="1" dirty="0" smtClean="0"/>
+              <a:t>Modelo de Componentes</a:t>
+            </a:r>
+            <a:endParaRPr lang="pt-BR" sz="2000" b="1" dirty="0"/>
+          </a:p>
+        </p:txBody>
+      </p:sp>
+      <p:pic>
+        <p:nvPicPr>
+          <p:cNvPr id="8" name="Imagem 7"/>
+          <p:cNvPicPr/>
+          <p:nvPr/>
+        </p:nvPicPr>
+        <p:blipFill>
+          <a:blip r:embed="rId2"/>
+          <a:stretch>
+            <a:fillRect/>
+          </a:stretch>
+        </p:blipFill>
+        <p:spPr bwMode="auto">
+          <a:xfrm>
+            <a:off x="611560" y="1340768"/>
+            <a:ext cx="8085584" cy="4968552"/>
+          </a:xfrm>
+          <a:prstGeom prst="rect">
+            <a:avLst/>
+          </a:prstGeom>
+        </p:spPr>
+      </p:pic>
+    </p:spTree>
+    <p:extLst>
+      <p:ext uri="{BB962C8B-B14F-4D97-AF65-F5344CB8AC3E}">
+        <p14:creationId xmlns:p14="http://schemas.microsoft.com/office/powerpoint/2010/main" val="2795295655"/>
+      </p:ext>
+    </p:extLst>
+  </p:cSld>
+  <p:clrMapOvr>
+    <a:masterClrMapping/>
+  </p:clrMapOvr>
+</p:sld>
+</file>
+
+<file path=ppt/slides/slide5.xml><?xml version="1.0" encoding="utf-8"?>
+<p:sld xmlns:a="http://schemas.openxmlformats.org/drawingml/2006/main" xmlns:r="http://schemas.openxmlformats.org/officeDocument/2006/relationships" xmlns:p="http://schemas.openxmlformats.org/presentationml/2006/main">
+  <p:cSld>
+    <p:spTree>
+      <p:nvGrpSpPr>
+        <p:cNvPr id="1" name=""/>
+        <p:cNvGrpSpPr/>
+        <p:nvPr/>
+      </p:nvGrpSpPr>
+      <p:grpSpPr>
+        <a:xfrm>
+          <a:off x="0" y="0"/>
+          <a:ext cx="0" cy="0"/>
+          <a:chOff x="0" y="0"/>
+          <a:chExt cx="0" cy="0"/>
+        </a:xfrm>
+      </p:grpSpPr>
+      <p:pic>
+        <p:nvPicPr>
+          <p:cNvPr id="4" name="Imagem 3" descr="Tela de celular com texto preto sobre fundo branco&#10;&#10;Descrição gerada automaticamente"/>
+          <p:cNvPicPr/>
+          <p:nvPr/>
+        </p:nvPicPr>
+        <p:blipFill>
+          <a:blip r:embed="rId2"/>
+          <a:stretch>
+            <a:fillRect/>
+          </a:stretch>
+        </p:blipFill>
+        <p:spPr bwMode="auto">
+          <a:xfrm>
+            <a:off x="683568" y="1412776"/>
+            <a:ext cx="7776864" cy="4698876"/>
+          </a:xfrm>
+          <a:prstGeom prst="rect">
+            <a:avLst/>
+          </a:prstGeom>
+        </p:spPr>
+      </p:pic>
+      <p:sp>
+        <p:nvSpPr>
+          <p:cNvPr id="5" name="Título 1"/>
+          <p:cNvSpPr txBox="1">
+            <a:spLocks/>
+          </p:cNvSpPr>
+          <p:nvPr/>
+        </p:nvSpPr>
+        <p:spPr>
+          <a:xfrm>
+            <a:off x="575556" y="476672"/>
+            <a:ext cx="8229600" cy="1143000"/>
+          </a:xfrm>
+          <a:prstGeom prst="rect">
+            <a:avLst/>
+          </a:prstGeom>
+        </p:spPr>
+        <p:txBody>
+          <a:bodyPr vert="horz" lIns="91440" tIns="45720" rIns="91440" bIns="45720" rtlCol="0" anchor="ctr">
+            <a:normAutofit/>
+          </a:bodyPr>
+          <a:lstStyle>
+            <a:lvl1pPr algn="ctr" defTabSz="914400" rtl="0" eaLnBrk="1" latinLnBrk="0" hangingPunct="1">
+              <a:spcBef>
+                <a:spcPct val="0"/>
+              </a:spcBef>
+              <a:buNone/>
+              <a:defRPr sz="4400" kern="1200">
+                <a:solidFill>
+                  <a:schemeClr val="tx1"/>
+                </a:solidFill>
+                <a:latin typeface="+mj-lt"/>
+                <a:ea typeface="+mj-ea"/>
+                <a:cs typeface="+mj-cs"/>
+              </a:defRPr>
+            </a:lvl1pPr>
+          </a:lstStyle>
+          <a:p>
+            <a:pPr algn="l"/>
+            <a:r>
+              <a:rPr lang="pt-BR" sz="2000" b="1" dirty="0" smtClean="0"/>
+              <a:t>Modelo de implantação</a:t>
+            </a:r>
+            <a:endParaRPr lang="pt-BR" sz="2000" b="1" dirty="0"/>
+          </a:p>
+        </p:txBody>
+      </p:sp>
+    </p:spTree>
+    <p:extLst>
+      <p:ext uri="{BB962C8B-B14F-4D97-AF65-F5344CB8AC3E}">
+        <p14:creationId xmlns:p14="http://schemas.microsoft.com/office/powerpoint/2010/main" val="4127529639"/>
+      </p:ext>
+    </p:extLst>
+  </p:cSld>
+  <p:clrMapOvr>
+    <a:masterClrMapping/>
+  </p:clrMapOvr>
+</p:sld>
+</file>
+
+<file path=ppt/slides/slide6.xml><?xml version="1.0" encoding="utf-8"?>
+<p:sld xmlns:a="http://schemas.openxmlformats.org/drawingml/2006/main" xmlns:r="http://schemas.openxmlformats.org/officeDocument/2006/relationships" xmlns:p="http://schemas.openxmlformats.org/presentationml/2006/main">
+  <p:cSld>
+    <p:spTree>
+      <p:nvGrpSpPr>
+        <p:cNvPr id="1" name=""/>
+        <p:cNvGrpSpPr/>
+        <p:nvPr/>
+      </p:nvGrpSpPr>
+      <p:grpSpPr>
+        <a:xfrm>
+          <a:off x="0" y="0"/>
+          <a:ext cx="0" cy="0"/>
+          <a:chOff x="0" y="0"/>
+          <a:chExt cx="0" cy="0"/>
+        </a:xfrm>
+      </p:grpSpPr>
+      <p:pic>
+        <p:nvPicPr>
+          <p:cNvPr id="4" name="Imagem 3"/>
+          <p:cNvPicPr>
+            <a:picLocks noChangeAspect="1"/>
+          </p:cNvPicPr>
+          <p:nvPr/>
+        </p:nvPicPr>
+        <p:blipFill>
+          <a:blip r:embed="rId2" cstate="print">
+            <a:extLst>
+              <a:ext uri="{28A0092B-C50C-407E-A947-70E740481C1C}">
+                <a14:useLocalDpi xmlns:a14="http://schemas.microsoft.com/office/drawing/2010/main" val="0"/>
+              </a:ext>
+            </a:extLst>
+          </a:blip>
+          <a:stretch>
+            <a:fillRect/>
+          </a:stretch>
+        </p:blipFill>
+        <p:spPr>
+          <a:xfrm>
+            <a:off x="107504" y="5510965"/>
+            <a:ext cx="1197825" cy="1216838"/>
+          </a:xfrm>
+          <a:prstGeom prst="rect">
+            <a:avLst/>
+          </a:prstGeom>
+        </p:spPr>
+      </p:pic>
+      <p:sp>
+        <p:nvSpPr>
+          <p:cNvPr id="5" name="Título 1"/>
+          <p:cNvSpPr txBox="1">
+            <a:spLocks/>
+          </p:cNvSpPr>
+          <p:nvPr/>
+        </p:nvSpPr>
+        <p:spPr>
+          <a:xfrm>
+            <a:off x="533400" y="1371918"/>
+            <a:ext cx="8229600" cy="1143000"/>
+          </a:xfrm>
+          <a:prstGeom prst="rect">
+            <a:avLst/>
+          </a:prstGeom>
+        </p:spPr>
+        <p:txBody>
+          <a:bodyPr vert="horz" lIns="91440" tIns="45720" rIns="91440" bIns="45720" rtlCol="0" anchor="ctr">
+            <a:normAutofit/>
+          </a:bodyPr>
+          <a:lstStyle>
+            <a:lvl1pPr algn="ctr" defTabSz="914400" rtl="0" eaLnBrk="1" latinLnBrk="0" hangingPunct="1">
+              <a:spcBef>
+                <a:spcPct val="0"/>
+              </a:spcBef>
+              <a:buNone/>
+              <a:defRPr sz="4400" kern="1200">
+                <a:solidFill>
+                  <a:schemeClr val="tx1"/>
+                </a:solidFill>
+                <a:latin typeface="+mj-lt"/>
+                <a:ea typeface="+mj-ea"/>
+                <a:cs typeface="+mj-cs"/>
+              </a:defRPr>
+            </a:lvl1pPr>
+          </a:lstStyle>
+          <a:p>
+            <a:pPr algn="l"/>
+            <a:r>
+              <a:rPr lang="pt-BR" sz="2000" b="1" dirty="0" smtClean="0"/>
+              <a:t>Requisitos não-funcionais</a:t>
+            </a:r>
+            <a:endParaRPr lang="pt-BR" sz="2000" b="1" dirty="0"/>
+          </a:p>
+        </p:txBody>
+      </p:sp>
+      <p:sp>
+        <p:nvSpPr>
+          <p:cNvPr id="6" name="Espaço Reservado para Conteúdo 2"/>
+          <p:cNvSpPr>
+            <a:spLocks noGrp="1"/>
+          </p:cNvSpPr>
+          <p:nvPr>
+            <p:ph idx="1"/>
+          </p:nvPr>
+        </p:nvSpPr>
+        <p:spPr>
+          <a:xfrm>
+            <a:off x="467544" y="2852936"/>
+            <a:ext cx="8229600" cy="2016224"/>
+          </a:xfrm>
+        </p:spPr>
+        <p:txBody>
+          <a:bodyPr>
+            <a:normAutofit/>
+          </a:bodyPr>
+          <a:lstStyle/>
+          <a:p>
+            <a:pPr marL="0" indent="0" algn="just">
+              <a:buNone/>
+            </a:pPr>
+            <a:r>
+              <a:rPr lang="pt-BR" sz="2000" dirty="0" smtClean="0"/>
+              <a:t>Apresentar uma proposta de arquitetura para o desenvolvimento de um sistema de gestão ambiental com o objetivo de fornecer um controle das informações das diversas etapas de obtenção da licença ambiental do empreendimento.</a:t>
+            </a:r>
+            <a:endParaRPr lang="pt-BR" sz="2000" dirty="0"/>
+          </a:p>
+        </p:txBody>
+      </p:sp>
+    </p:spTree>
+    <p:extLst>
+      <p:ext uri="{BB962C8B-B14F-4D97-AF65-F5344CB8AC3E}">
+        <p14:creationId xmlns:p14="http://schemas.microsoft.com/office/powerpoint/2010/main" val="1331493573"/>
       </p:ext>
     </p:extLst>
   </p:cSld>

</xml_diff>

<commit_message>
Ajustes para apresentação - dia 28/08/2020
</commit_message>
<xml_diff>
--- a/apresentacao/Slides_Apresentacao_TCC.pptx
+++ b/apresentacao/Slides_Apresentacao_TCC.pptx
@@ -10,7 +10,8 @@
     <p:sldId id="259" r:id="rId4"/>
     <p:sldId id="260" r:id="rId5"/>
     <p:sldId id="261" r:id="rId6"/>
-    <p:sldId id="258" r:id="rId7"/>
+    <p:sldId id="262" r:id="rId7"/>
+    <p:sldId id="258" r:id="rId8"/>
   </p:sldIdLst>
   <p:sldSz cx="9144000" cy="6858000" type="screen4x3"/>
   <p:notesSz cx="6858000" cy="9144000"/>
@@ -3461,8 +3462,8 @@
         </p:blipFill>
         <p:spPr bwMode="auto">
           <a:xfrm>
-            <a:off x="683568" y="1412776"/>
-            <a:ext cx="8013576" cy="4824536"/>
+            <a:off x="654090" y="1446028"/>
+            <a:ext cx="8013576" cy="4032448"/>
           </a:xfrm>
           <a:prstGeom prst="rect">
             <a:avLst/>
@@ -3471,6 +3472,36 @@
           <a:ln>
             <a:noFill/>
           </a:ln>
+        </p:spPr>
+      </p:pic>
+      <p:pic>
+        <p:nvPicPr>
+          <p:cNvPr id="6" name="Imagem 5"/>
+          <p:cNvPicPr>
+            <a:picLocks noChangeAspect="1"/>
+          </p:cNvPicPr>
+          <p:nvPr/>
+        </p:nvPicPr>
+        <p:blipFill>
+          <a:blip r:embed="rId3" cstate="print">
+            <a:extLst>
+              <a:ext uri="{28A0092B-C50C-407E-A947-70E740481C1C}">
+                <a14:useLocalDpi xmlns:a14="http://schemas.microsoft.com/office/drawing/2010/main" val="0"/>
+              </a:ext>
+            </a:extLst>
+          </a:blip>
+          <a:stretch>
+            <a:fillRect/>
+          </a:stretch>
+        </p:blipFill>
+        <p:spPr>
+          <a:xfrm>
+            <a:off x="107504" y="5510965"/>
+            <a:ext cx="1197825" cy="1216838"/>
+          </a:xfrm>
+          <a:prstGeom prst="rect">
+            <a:avLst/>
+          </a:prstGeom>
         </p:spPr>
       </p:pic>
     </p:spTree>
@@ -3564,8 +3595,38 @@
         </p:blipFill>
         <p:spPr bwMode="auto">
           <a:xfrm>
-            <a:off x="611560" y="1340768"/>
-            <a:ext cx="8085584" cy="4968552"/>
+            <a:off x="706416" y="1340767"/>
+            <a:ext cx="7990728" cy="4170197"/>
+          </a:xfrm>
+          <a:prstGeom prst="rect">
+            <a:avLst/>
+          </a:prstGeom>
+        </p:spPr>
+      </p:pic>
+      <p:pic>
+        <p:nvPicPr>
+          <p:cNvPr id="5" name="Imagem 4"/>
+          <p:cNvPicPr>
+            <a:picLocks noChangeAspect="1"/>
+          </p:cNvPicPr>
+          <p:nvPr/>
+        </p:nvPicPr>
+        <p:blipFill>
+          <a:blip r:embed="rId3" cstate="print">
+            <a:extLst>
+              <a:ext uri="{28A0092B-C50C-407E-A947-70E740481C1C}">
+                <a14:useLocalDpi xmlns:a14="http://schemas.microsoft.com/office/drawing/2010/main" val="0"/>
+              </a:ext>
+            </a:extLst>
+          </a:blip>
+          <a:stretch>
+            <a:fillRect/>
+          </a:stretch>
+        </p:blipFill>
+        <p:spPr>
+          <a:xfrm>
+            <a:off x="107504" y="5510965"/>
+            <a:ext cx="1197825" cy="1216838"/>
           </a:xfrm>
           <a:prstGeom prst="rect">
             <a:avLst/>
@@ -3617,7 +3678,7 @@
         <p:spPr bwMode="auto">
           <a:xfrm>
             <a:off x="683568" y="1412776"/>
-            <a:ext cx="7776864" cy="4698876"/>
+            <a:ext cx="7776864" cy="4098189"/>
           </a:xfrm>
           <a:prstGeom prst="rect">
             <a:avLst/>
@@ -3634,8 +3695,8 @@
         </p:nvSpPr>
         <p:spPr>
           <a:xfrm>
-            <a:off x="575556" y="476672"/>
-            <a:ext cx="8229600" cy="1143000"/>
+            <a:off x="467544" y="476672"/>
+            <a:ext cx="8337612" cy="1143000"/>
           </a:xfrm>
           <a:prstGeom prst="rect">
             <a:avLst/>
@@ -3671,6 +3732,36 @@
           </a:p>
         </p:txBody>
       </p:sp>
+      <p:pic>
+        <p:nvPicPr>
+          <p:cNvPr id="6" name="Imagem 5"/>
+          <p:cNvPicPr>
+            <a:picLocks noChangeAspect="1"/>
+          </p:cNvPicPr>
+          <p:nvPr/>
+        </p:nvPicPr>
+        <p:blipFill>
+          <a:blip r:embed="rId3" cstate="print">
+            <a:extLst>
+              <a:ext uri="{28A0092B-C50C-407E-A947-70E740481C1C}">
+                <a14:useLocalDpi xmlns:a14="http://schemas.microsoft.com/office/drawing/2010/main" val="0"/>
+              </a:ext>
+            </a:extLst>
+          </a:blip>
+          <a:stretch>
+            <a:fillRect/>
+          </a:stretch>
+        </p:blipFill>
+        <p:spPr>
+          <a:xfrm>
+            <a:off x="107504" y="5510965"/>
+            <a:ext cx="1197825" cy="1216838"/>
+          </a:xfrm>
+          <a:prstGeom prst="rect">
+            <a:avLst/>
+          </a:prstGeom>
+        </p:spPr>
+      </p:pic>
     </p:spTree>
     <p:extLst>
       <p:ext uri="{BB962C8B-B14F-4D97-AF65-F5344CB8AC3E}">
@@ -3685,6 +3776,171 @@
 </file>
 
 <file path=ppt/slides/slide6.xml><?xml version="1.0" encoding="utf-8"?>
+<p:sld xmlns:a="http://schemas.openxmlformats.org/drawingml/2006/main" xmlns:r="http://schemas.openxmlformats.org/officeDocument/2006/relationships" xmlns:p="http://schemas.openxmlformats.org/presentationml/2006/main">
+  <p:cSld>
+    <p:spTree>
+      <p:nvGrpSpPr>
+        <p:cNvPr id="1" name=""/>
+        <p:cNvGrpSpPr/>
+        <p:nvPr/>
+      </p:nvGrpSpPr>
+      <p:grpSpPr>
+        <a:xfrm>
+          <a:off x="0" y="0"/>
+          <a:ext cx="0" cy="0"/>
+          <a:chOff x="0" y="0"/>
+          <a:chExt cx="0" cy="0"/>
+        </a:xfrm>
+      </p:grpSpPr>
+      <p:pic>
+        <p:nvPicPr>
+          <p:cNvPr id="4" name="Imagem 3"/>
+          <p:cNvPicPr>
+            <a:picLocks noChangeAspect="1"/>
+          </p:cNvPicPr>
+          <p:nvPr/>
+        </p:nvPicPr>
+        <p:blipFill>
+          <a:blip r:embed="rId2" cstate="print">
+            <a:extLst>
+              <a:ext uri="{28A0092B-C50C-407E-A947-70E740481C1C}">
+                <a14:useLocalDpi xmlns:a14="http://schemas.microsoft.com/office/drawing/2010/main" val="0"/>
+              </a:ext>
+            </a:extLst>
+          </a:blip>
+          <a:stretch>
+            <a:fillRect/>
+          </a:stretch>
+        </p:blipFill>
+        <p:spPr>
+          <a:xfrm>
+            <a:off x="107504" y="5510965"/>
+            <a:ext cx="1197825" cy="1216838"/>
+          </a:xfrm>
+          <a:prstGeom prst="rect">
+            <a:avLst/>
+          </a:prstGeom>
+        </p:spPr>
+      </p:pic>
+      <p:sp>
+        <p:nvSpPr>
+          <p:cNvPr id="5" name="Título 1"/>
+          <p:cNvSpPr txBox="1">
+            <a:spLocks/>
+          </p:cNvSpPr>
+          <p:nvPr/>
+        </p:nvSpPr>
+        <p:spPr>
+          <a:xfrm>
+            <a:off x="467544" y="476672"/>
+            <a:ext cx="8337612" cy="1143000"/>
+          </a:xfrm>
+          <a:prstGeom prst="rect">
+            <a:avLst/>
+          </a:prstGeom>
+        </p:spPr>
+        <p:txBody>
+          <a:bodyPr vert="horz" lIns="91440" tIns="45720" rIns="91440" bIns="45720" rtlCol="0" anchor="ctr">
+            <a:normAutofit/>
+          </a:bodyPr>
+          <a:lstStyle>
+            <a:lvl1pPr algn="ctr" defTabSz="914400" rtl="0" eaLnBrk="1" latinLnBrk="0" hangingPunct="1">
+              <a:spcBef>
+                <a:spcPct val="0"/>
+              </a:spcBef>
+              <a:buNone/>
+              <a:defRPr sz="4400" kern="1200">
+                <a:solidFill>
+                  <a:schemeClr val="tx1"/>
+                </a:solidFill>
+                <a:latin typeface="+mj-lt"/>
+                <a:ea typeface="+mj-ea"/>
+                <a:cs typeface="+mj-cs"/>
+              </a:defRPr>
+            </a:lvl1pPr>
+          </a:lstStyle>
+          <a:p>
+            <a:pPr algn="l"/>
+            <a:r>
+              <a:rPr lang="pt-BR" sz="2000" b="1" dirty="0" smtClean="0"/>
+              <a:t>Caso de uso 01 – Autenticação </a:t>
+            </a:r>
+            <a:r>
+              <a:rPr lang="pt-BR" sz="2000" b="1" smtClean="0"/>
+              <a:t>na aplicação</a:t>
+            </a:r>
+            <a:endParaRPr lang="pt-BR" sz="2000" b="1" dirty="0"/>
+          </a:p>
+        </p:txBody>
+      </p:sp>
+      <p:pic>
+        <p:nvPicPr>
+          <p:cNvPr id="1026" name="Picture 2"/>
+          <p:cNvPicPr>
+            <a:picLocks noChangeAspect="1" noChangeArrowheads="1"/>
+          </p:cNvPicPr>
+          <p:nvPr/>
+        </p:nvPicPr>
+        <p:blipFill>
+          <a:blip r:embed="rId3">
+            <a:extLst>
+              <a:ext uri="{28A0092B-C50C-407E-A947-70E740481C1C}">
+                <a14:useLocalDpi xmlns:a14="http://schemas.microsoft.com/office/drawing/2010/main" val="0"/>
+              </a:ext>
+            </a:extLst>
+          </a:blip>
+          <a:srcRect/>
+          <a:stretch>
+            <a:fillRect/>
+          </a:stretch>
+        </p:blipFill>
+        <p:spPr bwMode="auto">
+          <a:xfrm>
+            <a:off x="504283" y="1380284"/>
+            <a:ext cx="7920880" cy="4133577"/>
+          </a:xfrm>
+          <a:prstGeom prst="rect">
+            <a:avLst/>
+          </a:prstGeom>
+          <a:noFill/>
+          <a:ln>
+            <a:noFill/>
+          </a:ln>
+          <a:extLst>
+            <a:ext uri="{909E8E84-426E-40DD-AFC4-6F175D3DCCD1}">
+              <a14:hiddenFill xmlns:a14="http://schemas.microsoft.com/office/drawing/2010/main">
+                <a:solidFill>
+                  <a:schemeClr val="accent1"/>
+                </a:solidFill>
+              </a14:hiddenFill>
+            </a:ext>
+            <a:ext uri="{91240B29-F687-4F45-9708-019B960494DF}">
+              <a14:hiddenLine xmlns:a14="http://schemas.microsoft.com/office/drawing/2010/main" w="9525">
+                <a:solidFill>
+                  <a:schemeClr val="tx1"/>
+                </a:solidFill>
+                <a:miter lim="800000"/>
+                <a:headEnd/>
+                <a:tailEnd/>
+              </a14:hiddenLine>
+            </a:ext>
+          </a:extLst>
+        </p:spPr>
+      </p:pic>
+    </p:spTree>
+    <p:extLst>
+      <p:ext uri="{BB962C8B-B14F-4D97-AF65-F5344CB8AC3E}">
+        <p14:creationId xmlns:p14="http://schemas.microsoft.com/office/powerpoint/2010/main" val="212948739"/>
+      </p:ext>
+    </p:extLst>
+  </p:cSld>
+  <p:clrMapOvr>
+    <a:masterClrMapping/>
+  </p:clrMapOvr>
+</p:sld>
+</file>
+
+<file path=ppt/slides/slide7.xml><?xml version="1.0" encoding="utf-8"?>
 <p:sld xmlns:a="http://schemas.openxmlformats.org/drawingml/2006/main" xmlns:r="http://schemas.openxmlformats.org/officeDocument/2006/relationships" xmlns:p="http://schemas.openxmlformats.org/presentationml/2006/main">
   <p:cSld>
     <p:spTree>

</xml_diff>

<commit_message>
Correção nos pacotes do node
</commit_message>
<xml_diff>
--- a/apresentacao/Slides_Apresentacao_TCC.pptx
+++ b/apresentacao/Slides_Apresentacao_TCC.pptx
@@ -7,25 +7,33 @@
   <p:sldIdLst>
     <p:sldId id="256" r:id="rId2"/>
     <p:sldId id="266" r:id="rId3"/>
-    <p:sldId id="267" r:id="rId4"/>
-    <p:sldId id="268" r:id="rId5"/>
+    <p:sldId id="268" r:id="rId4"/>
+    <p:sldId id="267" r:id="rId5"/>
     <p:sldId id="262" r:id="rId6"/>
     <p:sldId id="277" r:id="rId7"/>
     <p:sldId id="271" r:id="rId8"/>
     <p:sldId id="269" r:id="rId9"/>
     <p:sldId id="263" r:id="rId10"/>
-    <p:sldId id="270" r:id="rId11"/>
-    <p:sldId id="272" r:id="rId12"/>
-    <p:sldId id="273" r:id="rId13"/>
-    <p:sldId id="260" r:id="rId14"/>
-    <p:sldId id="261" r:id="rId15"/>
-    <p:sldId id="276" r:id="rId16"/>
-    <p:sldId id="279" r:id="rId17"/>
-    <p:sldId id="278" r:id="rId18"/>
-    <p:sldId id="257" r:id="rId19"/>
-    <p:sldId id="280" r:id="rId20"/>
-    <p:sldId id="281" r:id="rId21"/>
-    <p:sldId id="274" r:id="rId22"/>
+    <p:sldId id="284" r:id="rId11"/>
+    <p:sldId id="270" r:id="rId12"/>
+    <p:sldId id="272" r:id="rId13"/>
+    <p:sldId id="273" r:id="rId14"/>
+    <p:sldId id="285" r:id="rId15"/>
+    <p:sldId id="282" r:id="rId16"/>
+    <p:sldId id="280" r:id="rId17"/>
+    <p:sldId id="281" r:id="rId18"/>
+    <p:sldId id="276" r:id="rId19"/>
+    <p:sldId id="279" r:id="rId20"/>
+    <p:sldId id="278" r:id="rId21"/>
+    <p:sldId id="283" r:id="rId22"/>
+    <p:sldId id="288" r:id="rId23"/>
+    <p:sldId id="289" r:id="rId24"/>
+    <p:sldId id="290" r:id="rId25"/>
+    <p:sldId id="260" r:id="rId26"/>
+    <p:sldId id="261" r:id="rId27"/>
+    <p:sldId id="286" r:id="rId28"/>
+    <p:sldId id="274" r:id="rId29"/>
+    <p:sldId id="287" r:id="rId30"/>
   </p:sldIdLst>
   <p:sldSz cx="9144000" cy="6858000" type="screen4x3"/>
   <p:notesSz cx="6858000" cy="9144000"/>
@@ -308,7 +316,7 @@
           <a:p>
             <a:fld id="{CDE33518-2864-4E68-A1F0-D9842031A43F}" type="datetimeFigureOut">
               <a:rPr lang="pt-BR" smtClean="0"/>
-              <a:t>26/08/2020</a:t>
+              <a:t>27/08/2020</a:t>
             </a:fld>
             <a:endParaRPr lang="pt-BR"/>
           </a:p>
@@ -478,7 +486,7 @@
           <a:p>
             <a:fld id="{CDE33518-2864-4E68-A1F0-D9842031A43F}" type="datetimeFigureOut">
               <a:rPr lang="pt-BR" smtClean="0"/>
-              <a:t>26/08/2020</a:t>
+              <a:t>27/08/2020</a:t>
             </a:fld>
             <a:endParaRPr lang="pt-BR"/>
           </a:p>
@@ -658,7 +666,7 @@
           <a:p>
             <a:fld id="{CDE33518-2864-4E68-A1F0-D9842031A43F}" type="datetimeFigureOut">
               <a:rPr lang="pt-BR" smtClean="0"/>
-              <a:t>26/08/2020</a:t>
+              <a:t>27/08/2020</a:t>
             </a:fld>
             <a:endParaRPr lang="pt-BR"/>
           </a:p>
@@ -828,7 +836,7 @@
           <a:p>
             <a:fld id="{CDE33518-2864-4E68-A1F0-D9842031A43F}" type="datetimeFigureOut">
               <a:rPr lang="pt-BR" smtClean="0"/>
-              <a:t>26/08/2020</a:t>
+              <a:t>27/08/2020</a:t>
             </a:fld>
             <a:endParaRPr lang="pt-BR"/>
           </a:p>
@@ -1074,7 +1082,7 @@
           <a:p>
             <a:fld id="{CDE33518-2864-4E68-A1F0-D9842031A43F}" type="datetimeFigureOut">
               <a:rPr lang="pt-BR" smtClean="0"/>
-              <a:t>26/08/2020</a:t>
+              <a:t>27/08/2020</a:t>
             </a:fld>
             <a:endParaRPr lang="pt-BR"/>
           </a:p>
@@ -1362,7 +1370,7 @@
           <a:p>
             <a:fld id="{CDE33518-2864-4E68-A1F0-D9842031A43F}" type="datetimeFigureOut">
               <a:rPr lang="pt-BR" smtClean="0"/>
-              <a:t>26/08/2020</a:t>
+              <a:t>27/08/2020</a:t>
             </a:fld>
             <a:endParaRPr lang="pt-BR"/>
           </a:p>
@@ -1784,7 +1792,7 @@
           <a:p>
             <a:fld id="{CDE33518-2864-4E68-A1F0-D9842031A43F}" type="datetimeFigureOut">
               <a:rPr lang="pt-BR" smtClean="0"/>
-              <a:t>26/08/2020</a:t>
+              <a:t>27/08/2020</a:t>
             </a:fld>
             <a:endParaRPr lang="pt-BR"/>
           </a:p>
@@ -1902,7 +1910,7 @@
           <a:p>
             <a:fld id="{CDE33518-2864-4E68-A1F0-D9842031A43F}" type="datetimeFigureOut">
               <a:rPr lang="pt-BR" smtClean="0"/>
-              <a:t>26/08/2020</a:t>
+              <a:t>27/08/2020</a:t>
             </a:fld>
             <a:endParaRPr lang="pt-BR"/>
           </a:p>
@@ -1997,7 +2005,7 @@
           <a:p>
             <a:fld id="{CDE33518-2864-4E68-A1F0-D9842031A43F}" type="datetimeFigureOut">
               <a:rPr lang="pt-BR" smtClean="0"/>
-              <a:t>26/08/2020</a:t>
+              <a:t>27/08/2020</a:t>
             </a:fld>
             <a:endParaRPr lang="pt-BR"/>
           </a:p>
@@ -2274,7 +2282,7 @@
           <a:p>
             <a:fld id="{CDE33518-2864-4E68-A1F0-D9842031A43F}" type="datetimeFigureOut">
               <a:rPr lang="pt-BR" smtClean="0"/>
-              <a:t>26/08/2020</a:t>
+              <a:t>27/08/2020</a:t>
             </a:fld>
             <a:endParaRPr lang="pt-BR"/>
           </a:p>
@@ -2527,7 +2535,7 @@
           <a:p>
             <a:fld id="{CDE33518-2864-4E68-A1F0-D9842031A43F}" type="datetimeFigureOut">
               <a:rPr lang="pt-BR" smtClean="0"/>
-              <a:t>26/08/2020</a:t>
+              <a:t>27/08/2020</a:t>
             </a:fld>
             <a:endParaRPr lang="pt-BR"/>
           </a:p>
@@ -2743,7 +2751,7 @@
           <a:p>
             <a:fld id="{CDE33518-2864-4E68-A1F0-D9842031A43F}" type="datetimeFigureOut">
               <a:rPr lang="pt-BR" smtClean="0"/>
-              <a:t>26/08/2020</a:t>
+              <a:t>27/08/2020</a:t>
             </a:fld>
             <a:endParaRPr lang="pt-BR"/>
           </a:p>
@@ -3245,10 +3253,63 @@
           <a:chExt cx="0" cy="0"/>
         </a:xfrm>
       </p:grpSpPr>
+      <p:sp>
+        <p:nvSpPr>
+          <p:cNvPr id="5" name="Título 1"/>
+          <p:cNvSpPr txBox="1">
+            <a:spLocks/>
+          </p:cNvSpPr>
+          <p:nvPr/>
+        </p:nvSpPr>
+        <p:spPr>
+          <a:xfrm>
+            <a:off x="467544" y="476672"/>
+            <a:ext cx="8337612" cy="1143000"/>
+          </a:xfrm>
+          <a:prstGeom prst="rect">
+            <a:avLst/>
+          </a:prstGeom>
+        </p:spPr>
+        <p:txBody>
+          <a:bodyPr vert="horz" lIns="91440" tIns="45720" rIns="91440" bIns="45720" rtlCol="0" anchor="ctr">
+            <a:normAutofit/>
+          </a:bodyPr>
+          <a:lstStyle>
+            <a:lvl1pPr algn="ctr" defTabSz="914400" rtl="0" eaLnBrk="1" latinLnBrk="0" hangingPunct="1">
+              <a:spcBef>
+                <a:spcPct val="0"/>
+              </a:spcBef>
+              <a:buNone/>
+              <a:defRPr sz="4400" kern="1200">
+                <a:solidFill>
+                  <a:schemeClr val="tx1"/>
+                </a:solidFill>
+                <a:latin typeface="+mj-lt"/>
+                <a:ea typeface="+mj-ea"/>
+                <a:cs typeface="+mj-cs"/>
+              </a:defRPr>
+            </a:lvl1pPr>
+          </a:lstStyle>
+          <a:p>
+            <a:pPr algn="l"/>
+            <a:r>
+              <a:rPr lang="pt-BR" sz="2000" b="1" dirty="0" smtClean="0"/>
+              <a:t>Diagrama de caso de uso </a:t>
+            </a:r>
+            <a:r>
+              <a:rPr lang="pt-BR" sz="2000" b="1" dirty="0" smtClean="0"/>
+              <a:t>– Manter Condicionante</a:t>
+            </a:r>
+            <a:endParaRPr lang="pt-BR" sz="2000" b="1" dirty="0"/>
+          </a:p>
+        </p:txBody>
+      </p:sp>
       <p:pic>
         <p:nvPicPr>
-          <p:cNvPr id="4" name="Imagem 3"/>
-          <p:cNvPicPr/>
+          <p:cNvPr id="6" name="Imagem 5"/>
+          <p:cNvPicPr>
+            <a:picLocks noChangeAspect="1"/>
+          </p:cNvPicPr>
           <p:nvPr/>
         </p:nvPicPr>
         <p:blipFill>
@@ -3265,8 +3326,8 @@
         </p:blipFill>
         <p:spPr>
           <a:xfrm>
-            <a:off x="535646" y="1637719"/>
-            <a:ext cx="7924785" cy="3873245"/>
+            <a:off x="107504" y="5510965"/>
+            <a:ext cx="1197825" cy="1216838"/>
           </a:xfrm>
           <a:prstGeom prst="rect">
             <a:avLst/>
@@ -3275,70 +3336,30 @@
       </p:pic>
       <p:pic>
         <p:nvPicPr>
-          <p:cNvPr id="5" name="Imagem 4"/>
-          <p:cNvPicPr>
-            <a:picLocks noChangeAspect="1"/>
-          </p:cNvPicPr>
+          <p:cNvPr id="7" name="Imagem 6"/>
+          <p:cNvPicPr/>
           <p:nvPr/>
         </p:nvPicPr>
         <p:blipFill>
-          <a:blip r:embed="rId3" cstate="print">
-            <a:extLst>
-              <a:ext uri="{28A0092B-C50C-407E-A947-70E740481C1C}">
-                <a14:useLocalDpi xmlns:a14="http://schemas.microsoft.com/office/drawing/2010/main" val="0"/>
-              </a:ext>
-            </a:extLst>
-          </a:blip>
+          <a:blip r:embed="rId3"/>
           <a:stretch>
             <a:fillRect/>
           </a:stretch>
         </p:blipFill>
         <p:spPr>
           <a:xfrm>
-            <a:off x="107504" y="5510965"/>
-            <a:ext cx="1197825" cy="1216838"/>
+            <a:off x="539552" y="1268759"/>
+            <a:ext cx="8064896" cy="4242205"/>
           </a:xfrm>
           <a:prstGeom prst="rect">
             <a:avLst/>
           </a:prstGeom>
         </p:spPr>
       </p:pic>
-      <p:sp>
-        <p:nvSpPr>
-          <p:cNvPr id="6" name="CaixaDeTexto 5"/>
-          <p:cNvSpPr txBox="1"/>
-          <p:nvPr/>
-        </p:nvSpPr>
-        <p:spPr>
-          <a:xfrm>
-            <a:off x="467544" y="1237610"/>
-            <a:ext cx="8068801" cy="400110"/>
-          </a:xfrm>
-          <a:prstGeom prst="rect">
-            <a:avLst/>
-          </a:prstGeom>
-          <a:noFill/>
-        </p:spPr>
-        <p:txBody>
-          <a:bodyPr wrap="square" rtlCol="0">
-            <a:spAutoFit/>
-          </a:bodyPr>
-          <a:lstStyle/>
-          <a:p>
-            <a:pPr algn="just"/>
-            <a:r>
-              <a:rPr lang="pt-BR" sz="2000" dirty="0" smtClean="0">
-                <a:latin typeface="Arial Black" panose="020B0A04020102020204" pitchFamily="34" charset="0"/>
-              </a:rPr>
-              <a:t>Tela de cadastro de licença ambiental</a:t>
-            </a:r>
-          </a:p>
-        </p:txBody>
-      </p:sp>
     </p:spTree>
     <p:extLst>
       <p:ext uri="{BB962C8B-B14F-4D97-AF65-F5344CB8AC3E}">
-        <p14:creationId xmlns:p14="http://schemas.microsoft.com/office/powerpoint/2010/main" val="2759508767"/>
+        <p14:creationId xmlns:p14="http://schemas.microsoft.com/office/powerpoint/2010/main" val="2941552508"/>
       </p:ext>
     </p:extLst>
   </p:cSld>
@@ -3372,44 +3393,10 @@
           <a:chExt cx="0" cy="0"/>
         </a:xfrm>
       </p:grpSpPr>
-      <p:sp>
-        <p:nvSpPr>
-          <p:cNvPr id="4" name="CaixaDeTexto 3"/>
-          <p:cNvSpPr txBox="1"/>
-          <p:nvPr/>
-        </p:nvSpPr>
-        <p:spPr>
-          <a:xfrm>
-            <a:off x="467544" y="1237610"/>
-            <a:ext cx="8068801" cy="400110"/>
-          </a:xfrm>
-          <a:prstGeom prst="rect">
-            <a:avLst/>
-          </a:prstGeom>
-          <a:noFill/>
-        </p:spPr>
-        <p:txBody>
-          <a:bodyPr wrap="square" rtlCol="0">
-            <a:spAutoFit/>
-          </a:bodyPr>
-          <a:lstStyle/>
-          <a:p>
-            <a:pPr algn="just"/>
-            <a:r>
-              <a:rPr lang="pt-BR" sz="2000" dirty="0" smtClean="0">
-                <a:latin typeface="Arial Black" panose="020B0A04020102020204" pitchFamily="34" charset="0"/>
-              </a:rPr>
-              <a:t>3. Módulo Administrativo</a:t>
-            </a:r>
-          </a:p>
-        </p:txBody>
-      </p:sp>
       <p:pic>
         <p:nvPicPr>
-          <p:cNvPr id="5" name="Imagem 4"/>
-          <p:cNvPicPr>
-            <a:picLocks noChangeAspect="1"/>
-          </p:cNvPicPr>
+          <p:cNvPr id="4" name="Imagem 3"/>
+          <p:cNvPicPr/>
           <p:nvPr/>
         </p:nvPicPr>
         <p:blipFill>
@@ -3426,14 +3413,44 @@
         </p:blipFill>
         <p:spPr>
           <a:xfrm>
-            <a:off x="107504" y="5510965"/>
-            <a:ext cx="1197825" cy="1216838"/>
+            <a:off x="535646" y="1637719"/>
+            <a:ext cx="7924785" cy="3873245"/>
           </a:xfrm>
           <a:prstGeom prst="rect">
             <a:avLst/>
           </a:prstGeom>
         </p:spPr>
       </p:pic>
+      <p:pic>
+        <p:nvPicPr>
+          <p:cNvPr id="5" name="Imagem 4"/>
+          <p:cNvPicPr>
+            <a:picLocks noChangeAspect="1"/>
+          </p:cNvPicPr>
+          <p:nvPr/>
+        </p:nvPicPr>
+        <p:blipFill>
+          <a:blip r:embed="rId3" cstate="print">
+            <a:extLst>
+              <a:ext uri="{28A0092B-C50C-407E-A947-70E740481C1C}">
+                <a14:useLocalDpi xmlns:a14="http://schemas.microsoft.com/office/drawing/2010/main" val="0"/>
+              </a:ext>
+            </a:extLst>
+          </a:blip>
+          <a:stretch>
+            <a:fillRect/>
+          </a:stretch>
+        </p:blipFill>
+        <p:spPr>
+          <a:xfrm>
+            <a:off x="107504" y="5510965"/>
+            <a:ext cx="1197825" cy="1216838"/>
+          </a:xfrm>
+          <a:prstGeom prst="rect">
+            <a:avLst/>
+          </a:prstGeom>
+        </p:spPr>
+      </p:pic>
       <p:sp>
         <p:nvSpPr>
           <p:cNvPr id="6" name="CaixaDeTexto 5"/>
@@ -3442,8 +3459,8 @@
         </p:nvSpPr>
         <p:spPr>
           <a:xfrm>
-            <a:off x="518343" y="1794590"/>
-            <a:ext cx="8068801" cy="1631216"/>
+            <a:off x="467544" y="1237610"/>
+            <a:ext cx="8068801" cy="400110"/>
           </a:xfrm>
           <a:prstGeom prst="rect">
             <a:avLst/>
@@ -3456,42 +3473,12 @@
           </a:bodyPr>
           <a:lstStyle/>
           <a:p>
-            <a:pPr marL="342900" indent="-342900" algn="just">
-              <a:buFont typeface="Arial" panose="020B0604020202020204" pitchFamily="34" charset="0"/>
-              <a:buChar char="•"/>
-            </a:pPr>
+            <a:pPr algn="just"/>
             <a:r>
               <a:rPr lang="pt-BR" sz="2000" dirty="0" smtClean="0">
-                <a:latin typeface="Arial" panose="020B0604020202020204" pitchFamily="34" charset="0"/>
-                <a:cs typeface="Arial" panose="020B0604020202020204" pitchFamily="34" charset="0"/>
+                <a:latin typeface="Arial Black" panose="020B0A04020102020204" pitchFamily="34" charset="0"/>
               </a:rPr>
-              <a:t>Módulo que vai permitir o cadastro de usuário bem como os papéis ao qual terá acesso</a:t>
-            </a:r>
-          </a:p>
-          <a:p>
-            <a:pPr marL="342900" indent="-342900" algn="just">
-              <a:buFont typeface="Arial" panose="020B0604020202020204" pitchFamily="34" charset="0"/>
-              <a:buChar char="•"/>
-            </a:pPr>
-            <a:r>
-              <a:rPr lang="pt-BR" sz="2000" dirty="0" smtClean="0">
-                <a:latin typeface="Arial" panose="020B0604020202020204" pitchFamily="34" charset="0"/>
-                <a:cs typeface="Arial" panose="020B0604020202020204" pitchFamily="34" charset="0"/>
-              </a:rPr>
-              <a:t>Compreende também os cadastros básicos do sistema</a:t>
-            </a:r>
-          </a:p>
-          <a:p>
-            <a:pPr marL="342900" indent="-342900" algn="just">
-              <a:buFont typeface="Arial" panose="020B0604020202020204" pitchFamily="34" charset="0"/>
-              <a:buChar char="•"/>
-            </a:pPr>
-            <a:r>
-              <a:rPr lang="pt-BR" sz="2000" dirty="0" smtClean="0">
-                <a:latin typeface="Arial" panose="020B0604020202020204" pitchFamily="34" charset="0"/>
-                <a:cs typeface="Arial" panose="020B0604020202020204" pitchFamily="34" charset="0"/>
-              </a:rPr>
-              <a:t>Deve permitir que o usuário seja vinculado a sua habilitação, conforme é requerido por legislação específica.</a:t>
+              <a:t>Tela de cadastro de licença ambiental</a:t>
             </a:r>
           </a:p>
         </p:txBody>
@@ -3499,7 +3486,7 @@
     </p:spTree>
     <p:extLst>
       <p:ext uri="{BB962C8B-B14F-4D97-AF65-F5344CB8AC3E}">
-        <p14:creationId xmlns:p14="http://schemas.microsoft.com/office/powerpoint/2010/main" val="964403387"/>
+        <p14:creationId xmlns:p14="http://schemas.microsoft.com/office/powerpoint/2010/main" val="2759508767"/>
       </p:ext>
     </p:extLst>
   </p:cSld>
@@ -3560,7 +3547,7 @@
               <a:rPr lang="pt-BR" sz="2000" dirty="0" smtClean="0">
                 <a:latin typeface="Arial Black" panose="020B0A04020102020204" pitchFamily="34" charset="0"/>
               </a:rPr>
-              <a:t>Tela de cadastro de tipo de condicionante</a:t>
+              <a:t>3. Módulo Administrativo</a:t>
             </a:r>
           </a:p>
         </p:txBody>
@@ -3595,32 +3582,72 @@
           </a:prstGeom>
         </p:spPr>
       </p:pic>
-      <p:pic>
-        <p:nvPicPr>
-          <p:cNvPr id="7" name="Imagem 6"/>
-          <p:cNvPicPr/>
+      <p:sp>
+        <p:nvSpPr>
+          <p:cNvPr id="6" name="CaixaDeTexto 5"/>
+          <p:cNvSpPr txBox="1"/>
           <p:nvPr/>
-        </p:nvPicPr>
-        <p:blipFill>
-          <a:blip r:embed="rId3"/>
-          <a:stretch>
-            <a:fillRect/>
-          </a:stretch>
-        </p:blipFill>
-        <p:spPr bwMode="auto">
-          <a:xfrm>
-            <a:off x="539552" y="1700808"/>
-            <a:ext cx="7996793" cy="3810157"/>
+        </p:nvSpPr>
+        <p:spPr>
+          <a:xfrm>
+            <a:off x="518343" y="1794590"/>
+            <a:ext cx="8068801" cy="1631216"/>
           </a:xfrm>
           <a:prstGeom prst="rect">
             <a:avLst/>
           </a:prstGeom>
-        </p:spPr>
-      </p:pic>
+          <a:noFill/>
+        </p:spPr>
+        <p:txBody>
+          <a:bodyPr wrap="square" rtlCol="0">
+            <a:spAutoFit/>
+          </a:bodyPr>
+          <a:lstStyle/>
+          <a:p>
+            <a:pPr marL="342900" indent="-342900" algn="just">
+              <a:buFont typeface="Arial" panose="020B0604020202020204" pitchFamily="34" charset="0"/>
+              <a:buChar char="•"/>
+            </a:pPr>
+            <a:r>
+              <a:rPr lang="pt-BR" sz="2000" dirty="0" smtClean="0">
+                <a:latin typeface="Arial" panose="020B0604020202020204" pitchFamily="34" charset="0"/>
+                <a:cs typeface="Arial" panose="020B0604020202020204" pitchFamily="34" charset="0"/>
+              </a:rPr>
+              <a:t>Módulo que vai permitir o cadastro de usuário bem como os papéis ao qual terá acesso</a:t>
+            </a:r>
+          </a:p>
+          <a:p>
+            <a:pPr marL="342900" indent="-342900" algn="just">
+              <a:buFont typeface="Arial" panose="020B0604020202020204" pitchFamily="34" charset="0"/>
+              <a:buChar char="•"/>
+            </a:pPr>
+            <a:r>
+              <a:rPr lang="pt-BR" sz="2000" dirty="0" smtClean="0">
+                <a:latin typeface="Arial" panose="020B0604020202020204" pitchFamily="34" charset="0"/>
+                <a:cs typeface="Arial" panose="020B0604020202020204" pitchFamily="34" charset="0"/>
+              </a:rPr>
+              <a:t>Compreende também os cadastros básicos do sistema</a:t>
+            </a:r>
+          </a:p>
+          <a:p>
+            <a:pPr marL="342900" indent="-342900" algn="just">
+              <a:buFont typeface="Arial" panose="020B0604020202020204" pitchFamily="34" charset="0"/>
+              <a:buChar char="•"/>
+            </a:pPr>
+            <a:r>
+              <a:rPr lang="pt-BR" sz="2000" dirty="0" smtClean="0">
+                <a:latin typeface="Arial" panose="020B0604020202020204" pitchFamily="34" charset="0"/>
+                <a:cs typeface="Arial" panose="020B0604020202020204" pitchFamily="34" charset="0"/>
+              </a:rPr>
+              <a:t>Deve permitir que o usuário seja vinculado a sua habilitação, conforme é requerido por legislação específica.</a:t>
+            </a:r>
+          </a:p>
+        </p:txBody>
+      </p:sp>
     </p:spTree>
     <p:extLst>
       <p:ext uri="{BB962C8B-B14F-4D97-AF65-F5344CB8AC3E}">
-        <p14:creationId xmlns:p14="http://schemas.microsoft.com/office/powerpoint/2010/main" val="1215288690"/>
+        <p14:creationId xmlns:p14="http://schemas.microsoft.com/office/powerpoint/2010/main" val="964403387"/>
       </p:ext>
     </p:extLst>
   </p:cSld>
@@ -3656,73 +3683,36 @@
       </p:grpSpPr>
       <p:sp>
         <p:nvSpPr>
-          <p:cNvPr id="4" name="Título 1"/>
-          <p:cNvSpPr txBox="1">
-            <a:spLocks/>
-          </p:cNvSpPr>
+          <p:cNvPr id="4" name="CaixaDeTexto 3"/>
+          <p:cNvSpPr txBox="1"/>
           <p:nvPr/>
         </p:nvSpPr>
         <p:spPr>
           <a:xfrm>
-            <a:off x="467544" y="476672"/>
-            <a:ext cx="8229600" cy="1143000"/>
+            <a:off x="467544" y="1237610"/>
+            <a:ext cx="8068801" cy="400110"/>
           </a:xfrm>
           <a:prstGeom prst="rect">
             <a:avLst/>
           </a:prstGeom>
-        </p:spPr>
-        <p:txBody>
-          <a:bodyPr vert="horz" lIns="91440" tIns="45720" rIns="91440" bIns="45720" rtlCol="0" anchor="ctr">
-            <a:normAutofit/>
+          <a:noFill/>
+        </p:spPr>
+        <p:txBody>
+          <a:bodyPr wrap="square" rtlCol="0">
+            <a:spAutoFit/>
           </a:bodyPr>
-          <a:lstStyle>
-            <a:lvl1pPr algn="ctr" defTabSz="914400" rtl="0" eaLnBrk="1" latinLnBrk="0" hangingPunct="1">
-              <a:spcBef>
-                <a:spcPct val="0"/>
-              </a:spcBef>
-              <a:buNone/>
-              <a:defRPr sz="4400" kern="1200">
-                <a:solidFill>
-                  <a:schemeClr val="tx1"/>
-                </a:solidFill>
-                <a:latin typeface="+mj-lt"/>
-                <a:ea typeface="+mj-ea"/>
-                <a:cs typeface="+mj-cs"/>
-              </a:defRPr>
-            </a:lvl1pPr>
-          </a:lstStyle>
-          <a:p>
-            <a:pPr algn="l"/>
-            <a:r>
-              <a:rPr lang="pt-BR" sz="2000" b="1" dirty="0" smtClean="0"/>
-              <a:t>Modelo de Componentes</a:t>
-            </a:r>
-            <a:endParaRPr lang="pt-BR" sz="2000" b="1" dirty="0"/>
-          </a:p>
-        </p:txBody>
-      </p:sp>
-      <p:pic>
-        <p:nvPicPr>
-          <p:cNvPr id="8" name="Imagem 7"/>
-          <p:cNvPicPr/>
-          <p:nvPr/>
-        </p:nvPicPr>
-        <p:blipFill>
-          <a:blip r:embed="rId2"/>
-          <a:stretch>
-            <a:fillRect/>
-          </a:stretch>
-        </p:blipFill>
-        <p:spPr bwMode="auto">
-          <a:xfrm>
-            <a:off x="706416" y="1340767"/>
-            <a:ext cx="7990728" cy="4170197"/>
-          </a:xfrm>
-          <a:prstGeom prst="rect">
-            <a:avLst/>
-          </a:prstGeom>
-        </p:spPr>
-      </p:pic>
+          <a:lstStyle/>
+          <a:p>
+            <a:pPr algn="just"/>
+            <a:r>
+              <a:rPr lang="pt-BR" sz="2000" dirty="0" smtClean="0">
+                <a:latin typeface="Arial Black" panose="020B0A04020102020204" pitchFamily="34" charset="0"/>
+              </a:rPr>
+              <a:t>Tela de cadastro de tipo de condicionante</a:t>
+            </a:r>
+          </a:p>
+        </p:txBody>
+      </p:sp>
       <p:pic>
         <p:nvPicPr>
           <p:cNvPr id="5" name="Imagem 4"/>
@@ -3732,7 +3722,7 @@
           <p:nvPr/>
         </p:nvPicPr>
         <p:blipFill>
-          <a:blip r:embed="rId3" cstate="print">
+          <a:blip r:embed="rId2" cstate="print">
             <a:extLst>
               <a:ext uri="{28A0092B-C50C-407E-A947-70E740481C1C}">
                 <a14:useLocalDpi xmlns:a14="http://schemas.microsoft.com/office/drawing/2010/main" val="0"/>
@@ -3753,10 +3743,32 @@
           </a:prstGeom>
         </p:spPr>
       </p:pic>
+      <p:pic>
+        <p:nvPicPr>
+          <p:cNvPr id="7" name="Imagem 6"/>
+          <p:cNvPicPr/>
+          <p:nvPr/>
+        </p:nvPicPr>
+        <p:blipFill>
+          <a:blip r:embed="rId3"/>
+          <a:stretch>
+            <a:fillRect/>
+          </a:stretch>
+        </p:blipFill>
+        <p:spPr bwMode="auto">
+          <a:xfrm>
+            <a:off x="539552" y="1700808"/>
+            <a:ext cx="7996793" cy="3810157"/>
+          </a:xfrm>
+          <a:prstGeom prst="rect">
+            <a:avLst/>
+          </a:prstGeom>
+        </p:spPr>
+      </p:pic>
     </p:spTree>
     <p:extLst>
       <p:ext uri="{BB962C8B-B14F-4D97-AF65-F5344CB8AC3E}">
-        <p14:creationId xmlns:p14="http://schemas.microsoft.com/office/powerpoint/2010/main" val="2795295655"/>
+        <p14:creationId xmlns:p14="http://schemas.microsoft.com/office/powerpoint/2010/main" val="1215288690"/>
       </p:ext>
     </p:extLst>
   </p:cSld>
@@ -3790,85 +3802,51 @@
           <a:chExt cx="0" cy="0"/>
         </a:xfrm>
       </p:grpSpPr>
-      <p:pic>
-        <p:nvPicPr>
-          <p:cNvPr id="4" name="Imagem 3" descr="Tela de celular com texto preto sobre fundo branco&#10;&#10;Descrição gerada automaticamente"/>
-          <p:cNvPicPr/>
+      <p:sp>
+        <p:nvSpPr>
+          <p:cNvPr id="4" name="CaixaDeTexto 3"/>
+          <p:cNvSpPr txBox="1"/>
           <p:nvPr/>
-        </p:nvPicPr>
-        <p:blipFill>
-          <a:blip r:embed="rId2"/>
-          <a:stretch>
-            <a:fillRect/>
-          </a:stretch>
-        </p:blipFill>
-        <p:spPr bwMode="auto">
-          <a:xfrm>
-            <a:off x="683568" y="1412776"/>
-            <a:ext cx="7776864" cy="4098189"/>
+        </p:nvSpPr>
+        <p:spPr>
+          <a:xfrm>
+            <a:off x="467544" y="1237610"/>
+            <a:ext cx="8068801" cy="400110"/>
           </a:xfrm>
           <a:prstGeom prst="rect">
             <a:avLst/>
           </a:prstGeom>
-        </p:spPr>
-      </p:pic>
-      <p:sp>
-        <p:nvSpPr>
-          <p:cNvPr id="5" name="Título 1"/>
-          <p:cNvSpPr txBox="1">
-            <a:spLocks/>
-          </p:cNvSpPr>
-          <p:nvPr/>
-        </p:nvSpPr>
-        <p:spPr>
-          <a:xfrm>
-            <a:off x="611560" y="476672"/>
-            <a:ext cx="8193596" cy="1143000"/>
-          </a:xfrm>
-          <a:prstGeom prst="rect">
-            <a:avLst/>
-          </a:prstGeom>
-        </p:spPr>
-        <p:txBody>
-          <a:bodyPr vert="horz" lIns="91440" tIns="45720" rIns="91440" bIns="45720" rtlCol="0" anchor="ctr">
-            <a:normAutofit/>
+          <a:noFill/>
+        </p:spPr>
+        <p:txBody>
+          <a:bodyPr wrap="square" rtlCol="0">
+            <a:spAutoFit/>
           </a:bodyPr>
-          <a:lstStyle>
-            <a:lvl1pPr algn="ctr" defTabSz="914400" rtl="0" eaLnBrk="1" latinLnBrk="0" hangingPunct="1">
-              <a:spcBef>
-                <a:spcPct val="0"/>
-              </a:spcBef>
-              <a:buNone/>
-              <a:defRPr sz="4400" kern="1200">
-                <a:solidFill>
-                  <a:schemeClr val="tx1"/>
-                </a:solidFill>
-                <a:latin typeface="+mj-lt"/>
-                <a:ea typeface="+mj-ea"/>
-                <a:cs typeface="+mj-cs"/>
-              </a:defRPr>
-            </a:lvl1pPr>
-          </a:lstStyle>
-          <a:p>
-            <a:pPr algn="l"/>
-            <a:r>
-              <a:rPr lang="pt-BR" sz="2000" b="1" dirty="0" smtClean="0"/>
-              <a:t>Modelo de implantação</a:t>
-            </a:r>
-            <a:endParaRPr lang="pt-BR" sz="2000" b="1" dirty="0"/>
+          <a:lstStyle/>
+          <a:p>
+            <a:pPr algn="just"/>
+            <a:r>
+              <a:rPr lang="pt-BR" sz="2000" dirty="0" smtClean="0">
+                <a:latin typeface="Arial Black" panose="020B0A04020102020204" pitchFamily="34" charset="0"/>
+              </a:rPr>
+              <a:t>Caso de Uso – Cadastro de Usuário</a:t>
+            </a:r>
+            <a:endParaRPr lang="pt-BR" sz="2000" dirty="0" smtClean="0">
+              <a:latin typeface="Arial Black" panose="020B0A04020102020204" pitchFamily="34" charset="0"/>
+            </a:endParaRPr>
           </a:p>
         </p:txBody>
       </p:sp>
       <p:pic>
         <p:nvPicPr>
-          <p:cNvPr id="6" name="Imagem 5"/>
+          <p:cNvPr id="5" name="Imagem 4"/>
           <p:cNvPicPr>
             <a:picLocks noChangeAspect="1"/>
           </p:cNvPicPr>
           <p:nvPr/>
         </p:nvPicPr>
         <p:blipFill>
-          <a:blip r:embed="rId3" cstate="print">
+          <a:blip r:embed="rId2" cstate="print">
             <a:extLst>
               <a:ext uri="{28A0092B-C50C-407E-A947-70E740481C1C}">
                 <a14:useLocalDpi xmlns:a14="http://schemas.microsoft.com/office/drawing/2010/main" val="0"/>
@@ -3889,10 +3867,32 @@
           </a:prstGeom>
         </p:spPr>
       </p:pic>
+      <p:pic>
+        <p:nvPicPr>
+          <p:cNvPr id="6" name="Imagem 5"/>
+          <p:cNvPicPr/>
+          <p:nvPr/>
+        </p:nvPicPr>
+        <p:blipFill>
+          <a:blip r:embed="rId3"/>
+          <a:stretch>
+            <a:fillRect/>
+          </a:stretch>
+        </p:blipFill>
+        <p:spPr>
+          <a:xfrm>
+            <a:off x="539552" y="1637720"/>
+            <a:ext cx="8064896" cy="4109030"/>
+          </a:xfrm>
+          <a:prstGeom prst="rect">
+            <a:avLst/>
+          </a:prstGeom>
+        </p:spPr>
+      </p:pic>
     </p:spTree>
     <p:extLst>
       <p:ext uri="{BB962C8B-B14F-4D97-AF65-F5344CB8AC3E}">
-        <p14:creationId xmlns:p14="http://schemas.microsoft.com/office/powerpoint/2010/main" val="4127529639"/>
+        <p14:creationId xmlns:p14="http://schemas.microsoft.com/office/powerpoint/2010/main" val="1960706189"/>
       </p:ext>
     </p:extLst>
   </p:cSld>
@@ -3928,7 +3928,7 @@
       </p:grpSpPr>
       <p:sp>
         <p:nvSpPr>
-          <p:cNvPr id="5" name="Título 1"/>
+          <p:cNvPr id="4" name="Título 1"/>
           <p:cNvSpPr txBox="1">
             <a:spLocks/>
           </p:cNvSpPr>
@@ -3936,16 +3936,16 @@
         </p:nvSpPr>
         <p:spPr>
           <a:xfrm>
-            <a:off x="611560" y="476672"/>
-            <a:ext cx="8193596" cy="1143000"/>
+            <a:off x="535646" y="764704"/>
+            <a:ext cx="4684426" cy="472906"/>
           </a:xfrm>
           <a:prstGeom prst="rect">
             <a:avLst/>
           </a:prstGeom>
         </p:spPr>
         <p:txBody>
-          <a:bodyPr vert="horz" lIns="91440" tIns="45720" rIns="91440" bIns="45720" rtlCol="0" anchor="ctr">
-            <a:normAutofit/>
+          <a:bodyPr>
+            <a:noAutofit/>
           </a:bodyPr>
           <a:lstStyle>
             <a:lvl1pPr algn="ctr" defTabSz="914400" rtl="0" eaLnBrk="1" latinLnBrk="0" hangingPunct="1">
@@ -3966,203 +3966,140 @@
           <a:p>
             <a:pPr algn="l"/>
             <a:r>
-              <a:rPr lang="pt-BR" sz="2000" b="1" dirty="0" smtClean="0"/>
-              <a:t>Mensageria</a:t>
-            </a:r>
-            <a:endParaRPr lang="pt-BR" sz="2000" b="1" dirty="0"/>
-          </a:p>
-        </p:txBody>
-      </p:sp>
-      <p:pic>
-        <p:nvPicPr>
-          <p:cNvPr id="6" name="Imagem 5"/>
-          <p:cNvPicPr>
-            <a:picLocks noChangeAspect="1"/>
-          </p:cNvPicPr>
-          <p:nvPr/>
-        </p:nvPicPr>
-        <p:blipFill>
-          <a:blip r:embed="rId2" cstate="print">
-            <a:extLst>
-              <a:ext uri="{28A0092B-C50C-407E-A947-70E740481C1C}">
-                <a14:useLocalDpi xmlns:a14="http://schemas.microsoft.com/office/drawing/2010/main" val="0"/>
-              </a:ext>
-            </a:extLst>
-          </a:blip>
-          <a:stretch>
-            <a:fillRect/>
-          </a:stretch>
-        </p:blipFill>
-        <p:spPr>
-          <a:xfrm>
-            <a:off x="107504" y="5510965"/>
-            <a:ext cx="1197825" cy="1216838"/>
-          </a:xfrm>
-          <a:prstGeom prst="rect">
-            <a:avLst/>
-          </a:prstGeom>
-        </p:spPr>
-      </p:pic>
-      <p:sp>
-        <p:nvSpPr>
-          <p:cNvPr id="8" name="CaixaDeTexto 7"/>
-          <p:cNvSpPr txBox="1"/>
-          <p:nvPr/>
-        </p:nvSpPr>
-        <p:spPr>
-          <a:xfrm>
-            <a:off x="518343" y="1794590"/>
-            <a:ext cx="8068801" cy="1938992"/>
-          </a:xfrm>
-          <a:prstGeom prst="rect">
-            <a:avLst/>
-          </a:prstGeom>
-          <a:noFill/>
-        </p:spPr>
-        <p:txBody>
-          <a:bodyPr wrap="square" rtlCol="0">
-            <a:spAutoFit/>
+              <a:rPr lang="pt-BR" sz="2200" b="1" dirty="0" smtClean="0">
+                <a:latin typeface="Arial Black" panose="020B0A04020102020204" pitchFamily="34" charset="0"/>
+                <a:cs typeface="Arial" panose="020B0604020202020204" pitchFamily="34" charset="0"/>
+              </a:rPr>
+              <a:t>Requisitos </a:t>
+            </a:r>
+            <a:r>
+              <a:rPr lang="pt-BR" sz="2200" b="1" dirty="0" smtClean="0">
+                <a:latin typeface="Arial Black" panose="020B0A04020102020204" pitchFamily="34" charset="0"/>
+                <a:cs typeface="Arial" panose="020B0604020202020204" pitchFamily="34" charset="0"/>
+              </a:rPr>
+              <a:t>Não Funcionais</a:t>
+            </a:r>
+            <a:endParaRPr lang="pt-BR" sz="2200" b="1" dirty="0">
+              <a:latin typeface="Arial Black" panose="020B0A04020102020204" pitchFamily="34" charset="0"/>
+            </a:endParaRPr>
+          </a:p>
+        </p:txBody>
+      </p:sp>
+      <p:sp>
+        <p:nvSpPr>
+          <p:cNvPr id="5" name="Título 1"/>
+          <p:cNvSpPr>
+            <a:spLocks noGrp="1"/>
+          </p:cNvSpPr>
+          <p:nvPr>
+            <p:ph type="title"/>
+          </p:nvPr>
+        </p:nvSpPr>
+        <p:spPr>
+          <a:xfrm>
+            <a:off x="539552" y="1237610"/>
+            <a:ext cx="7636754" cy="720080"/>
+          </a:xfrm>
+        </p:spPr>
+        <p:txBody>
+          <a:bodyPr>
+            <a:normAutofit fontScale="90000"/>
           </a:bodyPr>
           <a:lstStyle/>
           <a:p>
-            <a:pPr marL="342900" indent="-342900" algn="just">
-              <a:buFont typeface="Arial" panose="020B0604020202020204" pitchFamily="34" charset="0"/>
-              <a:buChar char="•"/>
-            </a:pPr>
-            <a:r>
-              <a:rPr lang="pt-BR" sz="2000" dirty="0" smtClean="0">
-                <a:latin typeface="Arial" panose="020B0604020202020204" pitchFamily="34" charset="0"/>
-                <a:cs typeface="Arial" panose="020B0604020202020204" pitchFamily="34" charset="0"/>
+            <a:pPr algn="l"/>
+            <a:r>
+              <a:rPr lang="pt-BR" sz="2200" b="1" dirty="0" smtClean="0">
+                <a:latin typeface="Arial Black" panose="020B0A04020102020204" pitchFamily="34" charset="0"/>
               </a:rPr>
-              <a:t>Será utilizado um </a:t>
-            </a:r>
-            <a:r>
-              <a:rPr lang="pt-BR" sz="2000" i="1" dirty="0" smtClean="0">
-                <a:latin typeface="Arial" panose="020B0604020202020204" pitchFamily="34" charset="0"/>
-                <a:cs typeface="Arial" panose="020B0604020202020204" pitchFamily="34" charset="0"/>
-              </a:rPr>
-              <a:t>container</a:t>
-            </a:r>
-            <a:r>
-              <a:rPr lang="pt-BR" sz="2000" dirty="0" smtClean="0">
-                <a:latin typeface="Arial" panose="020B0604020202020204" pitchFamily="34" charset="0"/>
-                <a:cs typeface="Arial" panose="020B0604020202020204" pitchFamily="34" charset="0"/>
-              </a:rPr>
+              <a:t>1. Persistência – O sistema deverá ser independente de banco de dados.</a:t>
+            </a:r>
+            <a:endParaRPr lang="pt-BR" sz="2200" b="1" dirty="0">
+              <a:latin typeface="Arial Black" panose="020B0A04020102020204" pitchFamily="34" charset="0"/>
+            </a:endParaRPr>
+          </a:p>
+        </p:txBody>
+      </p:sp>
+      <p:sp>
+        <p:nvSpPr>
+          <p:cNvPr id="6" name="Espaço Reservado para Conteúdo 2"/>
+          <p:cNvSpPr>
+            <a:spLocks noGrp="1"/>
+          </p:cNvSpPr>
+          <p:nvPr>
+            <p:ph idx="1"/>
+          </p:nvPr>
+        </p:nvSpPr>
+        <p:spPr>
+          <a:xfrm>
+            <a:off x="611560" y="2204864"/>
+            <a:ext cx="7488832" cy="2016224"/>
+          </a:xfrm>
+        </p:spPr>
+        <p:txBody>
+          <a:bodyPr>
+            <a:normAutofit fontScale="92500" lnSpcReduction="20000"/>
+          </a:bodyPr>
+          <a:lstStyle/>
+          <a:p>
+            <a:pPr algn="just"/>
+            <a:r>
+              <a:rPr lang="pt-BR" sz="2000" i="1" dirty="0" smtClean="0"/>
+              <a:t>JPA </a:t>
+            </a:r>
+            <a:r>
+              <a:rPr lang="pt-BR" sz="2000" dirty="0" smtClean="0"/>
+              <a:t>com </a:t>
+            </a:r>
+            <a:r>
+              <a:rPr lang="pt-BR" sz="2000" i="1" dirty="0" err="1" smtClean="0"/>
+              <a:t>Annotations</a:t>
+            </a:r>
+            <a:r>
+              <a:rPr lang="pt-BR" sz="2000" dirty="0"/>
               <a:t> </a:t>
             </a:r>
             <a:r>
-              <a:rPr lang="pt-BR" sz="2000" i="1" dirty="0" err="1" smtClean="0">
-                <a:latin typeface="Arial" panose="020B0604020202020204" pitchFamily="34" charset="0"/>
-                <a:cs typeface="Arial" panose="020B0604020202020204" pitchFamily="34" charset="0"/>
-              </a:rPr>
-              <a:t>Docker</a:t>
-            </a:r>
-            <a:r>
-              <a:rPr lang="pt-BR" sz="2000" dirty="0" smtClean="0">
-                <a:latin typeface="Arial" panose="020B0604020202020204" pitchFamily="34" charset="0"/>
-                <a:cs typeface="Arial" panose="020B0604020202020204" pitchFamily="34" charset="0"/>
-              </a:rPr>
-              <a:t> rodando com </a:t>
-            </a:r>
-            <a:r>
-              <a:rPr lang="pt-BR" sz="2000" dirty="0" err="1" smtClean="0">
-                <a:latin typeface="Arial" panose="020B0604020202020204" pitchFamily="34" charset="0"/>
-                <a:cs typeface="Arial" panose="020B0604020202020204" pitchFamily="34" charset="0"/>
-              </a:rPr>
-              <a:t>RabbitMQ</a:t>
-            </a:r>
-            <a:endParaRPr lang="pt-BR" sz="2000" dirty="0" smtClean="0">
-              <a:latin typeface="Arial" panose="020B0604020202020204" pitchFamily="34" charset="0"/>
-              <a:cs typeface="Arial" panose="020B0604020202020204" pitchFamily="34" charset="0"/>
-            </a:endParaRPr>
-          </a:p>
-          <a:p>
-            <a:pPr marL="342900" indent="-342900" algn="just">
-              <a:buFont typeface="Arial" panose="020B0604020202020204" pitchFamily="34" charset="0"/>
-              <a:buChar char="•"/>
-            </a:pPr>
-            <a:r>
-              <a:rPr lang="pt-BR" sz="2000" dirty="0" smtClean="0">
-                <a:latin typeface="Arial" panose="020B0604020202020204" pitchFamily="34" charset="0"/>
-                <a:cs typeface="Arial" panose="020B0604020202020204" pitchFamily="34" charset="0"/>
-              </a:rPr>
-              <a:t>Facilidade da aplicação se comunicar com o </a:t>
-            </a:r>
-            <a:r>
-              <a:rPr lang="pt-BR" sz="2000" dirty="0" err="1" smtClean="0">
-                <a:latin typeface="Arial" panose="020B0604020202020204" pitchFamily="34" charset="0"/>
-                <a:cs typeface="Arial" panose="020B0604020202020204" pitchFamily="34" charset="0"/>
-              </a:rPr>
-              <a:t>RabbitMQ</a:t>
-            </a:r>
-            <a:r>
-              <a:rPr lang="pt-BR" sz="2000" dirty="0" smtClean="0">
-                <a:latin typeface="Arial" panose="020B0604020202020204" pitchFamily="34" charset="0"/>
-                <a:cs typeface="Arial" panose="020B0604020202020204" pitchFamily="34" charset="0"/>
-              </a:rPr>
-              <a:t>, como é demostrado na classe Java a ser mostrada</a:t>
-            </a:r>
-          </a:p>
-          <a:p>
-            <a:pPr marL="342900" indent="-342900" algn="just">
-              <a:buFont typeface="Arial" panose="020B0604020202020204" pitchFamily="34" charset="0"/>
-              <a:buChar char="•"/>
-            </a:pPr>
-            <a:r>
-              <a:rPr lang="pt-BR" sz="2000" dirty="0" smtClean="0">
-                <a:latin typeface="Arial" panose="020B0604020202020204" pitchFamily="34" charset="0"/>
-                <a:cs typeface="Arial" panose="020B0604020202020204" pitchFamily="34" charset="0"/>
-              </a:rPr>
-              <a:t>No site da ferramenta é disponibilizada uma imagem, bastando apenas um comando </a:t>
-            </a:r>
-            <a:r>
-              <a:rPr lang="pt-BR" sz="2000" i="1" dirty="0" err="1" smtClean="0">
-                <a:latin typeface="Arial" panose="020B0604020202020204" pitchFamily="34" charset="0"/>
-                <a:cs typeface="Arial" panose="020B0604020202020204" pitchFamily="34" charset="0"/>
-              </a:rPr>
-              <a:t>docker</a:t>
-            </a:r>
-            <a:r>
-              <a:rPr lang="pt-BR" sz="2000" i="1" dirty="0" smtClean="0">
-                <a:latin typeface="Arial" panose="020B0604020202020204" pitchFamily="34" charset="0"/>
-                <a:cs typeface="Arial" panose="020B0604020202020204" pitchFamily="34" charset="0"/>
-              </a:rPr>
-              <a:t> </a:t>
-            </a:r>
-            <a:r>
-              <a:rPr lang="pt-BR" sz="2000" i="1" dirty="0" err="1" smtClean="0">
-                <a:latin typeface="Arial" panose="020B0604020202020204" pitchFamily="34" charset="0"/>
-                <a:cs typeface="Arial" panose="020B0604020202020204" pitchFamily="34" charset="0"/>
-              </a:rPr>
-              <a:t>pull</a:t>
-            </a:r>
-            <a:r>
-              <a:rPr lang="pt-BR" sz="2000" dirty="0" smtClean="0">
-                <a:latin typeface="Arial" panose="020B0604020202020204" pitchFamily="34" charset="0"/>
-                <a:cs typeface="Arial" panose="020B0604020202020204" pitchFamily="34" charset="0"/>
-              </a:rPr>
-              <a:t> para sua instalação</a:t>
-            </a:r>
-          </a:p>
-          <a:p>
-            <a:pPr marL="342900" indent="-342900" algn="just">
-              <a:buFont typeface="Arial" panose="020B0604020202020204" pitchFamily="34" charset="0"/>
-              <a:buChar char="•"/>
-            </a:pPr>
-            <a:r>
-              <a:rPr lang="pt-BR" sz="2000" dirty="0" smtClean="0">
-                <a:latin typeface="Arial" panose="020B0604020202020204" pitchFamily="34" charset="0"/>
-                <a:cs typeface="Arial" panose="020B0604020202020204" pitchFamily="34" charset="0"/>
-              </a:rPr>
-              <a:t>Permite lidar com o tráfego e também com filas</a:t>
-            </a:r>
+              <a:rPr lang="pt-BR" sz="2000" dirty="0" smtClean="0"/>
+              <a:t>em detrimento de XML por apresentar maior facilidade de escrita além de ser mais legível</a:t>
+            </a:r>
+          </a:p>
+          <a:p>
+            <a:pPr algn="just"/>
+            <a:r>
+              <a:rPr lang="pt-BR" sz="2000" dirty="0" smtClean="0"/>
+              <a:t>A aplicação contém um arquivo </a:t>
+            </a:r>
+            <a:r>
+              <a:rPr lang="pt-BR" sz="2000" i="1" dirty="0" err="1" smtClean="0"/>
+              <a:t>import.sql</a:t>
+            </a:r>
+            <a:r>
+              <a:rPr lang="pt-BR" sz="2000" dirty="0" smtClean="0"/>
+              <a:t>, nele será contido toda a carga inicial da aplicação</a:t>
+            </a:r>
+          </a:p>
+          <a:p>
+            <a:pPr algn="just"/>
+            <a:r>
+              <a:rPr lang="pt-BR" sz="2000" dirty="0" smtClean="0"/>
+              <a:t>Facilidade de mudar de banco de dados sem necessariamente ter que reescrever toda a camada de persistência da aplicação</a:t>
+            </a:r>
+          </a:p>
+          <a:p>
+            <a:pPr algn="just"/>
+            <a:r>
+              <a:rPr lang="pt-BR" sz="2000" dirty="0" smtClean="0"/>
+              <a:t>MySQL Server versão 8</a:t>
+            </a:r>
+            <a:endParaRPr lang="pt-BR" sz="2000" dirty="0"/>
           </a:p>
         </p:txBody>
       </p:sp>
     </p:spTree>
     <p:extLst>
       <p:ext uri="{BB962C8B-B14F-4D97-AF65-F5344CB8AC3E}">
-        <p14:creationId xmlns:p14="http://schemas.microsoft.com/office/powerpoint/2010/main" val="3837667997"/>
+        <p14:creationId xmlns:p14="http://schemas.microsoft.com/office/powerpoint/2010/main" val="3155002645"/>
       </p:ext>
     </p:extLst>
   </p:cSld>
@@ -4198,54 +4135,42 @@
       </p:grpSpPr>
       <p:sp>
         <p:nvSpPr>
-          <p:cNvPr id="5" name="Título 1"/>
-          <p:cNvSpPr txBox="1">
-            <a:spLocks/>
+          <p:cNvPr id="2" name="Título 1"/>
+          <p:cNvSpPr>
+            <a:spLocks noGrp="1"/>
           </p:cNvSpPr>
-          <p:nvPr/>
-        </p:nvSpPr>
-        <p:spPr>
-          <a:xfrm>
-            <a:off x="611560" y="476672"/>
-            <a:ext cx="8193596" cy="1143000"/>
-          </a:xfrm>
-          <a:prstGeom prst="rect">
-            <a:avLst/>
-          </a:prstGeom>
-        </p:spPr>
-        <p:txBody>
-          <a:bodyPr vert="horz" lIns="91440" tIns="45720" rIns="91440" bIns="45720" rtlCol="0" anchor="ctr">
+          <p:nvPr>
+            <p:ph type="title"/>
+          </p:nvPr>
+        </p:nvSpPr>
+        <p:spPr>
+          <a:xfrm>
+            <a:off x="1305329" y="593762"/>
+            <a:ext cx="2114543" cy="720080"/>
+          </a:xfrm>
+        </p:spPr>
+        <p:txBody>
+          <a:bodyPr>
             <a:normAutofit/>
           </a:bodyPr>
-          <a:lstStyle>
-            <a:lvl1pPr algn="ctr" defTabSz="914400" rtl="0" eaLnBrk="1" latinLnBrk="0" hangingPunct="1">
-              <a:spcBef>
-                <a:spcPct val="0"/>
-              </a:spcBef>
-              <a:buNone/>
-              <a:defRPr sz="4400" kern="1200">
-                <a:solidFill>
-                  <a:schemeClr val="tx1"/>
-                </a:solidFill>
-                <a:latin typeface="+mj-lt"/>
-                <a:ea typeface="+mj-ea"/>
-                <a:cs typeface="+mj-cs"/>
-              </a:defRPr>
-            </a:lvl1pPr>
-          </a:lstStyle>
+          <a:lstStyle/>
           <a:p>
             <a:pPr algn="l"/>
             <a:r>
-              <a:rPr lang="pt-BR" sz="2000" b="1" dirty="0" smtClean="0"/>
-              <a:t>Código que manda  a mensagem de teste</a:t>
-            </a:r>
-            <a:endParaRPr lang="pt-BR" sz="2000" b="1" dirty="0"/>
+              <a:rPr lang="pt-BR" sz="2200" b="1" dirty="0" smtClean="0">
+                <a:latin typeface="Arial Black" panose="020B0A04020102020204" pitchFamily="34" charset="0"/>
+              </a:rPr>
+              <a:t>Persistência</a:t>
+            </a:r>
+            <a:endParaRPr lang="pt-BR" sz="2200" b="1" dirty="0">
+              <a:latin typeface="Arial Black" panose="020B0A04020102020204" pitchFamily="34" charset="0"/>
+            </a:endParaRPr>
           </a:p>
         </p:txBody>
       </p:sp>
       <p:pic>
         <p:nvPicPr>
-          <p:cNvPr id="6" name="Imagem 5"/>
+          <p:cNvPr id="4" name="Imagem 3"/>
           <p:cNvPicPr>
             <a:picLocks noChangeAspect="1"/>
           </p:cNvPicPr>
@@ -4275,10 +4200,8 @@
       </p:pic>
       <p:pic>
         <p:nvPicPr>
-          <p:cNvPr id="1026" name="Picture 2"/>
-          <p:cNvPicPr>
-            <a:picLocks noChangeAspect="1" noChangeArrowheads="1"/>
-          </p:cNvPicPr>
+          <p:cNvPr id="6" name="Imagem 5"/>
+          <p:cNvPicPr/>
           <p:nvPr/>
         </p:nvPicPr>
         <p:blipFill>
@@ -4289,48 +4212,24 @@
               </a:ext>
             </a:extLst>
           </a:blip>
-          <a:srcRect/>
           <a:stretch>
             <a:fillRect/>
           </a:stretch>
         </p:blipFill>
-        <p:spPr bwMode="auto">
-          <a:xfrm>
-            <a:off x="611560" y="1270673"/>
-            <a:ext cx="7920880" cy="4286741"/>
+        <p:spPr>
+          <a:xfrm>
+            <a:off x="1305329" y="1124744"/>
+            <a:ext cx="6074983" cy="4608511"/>
           </a:xfrm>
           <a:prstGeom prst="rect">
             <a:avLst/>
           </a:prstGeom>
-          <a:noFill/>
-          <a:ln>
-            <a:noFill/>
-          </a:ln>
-          <a:extLst>
-            <a:ext uri="{909E8E84-426E-40DD-AFC4-6F175D3DCCD1}">
-              <a14:hiddenFill xmlns:a14="http://schemas.microsoft.com/office/drawing/2010/main">
-                <a:solidFill>
-                  <a:schemeClr val="accent1"/>
-                </a:solidFill>
-              </a14:hiddenFill>
-            </a:ext>
-            <a:ext uri="{91240B29-F687-4F45-9708-019B960494DF}">
-              <a14:hiddenLine xmlns:a14="http://schemas.microsoft.com/office/drawing/2010/main" w="9525">
-                <a:solidFill>
-                  <a:schemeClr val="tx1"/>
-                </a:solidFill>
-                <a:miter lim="800000"/>
-                <a:headEnd/>
-                <a:tailEnd/>
-              </a14:hiddenLine>
-            </a:ext>
-          </a:extLst>
         </p:spPr>
       </p:pic>
     </p:spTree>
     <p:extLst>
       <p:ext uri="{BB962C8B-B14F-4D97-AF65-F5344CB8AC3E}">
-        <p14:creationId xmlns:p14="http://schemas.microsoft.com/office/powerpoint/2010/main" val="2392084050"/>
+        <p14:creationId xmlns:p14="http://schemas.microsoft.com/office/powerpoint/2010/main" val="900490011"/>
       </p:ext>
     </p:extLst>
   </p:cSld>
@@ -4366,62 +4265,42 @@
       </p:grpSpPr>
       <p:sp>
         <p:nvSpPr>
-          <p:cNvPr id="5" name="Título 1"/>
-          <p:cNvSpPr txBox="1">
-            <a:spLocks/>
+          <p:cNvPr id="2" name="Título 1"/>
+          <p:cNvSpPr>
+            <a:spLocks noGrp="1"/>
           </p:cNvSpPr>
-          <p:nvPr/>
-        </p:nvSpPr>
-        <p:spPr>
-          <a:xfrm>
-            <a:off x="611560" y="476672"/>
-            <a:ext cx="8193596" cy="1143000"/>
-          </a:xfrm>
-          <a:prstGeom prst="rect">
-            <a:avLst/>
-          </a:prstGeom>
-        </p:spPr>
-        <p:txBody>
-          <a:bodyPr vert="horz" lIns="91440" tIns="45720" rIns="91440" bIns="45720" rtlCol="0" anchor="ctr">
+          <p:nvPr>
+            <p:ph type="title"/>
+          </p:nvPr>
+        </p:nvSpPr>
+        <p:spPr>
+          <a:xfrm>
+            <a:off x="827584" y="620688"/>
+            <a:ext cx="2114543" cy="720080"/>
+          </a:xfrm>
+        </p:spPr>
+        <p:txBody>
+          <a:bodyPr>
             <a:normAutofit/>
           </a:bodyPr>
-          <a:lstStyle>
-            <a:lvl1pPr algn="ctr" defTabSz="914400" rtl="0" eaLnBrk="1" latinLnBrk="0" hangingPunct="1">
-              <a:spcBef>
-                <a:spcPct val="0"/>
-              </a:spcBef>
-              <a:buNone/>
-              <a:defRPr sz="4400" kern="1200">
-                <a:solidFill>
-                  <a:schemeClr val="tx1"/>
-                </a:solidFill>
-                <a:latin typeface="+mj-lt"/>
-                <a:ea typeface="+mj-ea"/>
-                <a:cs typeface="+mj-cs"/>
-              </a:defRPr>
-            </a:lvl1pPr>
-          </a:lstStyle>
+          <a:lstStyle/>
           <a:p>
             <a:pPr algn="l"/>
             <a:r>
-              <a:rPr lang="pt-BR" sz="2000" b="1" dirty="0" smtClean="0"/>
-              <a:t>Mensageria – Tela do </a:t>
-            </a:r>
-            <a:r>
-              <a:rPr lang="pt-BR" sz="2000" b="1" i="1" dirty="0" err="1" smtClean="0"/>
-              <a:t>RabbitMQ</a:t>
-            </a:r>
-            <a:r>
-              <a:rPr lang="pt-BR" sz="2000" b="1" dirty="0" smtClean="0"/>
-              <a:t> com a mensagem disparada pela aplicação</a:t>
-            </a:r>
-            <a:endParaRPr lang="pt-BR" sz="2000" b="1" dirty="0"/>
+              <a:rPr lang="pt-BR" sz="2200" b="1" dirty="0" smtClean="0">
+                <a:latin typeface="Arial Black" panose="020B0A04020102020204" pitchFamily="34" charset="0"/>
+              </a:rPr>
+              <a:t>Persistência</a:t>
+            </a:r>
+            <a:endParaRPr lang="pt-BR" sz="2200" b="1" dirty="0">
+              <a:latin typeface="Arial Black" panose="020B0A04020102020204" pitchFamily="34" charset="0"/>
+            </a:endParaRPr>
           </a:p>
         </p:txBody>
       </p:sp>
       <p:pic>
         <p:nvPicPr>
-          <p:cNvPr id="6" name="Imagem 5"/>
+          <p:cNvPr id="4" name="Imagem 3"/>
           <p:cNvPicPr>
             <a:picLocks noChangeAspect="1"/>
           </p:cNvPicPr>
@@ -4451,7 +4330,7 @@
       </p:pic>
       <p:pic>
         <p:nvPicPr>
-          <p:cNvPr id="7" name="Imagem 6"/>
+          <p:cNvPr id="5" name="Imagem 4"/>
           <p:cNvPicPr/>
           <p:nvPr/>
         </p:nvPicPr>
@@ -4461,10 +4340,10 @@
             <a:fillRect/>
           </a:stretch>
         </p:blipFill>
-        <p:spPr bwMode="auto">
-          <a:xfrm>
-            <a:off x="706416" y="1340768"/>
-            <a:ext cx="7898032" cy="4170197"/>
+        <p:spPr>
+          <a:xfrm>
+            <a:off x="899592" y="1124743"/>
+            <a:ext cx="7632848" cy="4386221"/>
           </a:xfrm>
           <a:prstGeom prst="rect">
             <a:avLst/>
@@ -4474,7 +4353,7 @@
     </p:spTree>
     <p:extLst>
       <p:ext uri="{BB962C8B-B14F-4D97-AF65-F5344CB8AC3E}">
-        <p14:creationId xmlns:p14="http://schemas.microsoft.com/office/powerpoint/2010/main" val="2804538622"/>
+        <p14:creationId xmlns:p14="http://schemas.microsoft.com/office/powerpoint/2010/main" val="3165927032"/>
       </p:ext>
     </p:extLst>
   </p:cSld>
@@ -4508,44 +4387,9 @@
           <a:chExt cx="0" cy="0"/>
         </a:xfrm>
       </p:grpSpPr>
-      <p:sp>
-        <p:nvSpPr>
-          <p:cNvPr id="2" name="Título 1"/>
-          <p:cNvSpPr>
-            <a:spLocks noGrp="1"/>
-          </p:cNvSpPr>
-          <p:nvPr>
-            <p:ph type="title"/>
-          </p:nvPr>
-        </p:nvSpPr>
-        <p:spPr>
-          <a:xfrm>
-            <a:off x="1305329" y="593762"/>
-            <a:ext cx="2114543" cy="720080"/>
-          </a:xfrm>
-        </p:spPr>
-        <p:txBody>
-          <a:bodyPr>
-            <a:normAutofit/>
-          </a:bodyPr>
-          <a:lstStyle/>
-          <a:p>
-            <a:pPr algn="l"/>
-            <a:r>
-              <a:rPr lang="pt-BR" sz="2200" b="1" dirty="0" smtClean="0">
-                <a:latin typeface="Arial Black" panose="020B0A04020102020204" pitchFamily="34" charset="0"/>
-              </a:rPr>
-              <a:t>Persistência</a:t>
-            </a:r>
-            <a:endParaRPr lang="pt-BR" sz="2200" b="1" dirty="0">
-              <a:latin typeface="Arial Black" panose="020B0A04020102020204" pitchFamily="34" charset="0"/>
-            </a:endParaRPr>
-          </a:p>
-        </p:txBody>
-      </p:sp>
       <p:pic>
         <p:nvPicPr>
-          <p:cNvPr id="4" name="Imagem 3"/>
+          <p:cNvPr id="6" name="Imagem 5"/>
           <p:cNvPicPr>
             <a:picLocks noChangeAspect="1"/>
           </p:cNvPicPr>
@@ -4575,84 +4419,195 @@
       </p:pic>
       <p:sp>
         <p:nvSpPr>
-          <p:cNvPr id="7" name="Espaço Reservado para Conteúdo 2"/>
-          <p:cNvSpPr>
-            <a:spLocks noGrp="1"/>
-          </p:cNvSpPr>
-          <p:nvPr>
-            <p:ph idx="1"/>
-          </p:nvPr>
-        </p:nvSpPr>
-        <p:spPr>
-          <a:xfrm>
-            <a:off x="827584" y="1268760"/>
-            <a:ext cx="7848872" cy="2016224"/>
-          </a:xfrm>
-        </p:spPr>
-        <p:txBody>
-          <a:bodyPr>
-            <a:normAutofit fontScale="92500" lnSpcReduction="20000"/>
+          <p:cNvPr id="8" name="CaixaDeTexto 7"/>
+          <p:cNvSpPr txBox="1"/>
+          <p:nvPr/>
+        </p:nvSpPr>
+        <p:spPr>
+          <a:xfrm>
+            <a:off x="518343" y="1794590"/>
+            <a:ext cx="8068801" cy="1938992"/>
+          </a:xfrm>
+          <a:prstGeom prst="rect">
+            <a:avLst/>
+          </a:prstGeom>
+          <a:noFill/>
+        </p:spPr>
+        <p:txBody>
+          <a:bodyPr wrap="square" rtlCol="0">
+            <a:spAutoFit/>
           </a:bodyPr>
           <a:lstStyle/>
           <a:p>
-            <a:pPr algn="just"/>
-            <a:r>
-              <a:rPr lang="pt-BR" sz="2000" i="1" dirty="0" smtClean="0"/>
-              <a:t>JPA </a:t>
-            </a:r>
-            <a:r>
-              <a:rPr lang="pt-BR" sz="2000" dirty="0" smtClean="0"/>
-              <a:t>com </a:t>
-            </a:r>
-            <a:r>
-              <a:rPr lang="pt-BR" sz="2000" i="1" dirty="0" err="1" smtClean="0"/>
-              <a:t>Annotations</a:t>
-            </a:r>
-            <a:r>
-              <a:rPr lang="pt-BR" sz="2000" dirty="0"/>
+            <a:pPr marL="342900" indent="-342900" algn="just">
+              <a:buFont typeface="Arial" panose="020B0604020202020204" pitchFamily="34" charset="0"/>
+              <a:buChar char="•"/>
+            </a:pPr>
+            <a:r>
+              <a:rPr lang="pt-BR" sz="2000" dirty="0" smtClean="0">
+                <a:latin typeface="Arial" panose="020B0604020202020204" pitchFamily="34" charset="0"/>
+                <a:cs typeface="Arial" panose="020B0604020202020204" pitchFamily="34" charset="0"/>
+              </a:rPr>
+              <a:t>Será utilizado um </a:t>
+            </a:r>
+            <a:r>
+              <a:rPr lang="pt-BR" sz="2000" i="1" dirty="0" smtClean="0">
+                <a:latin typeface="Arial" panose="020B0604020202020204" pitchFamily="34" charset="0"/>
+                <a:cs typeface="Arial" panose="020B0604020202020204" pitchFamily="34" charset="0"/>
+              </a:rPr>
+              <a:t>container</a:t>
+            </a:r>
+            <a:r>
+              <a:rPr lang="pt-BR" sz="2000" dirty="0" smtClean="0">
+                <a:latin typeface="Arial" panose="020B0604020202020204" pitchFamily="34" charset="0"/>
+                <a:cs typeface="Arial" panose="020B0604020202020204" pitchFamily="34" charset="0"/>
+              </a:rPr>
               <a:t> </a:t>
             </a:r>
             <a:r>
-              <a:rPr lang="pt-BR" sz="2000" dirty="0" smtClean="0"/>
-              <a:t>em detrimento de XML por apresentar maior facilidade de escrita além de ser mais legível</a:t>
-            </a:r>
-          </a:p>
-          <a:p>
-            <a:pPr algn="just"/>
-            <a:r>
-              <a:rPr lang="pt-BR" sz="2000" dirty="0" smtClean="0"/>
-              <a:t>A aplicação contém um arquivo </a:t>
-            </a:r>
-            <a:r>
-              <a:rPr lang="pt-BR" sz="2000" i="1" dirty="0" err="1" smtClean="0"/>
-              <a:t>import.sql</a:t>
-            </a:r>
-            <a:r>
-              <a:rPr lang="pt-BR" sz="2000" dirty="0" smtClean="0"/>
-              <a:t>, nele será contido toda a carga inicial da aplicação</a:t>
-            </a:r>
-          </a:p>
-          <a:p>
-            <a:pPr algn="just"/>
-            <a:r>
-              <a:rPr lang="pt-BR" sz="2000" dirty="0" smtClean="0"/>
-              <a:t>Facilidade de mudar de banco de dados sem necessariamente ter que reescrever toda a camada de persistência da aplicação</a:t>
-            </a:r>
-          </a:p>
-          <a:p>
-            <a:pPr algn="just"/>
-            <a:r>
-              <a:rPr lang="pt-BR" sz="2000" dirty="0" smtClean="0"/>
-              <a:t>MySQL Server versão 8</a:t>
-            </a:r>
-            <a:endParaRPr lang="pt-BR" sz="2000" dirty="0"/>
+              <a:rPr lang="pt-BR" sz="2000" i="1" dirty="0" err="1" smtClean="0">
+                <a:latin typeface="Arial" panose="020B0604020202020204" pitchFamily="34" charset="0"/>
+                <a:cs typeface="Arial" panose="020B0604020202020204" pitchFamily="34" charset="0"/>
+              </a:rPr>
+              <a:t>Docker</a:t>
+            </a:r>
+            <a:r>
+              <a:rPr lang="pt-BR" sz="2000" dirty="0" smtClean="0">
+                <a:latin typeface="Arial" panose="020B0604020202020204" pitchFamily="34" charset="0"/>
+                <a:cs typeface="Arial" panose="020B0604020202020204" pitchFamily="34" charset="0"/>
+              </a:rPr>
+              <a:t> rodando com </a:t>
+            </a:r>
+            <a:r>
+              <a:rPr lang="pt-BR" sz="2000" dirty="0" err="1" smtClean="0">
+                <a:latin typeface="Arial" panose="020B0604020202020204" pitchFamily="34" charset="0"/>
+                <a:cs typeface="Arial" panose="020B0604020202020204" pitchFamily="34" charset="0"/>
+              </a:rPr>
+              <a:t>RabbitMQ</a:t>
+            </a:r>
+            <a:endParaRPr lang="pt-BR" sz="2000" dirty="0" smtClean="0">
+              <a:latin typeface="Arial" panose="020B0604020202020204" pitchFamily="34" charset="0"/>
+              <a:cs typeface="Arial" panose="020B0604020202020204" pitchFamily="34" charset="0"/>
+            </a:endParaRPr>
+          </a:p>
+          <a:p>
+            <a:pPr marL="342900" indent="-342900" algn="just">
+              <a:buFont typeface="Arial" panose="020B0604020202020204" pitchFamily="34" charset="0"/>
+              <a:buChar char="•"/>
+            </a:pPr>
+            <a:r>
+              <a:rPr lang="pt-BR" sz="2000" dirty="0" smtClean="0">
+                <a:latin typeface="Arial" panose="020B0604020202020204" pitchFamily="34" charset="0"/>
+                <a:cs typeface="Arial" panose="020B0604020202020204" pitchFamily="34" charset="0"/>
+              </a:rPr>
+              <a:t>Facilidade da aplicação se comunicar com o </a:t>
+            </a:r>
+            <a:r>
+              <a:rPr lang="pt-BR" sz="2000" dirty="0" err="1" smtClean="0">
+                <a:latin typeface="Arial" panose="020B0604020202020204" pitchFamily="34" charset="0"/>
+                <a:cs typeface="Arial" panose="020B0604020202020204" pitchFamily="34" charset="0"/>
+              </a:rPr>
+              <a:t>RabbitMQ</a:t>
+            </a:r>
+            <a:r>
+              <a:rPr lang="pt-BR" sz="2000" dirty="0" smtClean="0">
+                <a:latin typeface="Arial" panose="020B0604020202020204" pitchFamily="34" charset="0"/>
+                <a:cs typeface="Arial" panose="020B0604020202020204" pitchFamily="34" charset="0"/>
+              </a:rPr>
+              <a:t>, como é demostrado na classe Java a ser mostrada</a:t>
+            </a:r>
+          </a:p>
+          <a:p>
+            <a:pPr marL="342900" indent="-342900" algn="just">
+              <a:buFont typeface="Arial" panose="020B0604020202020204" pitchFamily="34" charset="0"/>
+              <a:buChar char="•"/>
+            </a:pPr>
+            <a:r>
+              <a:rPr lang="pt-BR" sz="2000" dirty="0" smtClean="0">
+                <a:latin typeface="Arial" panose="020B0604020202020204" pitchFamily="34" charset="0"/>
+                <a:cs typeface="Arial" panose="020B0604020202020204" pitchFamily="34" charset="0"/>
+              </a:rPr>
+              <a:t>No site da ferramenta é disponibilizada uma imagem, bastando apenas um comando </a:t>
+            </a:r>
+            <a:r>
+              <a:rPr lang="pt-BR" sz="2000" i="1" dirty="0" err="1" smtClean="0">
+                <a:latin typeface="Arial" panose="020B0604020202020204" pitchFamily="34" charset="0"/>
+                <a:cs typeface="Arial" panose="020B0604020202020204" pitchFamily="34" charset="0"/>
+              </a:rPr>
+              <a:t>docker</a:t>
+            </a:r>
+            <a:r>
+              <a:rPr lang="pt-BR" sz="2000" i="1" dirty="0" smtClean="0">
+                <a:latin typeface="Arial" panose="020B0604020202020204" pitchFamily="34" charset="0"/>
+                <a:cs typeface="Arial" panose="020B0604020202020204" pitchFamily="34" charset="0"/>
+              </a:rPr>
+              <a:t> </a:t>
+            </a:r>
+            <a:r>
+              <a:rPr lang="pt-BR" sz="2000" i="1" dirty="0" err="1" smtClean="0">
+                <a:latin typeface="Arial" panose="020B0604020202020204" pitchFamily="34" charset="0"/>
+                <a:cs typeface="Arial" panose="020B0604020202020204" pitchFamily="34" charset="0"/>
+              </a:rPr>
+              <a:t>pull</a:t>
+            </a:r>
+            <a:r>
+              <a:rPr lang="pt-BR" sz="2000" dirty="0" smtClean="0">
+                <a:latin typeface="Arial" panose="020B0604020202020204" pitchFamily="34" charset="0"/>
+                <a:cs typeface="Arial" panose="020B0604020202020204" pitchFamily="34" charset="0"/>
+              </a:rPr>
+              <a:t> para sua instalação</a:t>
+            </a:r>
+          </a:p>
+          <a:p>
+            <a:pPr marL="342900" indent="-342900" algn="just">
+              <a:buFont typeface="Arial" panose="020B0604020202020204" pitchFamily="34" charset="0"/>
+              <a:buChar char="•"/>
+            </a:pPr>
+            <a:r>
+              <a:rPr lang="pt-BR" sz="2000" dirty="0" smtClean="0">
+                <a:latin typeface="Arial" panose="020B0604020202020204" pitchFamily="34" charset="0"/>
+                <a:cs typeface="Arial" panose="020B0604020202020204" pitchFamily="34" charset="0"/>
+              </a:rPr>
+              <a:t>Permite lidar com o tráfego e também com filas</a:t>
+            </a:r>
+          </a:p>
+        </p:txBody>
+      </p:sp>
+      <p:sp>
+        <p:nvSpPr>
+          <p:cNvPr id="2" name="Retângulo 1"/>
+          <p:cNvSpPr/>
+          <p:nvPr/>
+        </p:nvSpPr>
+        <p:spPr>
+          <a:xfrm>
+            <a:off x="549362" y="692696"/>
+            <a:ext cx="7839061" cy="646331"/>
+          </a:xfrm>
+          <a:prstGeom prst="rect">
+            <a:avLst/>
+          </a:prstGeom>
+        </p:spPr>
+        <p:txBody>
+          <a:bodyPr wrap="square">
+            <a:spAutoFit/>
+          </a:bodyPr>
+          <a:lstStyle/>
+          <a:p>
+            <a:r>
+              <a:rPr lang="pt-BR" b="1" dirty="0" smtClean="0">
+                <a:latin typeface="Arial Black" panose="020B0A04020102020204" pitchFamily="34" charset="0"/>
+              </a:rPr>
+              <a:t>2. Interoperabilidade – O sistema deverá ter um mecanismo de comunicação com terceiros </a:t>
+            </a:r>
+            <a:endParaRPr lang="pt-BR" dirty="0"/>
           </a:p>
         </p:txBody>
       </p:sp>
     </p:spTree>
     <p:extLst>
       <p:ext uri="{BB962C8B-B14F-4D97-AF65-F5344CB8AC3E}">
-        <p14:creationId xmlns:p14="http://schemas.microsoft.com/office/powerpoint/2010/main" val="2807216151"/>
+        <p14:creationId xmlns:p14="http://schemas.microsoft.com/office/powerpoint/2010/main" val="3837667997"/>
       </p:ext>
     </p:extLst>
   </p:cSld>
@@ -4688,42 +4643,54 @@
       </p:grpSpPr>
       <p:sp>
         <p:nvSpPr>
-          <p:cNvPr id="2" name="Título 1"/>
-          <p:cNvSpPr>
-            <a:spLocks noGrp="1"/>
+          <p:cNvPr id="5" name="Título 1"/>
+          <p:cNvSpPr txBox="1">
+            <a:spLocks/>
           </p:cNvSpPr>
-          <p:nvPr>
-            <p:ph type="title"/>
-          </p:nvPr>
-        </p:nvSpPr>
-        <p:spPr>
-          <a:xfrm>
-            <a:off x="1305329" y="593762"/>
-            <a:ext cx="2114543" cy="720080"/>
-          </a:xfrm>
-        </p:spPr>
-        <p:txBody>
-          <a:bodyPr>
+          <p:nvPr/>
+        </p:nvSpPr>
+        <p:spPr>
+          <a:xfrm>
+            <a:off x="611560" y="476672"/>
+            <a:ext cx="8193596" cy="1143000"/>
+          </a:xfrm>
+          <a:prstGeom prst="rect">
+            <a:avLst/>
+          </a:prstGeom>
+        </p:spPr>
+        <p:txBody>
+          <a:bodyPr vert="horz" lIns="91440" tIns="45720" rIns="91440" bIns="45720" rtlCol="0" anchor="ctr">
             <a:normAutofit/>
           </a:bodyPr>
-          <a:lstStyle/>
+          <a:lstStyle>
+            <a:lvl1pPr algn="ctr" defTabSz="914400" rtl="0" eaLnBrk="1" latinLnBrk="0" hangingPunct="1">
+              <a:spcBef>
+                <a:spcPct val="0"/>
+              </a:spcBef>
+              <a:buNone/>
+              <a:defRPr sz="4400" kern="1200">
+                <a:solidFill>
+                  <a:schemeClr val="tx1"/>
+                </a:solidFill>
+                <a:latin typeface="+mj-lt"/>
+                <a:ea typeface="+mj-ea"/>
+                <a:cs typeface="+mj-cs"/>
+              </a:defRPr>
+            </a:lvl1pPr>
+          </a:lstStyle>
           <a:p>
             <a:pPr algn="l"/>
             <a:r>
-              <a:rPr lang="pt-BR" sz="2200" b="1" dirty="0" smtClean="0">
-                <a:latin typeface="Arial Black" panose="020B0A04020102020204" pitchFamily="34" charset="0"/>
-              </a:rPr>
-              <a:t>Persistência</a:t>
-            </a:r>
-            <a:endParaRPr lang="pt-BR" sz="2200" b="1" dirty="0">
-              <a:latin typeface="Arial Black" panose="020B0A04020102020204" pitchFamily="34" charset="0"/>
-            </a:endParaRPr>
+              <a:rPr lang="pt-BR" sz="2000" b="1" dirty="0" smtClean="0"/>
+              <a:t>Código que manda  a mensagem de teste</a:t>
+            </a:r>
+            <a:endParaRPr lang="pt-BR" sz="2000" b="1" dirty="0"/>
           </a:p>
         </p:txBody>
       </p:sp>
       <p:pic>
         <p:nvPicPr>
-          <p:cNvPr id="4" name="Imagem 3"/>
+          <p:cNvPr id="6" name="Imagem 5"/>
           <p:cNvPicPr>
             <a:picLocks noChangeAspect="1"/>
           </p:cNvPicPr>
@@ -4753,8 +4720,10 @@
       </p:pic>
       <p:pic>
         <p:nvPicPr>
-          <p:cNvPr id="6" name="Imagem 5"/>
-          <p:cNvPicPr/>
+          <p:cNvPr id="1026" name="Picture 2"/>
+          <p:cNvPicPr>
+            <a:picLocks noChangeAspect="1" noChangeArrowheads="1"/>
+          </p:cNvPicPr>
           <p:nvPr/>
         </p:nvPicPr>
         <p:blipFill>
@@ -4765,24 +4734,48 @@
               </a:ext>
             </a:extLst>
           </a:blip>
+          <a:srcRect/>
           <a:stretch>
             <a:fillRect/>
           </a:stretch>
         </p:blipFill>
-        <p:spPr>
-          <a:xfrm>
-            <a:off x="1305329" y="1124744"/>
-            <a:ext cx="6074983" cy="4608511"/>
+        <p:spPr bwMode="auto">
+          <a:xfrm>
+            <a:off x="611560" y="1270673"/>
+            <a:ext cx="7920880" cy="4286741"/>
           </a:xfrm>
           <a:prstGeom prst="rect">
             <a:avLst/>
           </a:prstGeom>
+          <a:noFill/>
+          <a:ln>
+            <a:noFill/>
+          </a:ln>
+          <a:extLst>
+            <a:ext uri="{909E8E84-426E-40DD-AFC4-6F175D3DCCD1}">
+              <a14:hiddenFill xmlns:a14="http://schemas.microsoft.com/office/drawing/2010/main">
+                <a:solidFill>
+                  <a:schemeClr val="accent1"/>
+                </a:solidFill>
+              </a14:hiddenFill>
+            </a:ext>
+            <a:ext uri="{91240B29-F687-4F45-9708-019B960494DF}">
+              <a14:hiddenLine xmlns:a14="http://schemas.microsoft.com/office/drawing/2010/main" w="9525">
+                <a:solidFill>
+                  <a:schemeClr val="tx1"/>
+                </a:solidFill>
+                <a:miter lim="800000"/>
+                <a:headEnd/>
+                <a:tailEnd/>
+              </a14:hiddenLine>
+            </a:ext>
+          </a:extLst>
         </p:spPr>
       </p:pic>
     </p:spTree>
     <p:extLst>
       <p:ext uri="{BB962C8B-B14F-4D97-AF65-F5344CB8AC3E}">
-        <p14:creationId xmlns:p14="http://schemas.microsoft.com/office/powerpoint/2010/main" val="900490011"/>
+        <p14:creationId xmlns:p14="http://schemas.microsoft.com/office/powerpoint/2010/main" val="2392084050"/>
       </p:ext>
     </p:extLst>
   </p:cSld>
@@ -4976,42 +4969,62 @@
       </p:grpSpPr>
       <p:sp>
         <p:nvSpPr>
-          <p:cNvPr id="2" name="Título 1"/>
-          <p:cNvSpPr>
-            <a:spLocks noGrp="1"/>
+          <p:cNvPr id="5" name="Título 1"/>
+          <p:cNvSpPr txBox="1">
+            <a:spLocks/>
           </p:cNvSpPr>
-          <p:nvPr>
-            <p:ph type="title"/>
-          </p:nvPr>
-        </p:nvSpPr>
-        <p:spPr>
-          <a:xfrm>
-            <a:off x="827584" y="620688"/>
-            <a:ext cx="2114543" cy="720080"/>
-          </a:xfrm>
-        </p:spPr>
-        <p:txBody>
-          <a:bodyPr>
+          <p:nvPr/>
+        </p:nvSpPr>
+        <p:spPr>
+          <a:xfrm>
+            <a:off x="611560" y="476672"/>
+            <a:ext cx="8193596" cy="1143000"/>
+          </a:xfrm>
+          <a:prstGeom prst="rect">
+            <a:avLst/>
+          </a:prstGeom>
+        </p:spPr>
+        <p:txBody>
+          <a:bodyPr vert="horz" lIns="91440" tIns="45720" rIns="91440" bIns="45720" rtlCol="0" anchor="ctr">
             <a:normAutofit/>
           </a:bodyPr>
-          <a:lstStyle/>
+          <a:lstStyle>
+            <a:lvl1pPr algn="ctr" defTabSz="914400" rtl="0" eaLnBrk="1" latinLnBrk="0" hangingPunct="1">
+              <a:spcBef>
+                <a:spcPct val="0"/>
+              </a:spcBef>
+              <a:buNone/>
+              <a:defRPr sz="4400" kern="1200">
+                <a:solidFill>
+                  <a:schemeClr val="tx1"/>
+                </a:solidFill>
+                <a:latin typeface="+mj-lt"/>
+                <a:ea typeface="+mj-ea"/>
+                <a:cs typeface="+mj-cs"/>
+              </a:defRPr>
+            </a:lvl1pPr>
+          </a:lstStyle>
           <a:p>
             <a:pPr algn="l"/>
             <a:r>
-              <a:rPr lang="pt-BR" sz="2200" b="1" dirty="0" smtClean="0">
-                <a:latin typeface="Arial Black" panose="020B0A04020102020204" pitchFamily="34" charset="0"/>
-              </a:rPr>
-              <a:t>Persistência</a:t>
-            </a:r>
-            <a:endParaRPr lang="pt-BR" sz="2200" b="1" dirty="0">
-              <a:latin typeface="Arial Black" panose="020B0A04020102020204" pitchFamily="34" charset="0"/>
-            </a:endParaRPr>
+              <a:rPr lang="pt-BR" sz="2000" b="1" dirty="0" smtClean="0"/>
+              <a:t>Mensageria – Tela do </a:t>
+            </a:r>
+            <a:r>
+              <a:rPr lang="pt-BR" sz="2000" b="1" i="1" dirty="0" err="1" smtClean="0"/>
+              <a:t>RabbitMQ</a:t>
+            </a:r>
+            <a:r>
+              <a:rPr lang="pt-BR" sz="2000" b="1" dirty="0" smtClean="0"/>
+              <a:t> com a mensagem disparada pela aplicação</a:t>
+            </a:r>
+            <a:endParaRPr lang="pt-BR" sz="2000" b="1" dirty="0"/>
           </a:p>
         </p:txBody>
       </p:sp>
       <p:pic>
         <p:nvPicPr>
-          <p:cNvPr id="4" name="Imagem 3"/>
+          <p:cNvPr id="6" name="Imagem 5"/>
           <p:cNvPicPr>
             <a:picLocks noChangeAspect="1"/>
           </p:cNvPicPr>
@@ -5041,7 +5054,7 @@
       </p:pic>
       <p:pic>
         <p:nvPicPr>
-          <p:cNvPr id="5" name="Imagem 4"/>
+          <p:cNvPr id="7" name="Imagem 6"/>
           <p:cNvPicPr/>
           <p:nvPr/>
         </p:nvPicPr>
@@ -5051,10 +5064,10 @@
             <a:fillRect/>
           </a:stretch>
         </p:blipFill>
-        <p:spPr>
-          <a:xfrm>
-            <a:off x="899592" y="1124743"/>
-            <a:ext cx="7632848" cy="4386221"/>
+        <p:spPr bwMode="auto">
+          <a:xfrm>
+            <a:off x="706416" y="1340768"/>
+            <a:ext cx="7898032" cy="4170197"/>
           </a:xfrm>
           <a:prstGeom prst="rect">
             <a:avLst/>
@@ -5064,7 +5077,7 @@
     </p:spTree>
     <p:extLst>
       <p:ext uri="{BB962C8B-B14F-4D97-AF65-F5344CB8AC3E}">
-        <p14:creationId xmlns:p14="http://schemas.microsoft.com/office/powerpoint/2010/main" val="3165927032"/>
+        <p14:creationId xmlns:p14="http://schemas.microsoft.com/office/powerpoint/2010/main" val="2804538622"/>
       </p:ext>
     </p:extLst>
   </p:cSld>
@@ -5130,6 +5143,1641 @@
       </p:pic>
       <p:sp>
         <p:nvSpPr>
+          <p:cNvPr id="5" name="CaixaDeTexto 4"/>
+          <p:cNvSpPr txBox="1"/>
+          <p:nvPr/>
+        </p:nvSpPr>
+        <p:spPr>
+          <a:xfrm>
+            <a:off x="518343" y="1794590"/>
+            <a:ext cx="8068801" cy="1938992"/>
+          </a:xfrm>
+          <a:prstGeom prst="rect">
+            <a:avLst/>
+          </a:prstGeom>
+          <a:noFill/>
+        </p:spPr>
+        <p:txBody>
+          <a:bodyPr wrap="square" rtlCol="0">
+            <a:spAutoFit/>
+          </a:bodyPr>
+          <a:lstStyle/>
+          <a:p>
+            <a:pPr marL="342900" indent="-342900" algn="just">
+              <a:buFont typeface="Arial" panose="020B0604020202020204" pitchFamily="34" charset="0"/>
+              <a:buChar char="•"/>
+            </a:pPr>
+            <a:r>
+              <a:rPr lang="pt-BR" sz="2000" dirty="0" smtClean="0">
+                <a:latin typeface="Arial" panose="020B0604020202020204" pitchFamily="34" charset="0"/>
+                <a:cs typeface="Arial" panose="020B0604020202020204" pitchFamily="34" charset="0"/>
+              </a:rPr>
+              <a:t>Para garantir que o código desenvolvido terá aderência aos padrões de qualidade estabelecidos, será utilizado a ferramenta </a:t>
+            </a:r>
+            <a:r>
+              <a:rPr lang="pt-BR" sz="2000" i="1" dirty="0" smtClean="0">
+                <a:latin typeface="Arial" panose="020B0604020202020204" pitchFamily="34" charset="0"/>
+                <a:cs typeface="Arial" panose="020B0604020202020204" pitchFamily="34" charset="0"/>
+              </a:rPr>
+              <a:t>Sonar</a:t>
+            </a:r>
+            <a:endParaRPr lang="pt-BR" sz="2000" dirty="0" smtClean="0">
+              <a:latin typeface="Arial" panose="020B0604020202020204" pitchFamily="34" charset="0"/>
+              <a:cs typeface="Arial" panose="020B0604020202020204" pitchFamily="34" charset="0"/>
+            </a:endParaRPr>
+          </a:p>
+          <a:p>
+            <a:pPr marL="342900" indent="-342900" algn="just">
+              <a:buFont typeface="Arial" panose="020B0604020202020204" pitchFamily="34" charset="0"/>
+              <a:buChar char="•"/>
+            </a:pPr>
+            <a:r>
+              <a:rPr lang="pt-BR" sz="2000" dirty="0" smtClean="0">
+                <a:latin typeface="Arial" panose="020B0604020202020204" pitchFamily="34" charset="0"/>
+                <a:cs typeface="Arial" panose="020B0604020202020204" pitchFamily="34" charset="0"/>
+              </a:rPr>
+              <a:t>Será utilizado o </a:t>
+            </a:r>
+            <a:r>
+              <a:rPr lang="pt-BR" sz="2000" dirty="0" err="1" smtClean="0">
+                <a:latin typeface="Arial" panose="020B0604020202020204" pitchFamily="34" charset="0"/>
+                <a:cs typeface="Arial" panose="020B0604020202020204" pitchFamily="34" charset="0"/>
+              </a:rPr>
+              <a:t>Jenkins</a:t>
+            </a:r>
+            <a:r>
+              <a:rPr lang="pt-BR" sz="2000" dirty="0" smtClean="0">
+                <a:latin typeface="Arial" panose="020B0604020202020204" pitchFamily="34" charset="0"/>
+                <a:cs typeface="Arial" panose="020B0604020202020204" pitchFamily="34" charset="0"/>
+              </a:rPr>
+              <a:t> para o </a:t>
+            </a:r>
+            <a:r>
+              <a:rPr lang="pt-BR" sz="2000" i="1" dirty="0" err="1" smtClean="0">
+                <a:latin typeface="Arial" panose="020B0604020202020204" pitchFamily="34" charset="0"/>
+                <a:cs typeface="Arial" panose="020B0604020202020204" pitchFamily="34" charset="0"/>
+              </a:rPr>
+              <a:t>deploy</a:t>
+            </a:r>
+            <a:endParaRPr lang="pt-BR" sz="2000" dirty="0" smtClean="0">
+              <a:latin typeface="Arial" panose="020B0604020202020204" pitchFamily="34" charset="0"/>
+              <a:cs typeface="Arial" panose="020B0604020202020204" pitchFamily="34" charset="0"/>
+            </a:endParaRPr>
+          </a:p>
+          <a:p>
+            <a:pPr marL="342900" indent="-342900" algn="just">
+              <a:buFont typeface="Arial" panose="020B0604020202020204" pitchFamily="34" charset="0"/>
+              <a:buChar char="•"/>
+            </a:pPr>
+            <a:r>
+              <a:rPr lang="pt-BR" sz="2000" dirty="0" smtClean="0">
+                <a:latin typeface="Arial" panose="020B0604020202020204" pitchFamily="34" charset="0"/>
+                <a:cs typeface="Arial" panose="020B0604020202020204" pitchFamily="34" charset="0"/>
+              </a:rPr>
+              <a:t>Sistema deverá ser desenvolvido observando as boas práticas de desenvolvimento</a:t>
+            </a:r>
+            <a:endParaRPr lang="pt-BR" sz="2000" dirty="0" smtClean="0">
+              <a:latin typeface="Arial" panose="020B0604020202020204" pitchFamily="34" charset="0"/>
+              <a:cs typeface="Arial" panose="020B0604020202020204" pitchFamily="34" charset="0"/>
+            </a:endParaRPr>
+          </a:p>
+        </p:txBody>
+      </p:sp>
+      <p:sp>
+        <p:nvSpPr>
+          <p:cNvPr id="6" name="Retângulo 5"/>
+          <p:cNvSpPr/>
+          <p:nvPr/>
+        </p:nvSpPr>
+        <p:spPr>
+          <a:xfrm>
+            <a:off x="549362" y="692696"/>
+            <a:ext cx="7839061" cy="646331"/>
+          </a:xfrm>
+          <a:prstGeom prst="rect">
+            <a:avLst/>
+          </a:prstGeom>
+        </p:spPr>
+        <p:txBody>
+          <a:bodyPr wrap="square">
+            <a:spAutoFit/>
+          </a:bodyPr>
+          <a:lstStyle/>
+          <a:p>
+            <a:pPr algn="just"/>
+            <a:r>
+              <a:rPr lang="pt-BR" b="1" dirty="0">
+                <a:latin typeface="Arial Black" panose="020B0A04020102020204" pitchFamily="34" charset="0"/>
+              </a:rPr>
+              <a:t>3</a:t>
+            </a:r>
+            <a:r>
+              <a:rPr lang="pt-BR" b="1" dirty="0" smtClean="0">
+                <a:latin typeface="Arial Black" panose="020B0A04020102020204" pitchFamily="34" charset="0"/>
+              </a:rPr>
+              <a:t>. Manutenabilidade – O sistema deverá ser fácil de se ajustar ou expandir</a:t>
+            </a:r>
+            <a:endParaRPr lang="pt-BR" dirty="0"/>
+          </a:p>
+        </p:txBody>
+      </p:sp>
+    </p:spTree>
+    <p:extLst>
+      <p:ext uri="{BB962C8B-B14F-4D97-AF65-F5344CB8AC3E}">
+        <p14:creationId xmlns:p14="http://schemas.microsoft.com/office/powerpoint/2010/main" val="2108787285"/>
+      </p:ext>
+    </p:extLst>
+  </p:cSld>
+  <p:clrMapOvr>
+    <a:masterClrMapping/>
+  </p:clrMapOvr>
+  <p:timing>
+    <p:tnLst>
+      <p:par>
+        <p:cTn id="1" dur="indefinite" restart="never" nodeType="tmRoot"/>
+      </p:par>
+    </p:tnLst>
+  </p:timing>
+</p:sld>
+</file>
+
+<file path=ppt/slides/slide22.xml><?xml version="1.0" encoding="utf-8"?>
+<p:sld xmlns:a="http://schemas.openxmlformats.org/drawingml/2006/main" xmlns:r="http://schemas.openxmlformats.org/officeDocument/2006/relationships" xmlns:p="http://schemas.openxmlformats.org/presentationml/2006/main">
+  <p:cSld>
+    <p:spTree>
+      <p:nvGrpSpPr>
+        <p:cNvPr id="1" name=""/>
+        <p:cNvGrpSpPr/>
+        <p:nvPr/>
+      </p:nvGrpSpPr>
+      <p:grpSpPr>
+        <a:xfrm>
+          <a:off x="0" y="0"/>
+          <a:ext cx="0" cy="0"/>
+          <a:chOff x="0" y="0"/>
+          <a:chExt cx="0" cy="0"/>
+        </a:xfrm>
+      </p:grpSpPr>
+      <p:pic>
+        <p:nvPicPr>
+          <p:cNvPr id="4" name="Imagem 3"/>
+          <p:cNvPicPr>
+            <a:picLocks noChangeAspect="1"/>
+          </p:cNvPicPr>
+          <p:nvPr/>
+        </p:nvPicPr>
+        <p:blipFill>
+          <a:blip r:embed="rId2" cstate="print">
+            <a:extLst>
+              <a:ext uri="{28A0092B-C50C-407E-A947-70E740481C1C}">
+                <a14:useLocalDpi xmlns:a14="http://schemas.microsoft.com/office/drawing/2010/main" val="0"/>
+              </a:ext>
+            </a:extLst>
+          </a:blip>
+          <a:stretch>
+            <a:fillRect/>
+          </a:stretch>
+        </p:blipFill>
+        <p:spPr>
+          <a:xfrm>
+            <a:off x="107504" y="5510965"/>
+            <a:ext cx="1197825" cy="1216838"/>
+          </a:xfrm>
+          <a:prstGeom prst="rect">
+            <a:avLst/>
+          </a:prstGeom>
+        </p:spPr>
+      </p:pic>
+      <p:sp>
+        <p:nvSpPr>
+          <p:cNvPr id="6" name="Retângulo 5"/>
+          <p:cNvSpPr/>
+          <p:nvPr/>
+        </p:nvSpPr>
+        <p:spPr>
+          <a:xfrm>
+            <a:off x="549362" y="692696"/>
+            <a:ext cx="7839061" cy="646331"/>
+          </a:xfrm>
+          <a:prstGeom prst="rect">
+            <a:avLst/>
+          </a:prstGeom>
+        </p:spPr>
+        <p:txBody>
+          <a:bodyPr wrap="square">
+            <a:spAutoFit/>
+          </a:bodyPr>
+          <a:lstStyle/>
+          <a:p>
+            <a:pPr algn="just"/>
+            <a:r>
+              <a:rPr lang="pt-BR" b="1" dirty="0">
+                <a:latin typeface="Arial Black" panose="020B0A04020102020204" pitchFamily="34" charset="0"/>
+              </a:rPr>
+              <a:t>4</a:t>
+            </a:r>
+            <a:r>
+              <a:rPr lang="pt-BR" b="1" dirty="0" smtClean="0">
+                <a:latin typeface="Arial Black" panose="020B0A04020102020204" pitchFamily="34" charset="0"/>
+              </a:rPr>
+              <a:t>. Portabilidade – O sistema deverá ser acessível de diferentes plataformas</a:t>
+            </a:r>
+            <a:endParaRPr lang="pt-BR" dirty="0"/>
+          </a:p>
+        </p:txBody>
+      </p:sp>
+      <p:sp>
+        <p:nvSpPr>
+          <p:cNvPr id="7" name="CaixaDeTexto 6"/>
+          <p:cNvSpPr txBox="1"/>
+          <p:nvPr/>
+        </p:nvSpPr>
+        <p:spPr>
+          <a:xfrm>
+            <a:off x="518343" y="1794590"/>
+            <a:ext cx="8068801" cy="1938992"/>
+          </a:xfrm>
+          <a:prstGeom prst="rect">
+            <a:avLst/>
+          </a:prstGeom>
+          <a:noFill/>
+        </p:spPr>
+        <p:txBody>
+          <a:bodyPr wrap="square" rtlCol="0">
+            <a:spAutoFit/>
+          </a:bodyPr>
+          <a:lstStyle/>
+          <a:p>
+            <a:pPr marL="342900" indent="-342900" algn="just">
+              <a:buFont typeface="Arial" panose="020B0604020202020204" pitchFamily="34" charset="0"/>
+              <a:buChar char="•"/>
+            </a:pPr>
+            <a:r>
+              <a:rPr lang="pt-BR" sz="2000" dirty="0" smtClean="0">
+                <a:latin typeface="Arial" panose="020B0604020202020204" pitchFamily="34" charset="0"/>
+                <a:cs typeface="Arial" panose="020B0604020202020204" pitchFamily="34" charset="0"/>
+              </a:rPr>
+              <a:t>O sistema deverá ser acessível a partir de um celular ou </a:t>
+            </a:r>
+            <a:r>
+              <a:rPr lang="pt-BR" sz="2000" i="1" dirty="0" err="1" smtClean="0">
+                <a:latin typeface="Arial" panose="020B0604020202020204" pitchFamily="34" charset="0"/>
+                <a:cs typeface="Arial" panose="020B0604020202020204" pitchFamily="34" charset="0"/>
+              </a:rPr>
+              <a:t>tablet</a:t>
+            </a:r>
+            <a:r>
+              <a:rPr lang="pt-BR" sz="2000" dirty="0" smtClean="0">
+                <a:latin typeface="Arial" panose="020B0604020202020204" pitchFamily="34" charset="0"/>
+                <a:cs typeface="Arial" panose="020B0604020202020204" pitchFamily="34" charset="0"/>
+              </a:rPr>
+              <a:t> sem que isso prejudique a usabilidade</a:t>
+            </a:r>
+          </a:p>
+          <a:p>
+            <a:pPr marL="342900" indent="-342900" algn="just">
+              <a:buFont typeface="Arial" panose="020B0604020202020204" pitchFamily="34" charset="0"/>
+              <a:buChar char="•"/>
+            </a:pPr>
+            <a:r>
+              <a:rPr lang="pt-BR" sz="2000" dirty="0" smtClean="0">
+                <a:latin typeface="Arial" panose="020B0604020202020204" pitchFamily="34" charset="0"/>
+                <a:cs typeface="Arial" panose="020B0604020202020204" pitchFamily="34" charset="0"/>
+              </a:rPr>
+              <a:t>A aplicação utiliza em seu </a:t>
+            </a:r>
+            <a:r>
+              <a:rPr lang="pt-BR" sz="2000" i="1" dirty="0" err="1" smtClean="0">
+                <a:latin typeface="Arial" panose="020B0604020202020204" pitchFamily="34" charset="0"/>
+                <a:cs typeface="Arial" panose="020B0604020202020204" pitchFamily="34" charset="0"/>
+              </a:rPr>
+              <a:t>frontend</a:t>
+            </a:r>
+            <a:r>
+              <a:rPr lang="pt-BR" sz="2000" dirty="0" smtClean="0">
+                <a:latin typeface="Arial" panose="020B0604020202020204" pitchFamily="34" charset="0"/>
+                <a:cs typeface="Arial" panose="020B0604020202020204" pitchFamily="34" charset="0"/>
+              </a:rPr>
+              <a:t> Angular em sua versão mais recente</a:t>
+            </a:r>
+          </a:p>
+          <a:p>
+            <a:pPr marL="342900" indent="-342900" algn="just">
+              <a:buFont typeface="Arial" panose="020B0604020202020204" pitchFamily="34" charset="0"/>
+              <a:buChar char="•"/>
+            </a:pPr>
+            <a:r>
+              <a:rPr lang="pt-BR" sz="2000" dirty="0" err="1" smtClean="0">
+                <a:latin typeface="Arial" panose="020B0604020202020204" pitchFamily="34" charset="0"/>
+                <a:cs typeface="Arial" panose="020B0604020202020204" pitchFamily="34" charset="0"/>
+              </a:rPr>
+              <a:t>Bootstrap</a:t>
+            </a:r>
+            <a:endParaRPr lang="pt-BR" sz="2000" dirty="0">
+              <a:latin typeface="Arial" panose="020B0604020202020204" pitchFamily="34" charset="0"/>
+              <a:cs typeface="Arial" panose="020B0604020202020204" pitchFamily="34" charset="0"/>
+            </a:endParaRPr>
+          </a:p>
+          <a:p>
+            <a:pPr marL="342900" indent="-342900" algn="just">
+              <a:buFont typeface="Arial" panose="020B0604020202020204" pitchFamily="34" charset="0"/>
+              <a:buChar char="•"/>
+            </a:pPr>
+            <a:r>
+              <a:rPr lang="pt-BR" sz="2000" dirty="0" smtClean="0">
+                <a:latin typeface="Arial" panose="020B0604020202020204" pitchFamily="34" charset="0"/>
+                <a:cs typeface="Arial" panose="020B0604020202020204" pitchFamily="34" charset="0"/>
+              </a:rPr>
+              <a:t>Angular Material</a:t>
+            </a:r>
+            <a:endParaRPr lang="pt-BR" sz="2000" dirty="0" smtClean="0">
+              <a:latin typeface="Arial" panose="020B0604020202020204" pitchFamily="34" charset="0"/>
+              <a:cs typeface="Arial" panose="020B0604020202020204" pitchFamily="34" charset="0"/>
+            </a:endParaRPr>
+          </a:p>
+        </p:txBody>
+      </p:sp>
+    </p:spTree>
+    <p:extLst>
+      <p:ext uri="{BB962C8B-B14F-4D97-AF65-F5344CB8AC3E}">
+        <p14:creationId xmlns:p14="http://schemas.microsoft.com/office/powerpoint/2010/main" val="1264772585"/>
+      </p:ext>
+    </p:extLst>
+  </p:cSld>
+  <p:clrMapOvr>
+    <a:masterClrMapping/>
+  </p:clrMapOvr>
+  <p:timing>
+    <p:tnLst>
+      <p:par>
+        <p:cTn id="1" dur="indefinite" restart="never" nodeType="tmRoot"/>
+      </p:par>
+    </p:tnLst>
+  </p:timing>
+</p:sld>
+</file>
+
+<file path=ppt/slides/slide23.xml><?xml version="1.0" encoding="utf-8"?>
+<p:sld xmlns:a="http://schemas.openxmlformats.org/drawingml/2006/main" xmlns:r="http://schemas.openxmlformats.org/officeDocument/2006/relationships" xmlns:p="http://schemas.openxmlformats.org/presentationml/2006/main">
+  <p:cSld>
+    <p:spTree>
+      <p:nvGrpSpPr>
+        <p:cNvPr id="1" name=""/>
+        <p:cNvGrpSpPr/>
+        <p:nvPr/>
+      </p:nvGrpSpPr>
+      <p:grpSpPr>
+        <a:xfrm>
+          <a:off x="0" y="0"/>
+          <a:ext cx="0" cy="0"/>
+          <a:chOff x="0" y="0"/>
+          <a:chExt cx="0" cy="0"/>
+        </a:xfrm>
+      </p:grpSpPr>
+      <p:pic>
+        <p:nvPicPr>
+          <p:cNvPr id="4" name="Imagem 3"/>
+          <p:cNvPicPr>
+            <a:picLocks noChangeAspect="1"/>
+          </p:cNvPicPr>
+          <p:nvPr/>
+        </p:nvPicPr>
+        <p:blipFill>
+          <a:blip r:embed="rId2" cstate="print">
+            <a:extLst>
+              <a:ext uri="{28A0092B-C50C-407E-A947-70E740481C1C}">
+                <a14:useLocalDpi xmlns:a14="http://schemas.microsoft.com/office/drawing/2010/main" val="0"/>
+              </a:ext>
+            </a:extLst>
+          </a:blip>
+          <a:stretch>
+            <a:fillRect/>
+          </a:stretch>
+        </p:blipFill>
+        <p:spPr>
+          <a:xfrm>
+            <a:off x="107504" y="5510965"/>
+            <a:ext cx="1197825" cy="1216838"/>
+          </a:xfrm>
+          <a:prstGeom prst="rect">
+            <a:avLst/>
+          </a:prstGeom>
+        </p:spPr>
+      </p:pic>
+      <p:sp>
+        <p:nvSpPr>
+          <p:cNvPr id="6" name="Retângulo 5"/>
+          <p:cNvSpPr/>
+          <p:nvPr/>
+        </p:nvSpPr>
+        <p:spPr>
+          <a:xfrm>
+            <a:off x="549362" y="692696"/>
+            <a:ext cx="7839061" cy="646331"/>
+          </a:xfrm>
+          <a:prstGeom prst="rect">
+            <a:avLst/>
+          </a:prstGeom>
+        </p:spPr>
+        <p:txBody>
+          <a:bodyPr wrap="square">
+            <a:spAutoFit/>
+          </a:bodyPr>
+          <a:lstStyle/>
+          <a:p>
+            <a:pPr algn="just"/>
+            <a:r>
+              <a:rPr lang="pt-BR" b="1" dirty="0" smtClean="0">
+                <a:latin typeface="Arial Black" panose="020B0A04020102020204" pitchFamily="34" charset="0"/>
+              </a:rPr>
+              <a:t>5. Desempenho – O Sistema não deverá apresentar lentidão ou travamento</a:t>
+            </a:r>
+            <a:endParaRPr lang="pt-BR" dirty="0"/>
+          </a:p>
+        </p:txBody>
+      </p:sp>
+      <p:sp>
+        <p:nvSpPr>
+          <p:cNvPr id="7" name="CaixaDeTexto 6"/>
+          <p:cNvSpPr txBox="1"/>
+          <p:nvPr/>
+        </p:nvSpPr>
+        <p:spPr>
+          <a:xfrm>
+            <a:off x="518343" y="1794590"/>
+            <a:ext cx="8068801" cy="1631216"/>
+          </a:xfrm>
+          <a:prstGeom prst="rect">
+            <a:avLst/>
+          </a:prstGeom>
+          <a:noFill/>
+        </p:spPr>
+        <p:txBody>
+          <a:bodyPr wrap="square" rtlCol="0">
+            <a:spAutoFit/>
+          </a:bodyPr>
+          <a:lstStyle/>
+          <a:p>
+            <a:pPr marL="342900" indent="-342900" algn="just">
+              <a:buFont typeface="Arial" panose="020B0604020202020204" pitchFamily="34" charset="0"/>
+              <a:buChar char="•"/>
+            </a:pPr>
+            <a:r>
+              <a:rPr lang="pt-BR" sz="2000" dirty="0" smtClean="0">
+                <a:latin typeface="Arial" panose="020B0604020202020204" pitchFamily="34" charset="0"/>
+                <a:cs typeface="Arial" panose="020B0604020202020204" pitchFamily="34" charset="0"/>
+              </a:rPr>
+              <a:t>Para que o sistema apresente um bom desempenho, é fundamental que o </a:t>
+            </a:r>
+            <a:r>
+              <a:rPr lang="pt-BR" sz="2000" i="1" dirty="0" smtClean="0">
+                <a:latin typeface="Arial" panose="020B0604020202020204" pitchFamily="34" charset="0"/>
+                <a:cs typeface="Arial" panose="020B0604020202020204" pitchFamily="34" charset="0"/>
+              </a:rPr>
+              <a:t>pool</a:t>
+            </a:r>
+            <a:r>
+              <a:rPr lang="pt-BR" sz="2000" dirty="0" smtClean="0">
+                <a:latin typeface="Arial" panose="020B0604020202020204" pitchFamily="34" charset="0"/>
+                <a:cs typeface="Arial" panose="020B0604020202020204" pitchFamily="34" charset="0"/>
+              </a:rPr>
+              <a:t> de conexões esteja configurado</a:t>
+            </a:r>
+          </a:p>
+          <a:p>
+            <a:pPr marL="342900" indent="-342900" algn="just">
+              <a:buFont typeface="Arial" panose="020B0604020202020204" pitchFamily="34" charset="0"/>
+              <a:buChar char="•"/>
+            </a:pPr>
+            <a:r>
+              <a:rPr lang="pt-BR" sz="2000" dirty="0" smtClean="0">
+                <a:latin typeface="Arial" panose="020B0604020202020204" pitchFamily="34" charset="0"/>
+                <a:cs typeface="Arial" panose="020B0604020202020204" pitchFamily="34" charset="0"/>
+              </a:rPr>
+              <a:t>Desativar os logs de consulta ao banco de dados em produção</a:t>
+            </a:r>
+          </a:p>
+          <a:p>
+            <a:pPr marL="342900" indent="-342900" algn="just">
+              <a:buFont typeface="Arial" panose="020B0604020202020204" pitchFamily="34" charset="0"/>
+              <a:buChar char="•"/>
+            </a:pPr>
+            <a:r>
+              <a:rPr lang="pt-BR" sz="2000" dirty="0" smtClean="0">
+                <a:latin typeface="Arial" panose="020B0604020202020204" pitchFamily="34" charset="0"/>
+                <a:cs typeface="Arial" panose="020B0604020202020204" pitchFamily="34" charset="0"/>
+              </a:rPr>
+              <a:t>A configuração correta também é fundamental para que o banco não seja sobrecarregado com consultas sem necessidade</a:t>
+            </a:r>
+            <a:endParaRPr lang="pt-BR" sz="2000" dirty="0" smtClean="0">
+              <a:latin typeface="Arial" panose="020B0604020202020204" pitchFamily="34" charset="0"/>
+              <a:cs typeface="Arial" panose="020B0604020202020204" pitchFamily="34" charset="0"/>
+            </a:endParaRPr>
+          </a:p>
+        </p:txBody>
+      </p:sp>
+    </p:spTree>
+    <p:extLst>
+      <p:ext uri="{BB962C8B-B14F-4D97-AF65-F5344CB8AC3E}">
+        <p14:creationId xmlns:p14="http://schemas.microsoft.com/office/powerpoint/2010/main" val="4285674007"/>
+      </p:ext>
+    </p:extLst>
+  </p:cSld>
+  <p:clrMapOvr>
+    <a:masterClrMapping/>
+  </p:clrMapOvr>
+  <p:timing>
+    <p:tnLst>
+      <p:par>
+        <p:cTn id="1" dur="indefinite" restart="never" nodeType="tmRoot"/>
+      </p:par>
+    </p:tnLst>
+  </p:timing>
+</p:sld>
+</file>
+
+<file path=ppt/slides/slide24.xml><?xml version="1.0" encoding="utf-8"?>
+<p:sld xmlns:a="http://schemas.openxmlformats.org/drawingml/2006/main" xmlns:r="http://schemas.openxmlformats.org/officeDocument/2006/relationships" xmlns:p="http://schemas.openxmlformats.org/presentationml/2006/main">
+  <p:cSld>
+    <p:spTree>
+      <p:nvGrpSpPr>
+        <p:cNvPr id="1" name=""/>
+        <p:cNvGrpSpPr/>
+        <p:nvPr/>
+      </p:nvGrpSpPr>
+      <p:grpSpPr>
+        <a:xfrm>
+          <a:off x="0" y="0"/>
+          <a:ext cx="0" cy="0"/>
+          <a:chOff x="0" y="0"/>
+          <a:chExt cx="0" cy="0"/>
+        </a:xfrm>
+      </p:grpSpPr>
+      <p:pic>
+        <p:nvPicPr>
+          <p:cNvPr id="4" name="Imagem 3"/>
+          <p:cNvPicPr>
+            <a:picLocks noChangeAspect="1"/>
+          </p:cNvPicPr>
+          <p:nvPr/>
+        </p:nvPicPr>
+        <p:blipFill>
+          <a:blip r:embed="rId2" cstate="print">
+            <a:extLst>
+              <a:ext uri="{28A0092B-C50C-407E-A947-70E740481C1C}">
+                <a14:useLocalDpi xmlns:a14="http://schemas.microsoft.com/office/drawing/2010/main" val="0"/>
+              </a:ext>
+            </a:extLst>
+          </a:blip>
+          <a:stretch>
+            <a:fillRect/>
+          </a:stretch>
+        </p:blipFill>
+        <p:spPr>
+          <a:xfrm>
+            <a:off x="107504" y="5510965"/>
+            <a:ext cx="1197825" cy="1216838"/>
+          </a:xfrm>
+          <a:prstGeom prst="rect">
+            <a:avLst/>
+          </a:prstGeom>
+        </p:spPr>
+      </p:pic>
+      <p:sp>
+        <p:nvSpPr>
+          <p:cNvPr id="6" name="Retângulo 5"/>
+          <p:cNvSpPr/>
+          <p:nvPr/>
+        </p:nvSpPr>
+        <p:spPr>
+          <a:xfrm>
+            <a:off x="549362" y="692696"/>
+            <a:ext cx="7839061" cy="369332"/>
+          </a:xfrm>
+          <a:prstGeom prst="rect">
+            <a:avLst/>
+          </a:prstGeom>
+        </p:spPr>
+        <p:txBody>
+          <a:bodyPr wrap="square">
+            <a:spAutoFit/>
+          </a:bodyPr>
+          <a:lstStyle/>
+          <a:p>
+            <a:pPr algn="just"/>
+            <a:r>
+              <a:rPr lang="pt-BR" b="1" dirty="0" smtClean="0">
+                <a:latin typeface="Arial Black" panose="020B0A04020102020204" pitchFamily="34" charset="0"/>
+              </a:rPr>
+              <a:t>Resultado</a:t>
+            </a:r>
+            <a:endParaRPr lang="pt-BR" dirty="0"/>
+          </a:p>
+        </p:txBody>
+      </p:sp>
+      <p:graphicFrame>
+        <p:nvGraphicFramePr>
+          <p:cNvPr id="2" name="Tabela 1"/>
+          <p:cNvGraphicFramePr>
+            <a:graphicFrameLocks noGrp="1"/>
+          </p:cNvGraphicFramePr>
+          <p:nvPr>
+            <p:extLst>
+              <p:ext uri="{D42A27DB-BD31-4B8C-83A1-F6EECF244321}">
+                <p14:modId xmlns:p14="http://schemas.microsoft.com/office/powerpoint/2010/main" val="3434319422"/>
+              </p:ext>
+            </p:extLst>
+          </p:nvPr>
+        </p:nvGraphicFramePr>
+        <p:xfrm>
+          <a:off x="549359" y="1268757"/>
+          <a:ext cx="7983080" cy="4392490"/>
+        </p:xfrm>
+        <a:graphic>
+          <a:graphicData uri="http://schemas.openxmlformats.org/drawingml/2006/table">
+            <a:tbl>
+              <a:tblPr firstRow="1" firstCol="1" bandRow="1">
+                <a:tableStyleId>{5FD0F851-EC5A-4D38-B0AD-8093EC10F338}</a:tableStyleId>
+              </a:tblPr>
+              <a:tblGrid>
+                <a:gridCol w="3444530"/>
+                <a:gridCol w="1876979"/>
+                <a:gridCol w="2661571"/>
+              </a:tblGrid>
+              <a:tr h="337884">
+                <a:tc>
+                  <a:txBody>
+                    <a:bodyPr/>
+                    <a:lstStyle/>
+                    <a:p>
+                      <a:pPr algn="ctr">
+                        <a:spcAft>
+                          <a:spcPts val="0"/>
+                        </a:spcAft>
+                      </a:pPr>
+                      <a:r>
+                        <a:rPr lang="pt-BR" sz="1200" kern="100" dirty="0">
+                          <a:effectLst/>
+                        </a:rPr>
+                        <a:t>Requisitos Não funcionais</a:t>
+                      </a:r>
+                      <a:endParaRPr lang="pt-BR" sz="1200" kern="100" dirty="0">
+                        <a:effectLst/>
+                        <a:latin typeface="Liberation Serif"/>
+                        <a:ea typeface="NSimSun"/>
+                        <a:cs typeface="Arial"/>
+                      </a:endParaRPr>
+                    </a:p>
+                  </a:txBody>
+                  <a:tcPr marL="68580" marR="68580" marT="0" marB="0"/>
+                </a:tc>
+                <a:tc>
+                  <a:txBody>
+                    <a:bodyPr/>
+                    <a:lstStyle/>
+                    <a:p>
+                      <a:pPr algn="ctr">
+                        <a:spcAft>
+                          <a:spcPts val="0"/>
+                        </a:spcAft>
+                      </a:pPr>
+                      <a:r>
+                        <a:rPr lang="pt-BR" sz="1200" kern="100">
+                          <a:effectLst/>
+                        </a:rPr>
+                        <a:t>Testado</a:t>
+                      </a:r>
+                      <a:endParaRPr lang="pt-BR" sz="1200" kern="100">
+                        <a:effectLst/>
+                        <a:latin typeface="Liberation Serif"/>
+                        <a:ea typeface="NSimSun"/>
+                        <a:cs typeface="Arial"/>
+                      </a:endParaRPr>
+                    </a:p>
+                  </a:txBody>
+                  <a:tcPr marL="68580" marR="68580" marT="0" marB="0"/>
+                </a:tc>
+                <a:tc>
+                  <a:txBody>
+                    <a:bodyPr/>
+                    <a:lstStyle/>
+                    <a:p>
+                      <a:pPr algn="ctr">
+                        <a:spcAft>
+                          <a:spcPts val="0"/>
+                        </a:spcAft>
+                      </a:pPr>
+                      <a:r>
+                        <a:rPr lang="pt-BR" sz="1200" kern="100">
+                          <a:effectLst/>
+                        </a:rPr>
+                        <a:t>Homologado</a:t>
+                      </a:r>
+                      <a:endParaRPr lang="pt-BR" sz="1200" kern="100">
+                        <a:effectLst/>
+                        <a:latin typeface="Liberation Serif"/>
+                        <a:ea typeface="NSimSun"/>
+                        <a:cs typeface="Arial"/>
+                      </a:endParaRPr>
+                    </a:p>
+                  </a:txBody>
+                  <a:tcPr marL="68580" marR="68580" marT="0" marB="0"/>
+                </a:tc>
+              </a:tr>
+              <a:tr h="675768">
+                <a:tc>
+                  <a:txBody>
+                    <a:bodyPr/>
+                    <a:lstStyle/>
+                    <a:p>
+                      <a:pPr algn="just">
+                        <a:spcAft>
+                          <a:spcPts val="0"/>
+                        </a:spcAft>
+                      </a:pPr>
+                      <a:r>
+                        <a:rPr lang="pt-BR" sz="1200" kern="100">
+                          <a:effectLst/>
+                        </a:rPr>
+                        <a:t>RNF 1 – O sistema deverá utilizar um framework objeto-relacional.</a:t>
+                      </a:r>
+                      <a:endParaRPr lang="pt-BR" sz="1200" kern="100">
+                        <a:effectLst/>
+                        <a:latin typeface="Liberation Serif"/>
+                        <a:ea typeface="NSimSun"/>
+                        <a:cs typeface="Arial"/>
+                      </a:endParaRPr>
+                    </a:p>
+                  </a:txBody>
+                  <a:tcPr marL="68580" marR="68580" marT="0" marB="0"/>
+                </a:tc>
+                <a:tc>
+                  <a:txBody>
+                    <a:bodyPr/>
+                    <a:lstStyle/>
+                    <a:p>
+                      <a:pPr algn="ctr">
+                        <a:spcAft>
+                          <a:spcPts val="0"/>
+                        </a:spcAft>
+                      </a:pPr>
+                      <a:r>
+                        <a:rPr lang="pt-BR" sz="1200" kern="100">
+                          <a:effectLst/>
+                        </a:rPr>
+                        <a:t>SIM</a:t>
+                      </a:r>
+                      <a:endParaRPr lang="pt-BR" sz="1200" kern="100">
+                        <a:effectLst/>
+                        <a:latin typeface="Liberation Serif"/>
+                        <a:ea typeface="NSimSun"/>
+                        <a:cs typeface="Arial"/>
+                      </a:endParaRPr>
+                    </a:p>
+                  </a:txBody>
+                  <a:tcPr marL="68580" marR="68580" marT="0" marB="0"/>
+                </a:tc>
+                <a:tc>
+                  <a:txBody>
+                    <a:bodyPr/>
+                    <a:lstStyle/>
+                    <a:p>
+                      <a:pPr algn="ctr">
+                        <a:spcAft>
+                          <a:spcPts val="0"/>
+                        </a:spcAft>
+                      </a:pPr>
+                      <a:r>
+                        <a:rPr lang="pt-BR" sz="1200" kern="100">
+                          <a:effectLst/>
+                        </a:rPr>
+                        <a:t>SIM</a:t>
+                      </a:r>
+                      <a:endParaRPr lang="pt-BR" sz="1200" kern="100">
+                        <a:effectLst/>
+                        <a:latin typeface="Liberation Serif"/>
+                        <a:ea typeface="NSimSun"/>
+                        <a:cs typeface="Arial"/>
+                      </a:endParaRPr>
+                    </a:p>
+                  </a:txBody>
+                  <a:tcPr marL="68580" marR="68580" marT="0" marB="0"/>
+                </a:tc>
+              </a:tr>
+              <a:tr h="675768">
+                <a:tc>
+                  <a:txBody>
+                    <a:bodyPr/>
+                    <a:lstStyle/>
+                    <a:p>
+                      <a:pPr algn="just">
+                        <a:spcAft>
+                          <a:spcPts val="0"/>
+                        </a:spcAft>
+                      </a:pPr>
+                      <a:r>
+                        <a:rPr lang="pt-BR" sz="1200" kern="100">
+                          <a:effectLst/>
+                        </a:rPr>
+                        <a:t>RNF 2 – O sistema deverá ter boa Manutenibilidade</a:t>
+                      </a:r>
+                      <a:endParaRPr lang="pt-BR" sz="1200" kern="100">
+                        <a:effectLst/>
+                        <a:latin typeface="Liberation Serif"/>
+                        <a:ea typeface="NSimSun"/>
+                        <a:cs typeface="Arial"/>
+                      </a:endParaRPr>
+                    </a:p>
+                  </a:txBody>
+                  <a:tcPr marL="68580" marR="68580" marT="0" marB="0"/>
+                </a:tc>
+                <a:tc>
+                  <a:txBody>
+                    <a:bodyPr/>
+                    <a:lstStyle/>
+                    <a:p>
+                      <a:pPr indent="450215">
+                        <a:spcAft>
+                          <a:spcPts val="0"/>
+                        </a:spcAft>
+                      </a:pPr>
+                      <a:r>
+                        <a:rPr lang="pt-BR" sz="1200" kern="100">
+                          <a:effectLst/>
+                        </a:rPr>
+                        <a:t>  SIM</a:t>
+                      </a:r>
+                      <a:endParaRPr lang="pt-BR" sz="1200" kern="100">
+                        <a:effectLst/>
+                        <a:latin typeface="Liberation Serif"/>
+                        <a:ea typeface="NSimSun"/>
+                        <a:cs typeface="Arial"/>
+                      </a:endParaRPr>
+                    </a:p>
+                  </a:txBody>
+                  <a:tcPr marL="68580" marR="68580" marT="0" marB="0"/>
+                </a:tc>
+                <a:tc>
+                  <a:txBody>
+                    <a:bodyPr/>
+                    <a:lstStyle/>
+                    <a:p>
+                      <a:pPr algn="ctr">
+                        <a:spcAft>
+                          <a:spcPts val="0"/>
+                        </a:spcAft>
+                      </a:pPr>
+                      <a:r>
+                        <a:rPr lang="pt-BR" sz="1200" kern="100">
+                          <a:effectLst/>
+                        </a:rPr>
+                        <a:t>SIM</a:t>
+                      </a:r>
+                      <a:endParaRPr lang="pt-BR" sz="1200" kern="100">
+                        <a:effectLst/>
+                        <a:latin typeface="Liberation Serif"/>
+                        <a:ea typeface="NSimSun"/>
+                        <a:cs typeface="Arial"/>
+                      </a:endParaRPr>
+                    </a:p>
+                  </a:txBody>
+                  <a:tcPr marL="68580" marR="68580" marT="0" marB="0"/>
+                </a:tc>
+              </a:tr>
+              <a:tr h="1351534">
+                <a:tc>
+                  <a:txBody>
+                    <a:bodyPr/>
+                    <a:lstStyle/>
+                    <a:p>
+                      <a:pPr algn="just">
+                        <a:spcAft>
+                          <a:spcPts val="0"/>
+                        </a:spcAft>
+                      </a:pPr>
+                      <a:r>
+                        <a:rPr lang="pt-BR" sz="1200" kern="100">
+                          <a:effectLst/>
+                        </a:rPr>
+                        <a:t>RNF 3 – O sistema deverá ser seguro e utilizar o protocolo de segurança Oauth 2.0 implementado através do Spring Security</a:t>
+                      </a:r>
+                      <a:endParaRPr lang="pt-BR" sz="1200" kern="100">
+                        <a:effectLst/>
+                        <a:latin typeface="Liberation Serif"/>
+                        <a:ea typeface="NSimSun"/>
+                        <a:cs typeface="Arial"/>
+                      </a:endParaRPr>
+                    </a:p>
+                  </a:txBody>
+                  <a:tcPr marL="68580" marR="68580" marT="0" marB="0"/>
+                </a:tc>
+                <a:tc>
+                  <a:txBody>
+                    <a:bodyPr/>
+                    <a:lstStyle/>
+                    <a:p>
+                      <a:pPr algn="ctr">
+                        <a:spcAft>
+                          <a:spcPts val="0"/>
+                        </a:spcAft>
+                      </a:pPr>
+                      <a:r>
+                        <a:rPr lang="pt-BR" sz="1200" kern="100">
+                          <a:effectLst/>
+                        </a:rPr>
+                        <a:t>SIM</a:t>
+                      </a:r>
+                    </a:p>
+                    <a:p>
+                      <a:pPr>
+                        <a:spcAft>
+                          <a:spcPts val="0"/>
+                        </a:spcAft>
+                      </a:pPr>
+                      <a:r>
+                        <a:rPr lang="pt-BR" sz="1200" kern="100">
+                          <a:effectLst/>
+                        </a:rPr>
+                        <a:t> </a:t>
+                      </a:r>
+                      <a:endParaRPr lang="pt-BR" sz="1200" kern="100">
+                        <a:effectLst/>
+                        <a:latin typeface="Liberation Serif"/>
+                        <a:ea typeface="NSimSun"/>
+                        <a:cs typeface="Arial"/>
+                      </a:endParaRPr>
+                    </a:p>
+                  </a:txBody>
+                  <a:tcPr marL="68580" marR="68580" marT="0" marB="0"/>
+                </a:tc>
+                <a:tc>
+                  <a:txBody>
+                    <a:bodyPr/>
+                    <a:lstStyle/>
+                    <a:p>
+                      <a:pPr algn="ctr">
+                        <a:spcAft>
+                          <a:spcPts val="0"/>
+                        </a:spcAft>
+                      </a:pPr>
+                      <a:r>
+                        <a:rPr lang="pt-BR" sz="1200" kern="100">
+                          <a:effectLst/>
+                        </a:rPr>
+                        <a:t>SIM</a:t>
+                      </a:r>
+                      <a:endParaRPr lang="pt-BR" sz="1200" kern="100">
+                        <a:effectLst/>
+                        <a:latin typeface="Liberation Serif"/>
+                        <a:ea typeface="NSimSun"/>
+                        <a:cs typeface="Arial"/>
+                      </a:endParaRPr>
+                    </a:p>
+                  </a:txBody>
+                  <a:tcPr marL="68580" marR="68580" marT="0" marB="0"/>
+                </a:tc>
+              </a:tr>
+              <a:tr h="675768">
+                <a:tc>
+                  <a:txBody>
+                    <a:bodyPr/>
+                    <a:lstStyle/>
+                    <a:p>
+                      <a:pPr algn="just">
+                        <a:spcAft>
+                          <a:spcPts val="0"/>
+                        </a:spcAft>
+                      </a:pPr>
+                      <a:r>
+                        <a:rPr lang="pt-BR" sz="1200" kern="100">
+                          <a:effectLst/>
+                        </a:rPr>
+                        <a:t>RNF 4 – O sistema deverá ter boa acessibilidade</a:t>
+                      </a:r>
+                      <a:endParaRPr lang="pt-BR" sz="1200" kern="100">
+                        <a:effectLst/>
+                        <a:latin typeface="Liberation Serif"/>
+                        <a:ea typeface="NSimSun"/>
+                        <a:cs typeface="Arial"/>
+                      </a:endParaRPr>
+                    </a:p>
+                  </a:txBody>
+                  <a:tcPr marL="68580" marR="68580" marT="0" marB="0"/>
+                </a:tc>
+                <a:tc>
+                  <a:txBody>
+                    <a:bodyPr/>
+                    <a:lstStyle/>
+                    <a:p>
+                      <a:pPr algn="ctr">
+                        <a:spcAft>
+                          <a:spcPts val="0"/>
+                        </a:spcAft>
+                      </a:pPr>
+                      <a:r>
+                        <a:rPr lang="pt-BR" sz="1200" kern="100">
+                          <a:effectLst/>
+                        </a:rPr>
+                        <a:t>SIM</a:t>
+                      </a:r>
+                      <a:endParaRPr lang="pt-BR" sz="1200" kern="100">
+                        <a:effectLst/>
+                        <a:latin typeface="Liberation Serif"/>
+                        <a:ea typeface="NSimSun"/>
+                        <a:cs typeface="Arial"/>
+                      </a:endParaRPr>
+                    </a:p>
+                  </a:txBody>
+                  <a:tcPr marL="68580" marR="68580" marT="0" marB="0"/>
+                </a:tc>
+                <a:tc>
+                  <a:txBody>
+                    <a:bodyPr/>
+                    <a:lstStyle/>
+                    <a:p>
+                      <a:pPr algn="ctr">
+                        <a:spcAft>
+                          <a:spcPts val="0"/>
+                        </a:spcAft>
+                      </a:pPr>
+                      <a:r>
+                        <a:rPr lang="pt-BR" sz="1200" kern="100">
+                          <a:effectLst/>
+                        </a:rPr>
+                        <a:t>SIM</a:t>
+                      </a:r>
+                      <a:endParaRPr lang="pt-BR" sz="1200" kern="100">
+                        <a:effectLst/>
+                        <a:latin typeface="Liberation Serif"/>
+                        <a:ea typeface="NSimSun"/>
+                        <a:cs typeface="Arial"/>
+                      </a:endParaRPr>
+                    </a:p>
+                  </a:txBody>
+                  <a:tcPr marL="68580" marR="68580" marT="0" marB="0"/>
+                </a:tc>
+              </a:tr>
+              <a:tr h="675768">
+                <a:tc>
+                  <a:txBody>
+                    <a:bodyPr/>
+                    <a:lstStyle/>
+                    <a:p>
+                      <a:pPr>
+                        <a:spcAft>
+                          <a:spcPts val="0"/>
+                        </a:spcAft>
+                      </a:pPr>
+                      <a:r>
+                        <a:rPr lang="pt-BR" sz="1200" kern="100">
+                          <a:effectLst/>
+                        </a:rPr>
+                        <a:t>RNF 5 – O sistema deverá ter boa comunicação</a:t>
+                      </a:r>
+                      <a:endParaRPr lang="pt-BR" sz="1200" kern="100">
+                        <a:effectLst/>
+                        <a:latin typeface="Liberation Serif"/>
+                        <a:ea typeface="NSimSun"/>
+                        <a:cs typeface="Arial"/>
+                      </a:endParaRPr>
+                    </a:p>
+                  </a:txBody>
+                  <a:tcPr marL="68580" marR="68580" marT="0" marB="0"/>
+                </a:tc>
+                <a:tc>
+                  <a:txBody>
+                    <a:bodyPr/>
+                    <a:lstStyle/>
+                    <a:p>
+                      <a:pPr algn="ctr">
+                        <a:spcAft>
+                          <a:spcPts val="0"/>
+                        </a:spcAft>
+                      </a:pPr>
+                      <a:r>
+                        <a:rPr lang="pt-BR" sz="1200" kern="100">
+                          <a:effectLst/>
+                        </a:rPr>
+                        <a:t>SIM</a:t>
+                      </a:r>
+                      <a:endParaRPr lang="pt-BR" sz="1200" kern="100">
+                        <a:effectLst/>
+                        <a:latin typeface="Liberation Serif"/>
+                        <a:ea typeface="NSimSun"/>
+                        <a:cs typeface="Arial"/>
+                      </a:endParaRPr>
+                    </a:p>
+                  </a:txBody>
+                  <a:tcPr marL="68580" marR="68580" marT="0" marB="0"/>
+                </a:tc>
+                <a:tc>
+                  <a:txBody>
+                    <a:bodyPr/>
+                    <a:lstStyle/>
+                    <a:p>
+                      <a:pPr algn="ctr">
+                        <a:spcAft>
+                          <a:spcPts val="0"/>
+                        </a:spcAft>
+                      </a:pPr>
+                      <a:r>
+                        <a:rPr lang="pt-BR" sz="1200" kern="100" dirty="0">
+                          <a:effectLst/>
+                        </a:rPr>
+                        <a:t>SIM</a:t>
+                      </a:r>
+                      <a:endParaRPr lang="pt-BR" sz="1200" kern="100" dirty="0">
+                        <a:effectLst/>
+                        <a:latin typeface="Liberation Serif"/>
+                        <a:ea typeface="NSimSun"/>
+                        <a:cs typeface="Arial"/>
+                      </a:endParaRPr>
+                    </a:p>
+                  </a:txBody>
+                  <a:tcPr marL="68580" marR="68580" marT="0" marB="0"/>
+                </a:tc>
+              </a:tr>
+            </a:tbl>
+          </a:graphicData>
+        </a:graphic>
+      </p:graphicFrame>
+    </p:spTree>
+    <p:extLst>
+      <p:ext uri="{BB962C8B-B14F-4D97-AF65-F5344CB8AC3E}">
+        <p14:creationId xmlns:p14="http://schemas.microsoft.com/office/powerpoint/2010/main" val="1921967306"/>
+      </p:ext>
+    </p:extLst>
+  </p:cSld>
+  <p:clrMapOvr>
+    <a:masterClrMapping/>
+  </p:clrMapOvr>
+  <p:timing>
+    <p:tnLst>
+      <p:par>
+        <p:cTn id="1" dur="indefinite" restart="never" nodeType="tmRoot"/>
+      </p:par>
+    </p:tnLst>
+  </p:timing>
+</p:sld>
+</file>
+
+<file path=ppt/slides/slide25.xml><?xml version="1.0" encoding="utf-8"?>
+<p:sld xmlns:a="http://schemas.openxmlformats.org/drawingml/2006/main" xmlns:r="http://schemas.openxmlformats.org/officeDocument/2006/relationships" xmlns:p="http://schemas.openxmlformats.org/presentationml/2006/main">
+  <p:cSld>
+    <p:spTree>
+      <p:nvGrpSpPr>
+        <p:cNvPr id="1" name=""/>
+        <p:cNvGrpSpPr/>
+        <p:nvPr/>
+      </p:nvGrpSpPr>
+      <p:grpSpPr>
+        <a:xfrm>
+          <a:off x="0" y="0"/>
+          <a:ext cx="0" cy="0"/>
+          <a:chOff x="0" y="0"/>
+          <a:chExt cx="0" cy="0"/>
+        </a:xfrm>
+      </p:grpSpPr>
+      <p:sp>
+        <p:nvSpPr>
+          <p:cNvPr id="4" name="Título 1"/>
+          <p:cNvSpPr txBox="1">
+            <a:spLocks/>
+          </p:cNvSpPr>
+          <p:nvPr/>
+        </p:nvSpPr>
+        <p:spPr>
+          <a:xfrm>
+            <a:off x="467544" y="476672"/>
+            <a:ext cx="8229600" cy="1143000"/>
+          </a:xfrm>
+          <a:prstGeom prst="rect">
+            <a:avLst/>
+          </a:prstGeom>
+        </p:spPr>
+        <p:txBody>
+          <a:bodyPr vert="horz" lIns="91440" tIns="45720" rIns="91440" bIns="45720" rtlCol="0" anchor="ctr">
+            <a:normAutofit/>
+          </a:bodyPr>
+          <a:lstStyle>
+            <a:lvl1pPr algn="ctr" defTabSz="914400" rtl="0" eaLnBrk="1" latinLnBrk="0" hangingPunct="1">
+              <a:spcBef>
+                <a:spcPct val="0"/>
+              </a:spcBef>
+              <a:buNone/>
+              <a:defRPr sz="4400" kern="1200">
+                <a:solidFill>
+                  <a:schemeClr val="tx1"/>
+                </a:solidFill>
+                <a:latin typeface="+mj-lt"/>
+                <a:ea typeface="+mj-ea"/>
+                <a:cs typeface="+mj-cs"/>
+              </a:defRPr>
+            </a:lvl1pPr>
+          </a:lstStyle>
+          <a:p>
+            <a:pPr algn="l"/>
+            <a:r>
+              <a:rPr lang="pt-BR" sz="2000" b="1" dirty="0" smtClean="0"/>
+              <a:t>Modelo de Componentes</a:t>
+            </a:r>
+            <a:endParaRPr lang="pt-BR" sz="2000" b="1" dirty="0"/>
+          </a:p>
+        </p:txBody>
+      </p:sp>
+      <p:pic>
+        <p:nvPicPr>
+          <p:cNvPr id="8" name="Imagem 7"/>
+          <p:cNvPicPr/>
+          <p:nvPr/>
+        </p:nvPicPr>
+        <p:blipFill>
+          <a:blip r:embed="rId2"/>
+          <a:stretch>
+            <a:fillRect/>
+          </a:stretch>
+        </p:blipFill>
+        <p:spPr bwMode="auto">
+          <a:xfrm>
+            <a:off x="706416" y="1340767"/>
+            <a:ext cx="7990728" cy="4170197"/>
+          </a:xfrm>
+          <a:prstGeom prst="rect">
+            <a:avLst/>
+          </a:prstGeom>
+        </p:spPr>
+      </p:pic>
+      <p:pic>
+        <p:nvPicPr>
+          <p:cNvPr id="5" name="Imagem 4"/>
+          <p:cNvPicPr>
+            <a:picLocks noChangeAspect="1"/>
+          </p:cNvPicPr>
+          <p:nvPr/>
+        </p:nvPicPr>
+        <p:blipFill>
+          <a:blip r:embed="rId3" cstate="print">
+            <a:extLst>
+              <a:ext uri="{28A0092B-C50C-407E-A947-70E740481C1C}">
+                <a14:useLocalDpi xmlns:a14="http://schemas.microsoft.com/office/drawing/2010/main" val="0"/>
+              </a:ext>
+            </a:extLst>
+          </a:blip>
+          <a:stretch>
+            <a:fillRect/>
+          </a:stretch>
+        </p:blipFill>
+        <p:spPr>
+          <a:xfrm>
+            <a:off x="107504" y="5510965"/>
+            <a:ext cx="1197825" cy="1216838"/>
+          </a:xfrm>
+          <a:prstGeom prst="rect">
+            <a:avLst/>
+          </a:prstGeom>
+        </p:spPr>
+      </p:pic>
+    </p:spTree>
+    <p:extLst>
+      <p:ext uri="{BB962C8B-B14F-4D97-AF65-F5344CB8AC3E}">
+        <p14:creationId xmlns:p14="http://schemas.microsoft.com/office/powerpoint/2010/main" val="2795295655"/>
+      </p:ext>
+    </p:extLst>
+  </p:cSld>
+  <p:clrMapOvr>
+    <a:masterClrMapping/>
+  </p:clrMapOvr>
+  <p:timing>
+    <p:tnLst>
+      <p:par>
+        <p:cTn id="1" dur="indefinite" restart="never" nodeType="tmRoot"/>
+      </p:par>
+    </p:tnLst>
+  </p:timing>
+</p:sld>
+</file>
+
+<file path=ppt/slides/slide26.xml><?xml version="1.0" encoding="utf-8"?>
+<p:sld xmlns:a="http://schemas.openxmlformats.org/drawingml/2006/main" xmlns:r="http://schemas.openxmlformats.org/officeDocument/2006/relationships" xmlns:p="http://schemas.openxmlformats.org/presentationml/2006/main">
+  <p:cSld>
+    <p:spTree>
+      <p:nvGrpSpPr>
+        <p:cNvPr id="1" name=""/>
+        <p:cNvGrpSpPr/>
+        <p:nvPr/>
+      </p:nvGrpSpPr>
+      <p:grpSpPr>
+        <a:xfrm>
+          <a:off x="0" y="0"/>
+          <a:ext cx="0" cy="0"/>
+          <a:chOff x="0" y="0"/>
+          <a:chExt cx="0" cy="0"/>
+        </a:xfrm>
+      </p:grpSpPr>
+      <p:pic>
+        <p:nvPicPr>
+          <p:cNvPr id="4" name="Imagem 3" descr="Tela de celular com texto preto sobre fundo branco&#10;&#10;Descrição gerada automaticamente"/>
+          <p:cNvPicPr/>
+          <p:nvPr/>
+        </p:nvPicPr>
+        <p:blipFill>
+          <a:blip r:embed="rId2"/>
+          <a:stretch>
+            <a:fillRect/>
+          </a:stretch>
+        </p:blipFill>
+        <p:spPr bwMode="auto">
+          <a:xfrm>
+            <a:off x="683568" y="1412776"/>
+            <a:ext cx="7776864" cy="4098189"/>
+          </a:xfrm>
+          <a:prstGeom prst="rect">
+            <a:avLst/>
+          </a:prstGeom>
+        </p:spPr>
+      </p:pic>
+      <p:sp>
+        <p:nvSpPr>
+          <p:cNvPr id="5" name="Título 1"/>
+          <p:cNvSpPr txBox="1">
+            <a:spLocks/>
+          </p:cNvSpPr>
+          <p:nvPr/>
+        </p:nvSpPr>
+        <p:spPr>
+          <a:xfrm>
+            <a:off x="611560" y="476672"/>
+            <a:ext cx="8193596" cy="1143000"/>
+          </a:xfrm>
+          <a:prstGeom prst="rect">
+            <a:avLst/>
+          </a:prstGeom>
+        </p:spPr>
+        <p:txBody>
+          <a:bodyPr vert="horz" lIns="91440" tIns="45720" rIns="91440" bIns="45720" rtlCol="0" anchor="ctr">
+            <a:normAutofit/>
+          </a:bodyPr>
+          <a:lstStyle>
+            <a:lvl1pPr algn="ctr" defTabSz="914400" rtl="0" eaLnBrk="1" latinLnBrk="0" hangingPunct="1">
+              <a:spcBef>
+                <a:spcPct val="0"/>
+              </a:spcBef>
+              <a:buNone/>
+              <a:defRPr sz="4400" kern="1200">
+                <a:solidFill>
+                  <a:schemeClr val="tx1"/>
+                </a:solidFill>
+                <a:latin typeface="+mj-lt"/>
+                <a:ea typeface="+mj-ea"/>
+                <a:cs typeface="+mj-cs"/>
+              </a:defRPr>
+            </a:lvl1pPr>
+          </a:lstStyle>
+          <a:p>
+            <a:pPr algn="l"/>
+            <a:r>
+              <a:rPr lang="pt-BR" sz="2000" b="1" dirty="0" smtClean="0"/>
+              <a:t>Modelo de implantação</a:t>
+            </a:r>
+            <a:endParaRPr lang="pt-BR" sz="2000" b="1" dirty="0"/>
+          </a:p>
+        </p:txBody>
+      </p:sp>
+      <p:pic>
+        <p:nvPicPr>
+          <p:cNvPr id="6" name="Imagem 5"/>
+          <p:cNvPicPr>
+            <a:picLocks noChangeAspect="1"/>
+          </p:cNvPicPr>
+          <p:nvPr/>
+        </p:nvPicPr>
+        <p:blipFill>
+          <a:blip r:embed="rId3" cstate="print">
+            <a:extLst>
+              <a:ext uri="{28A0092B-C50C-407E-A947-70E740481C1C}">
+                <a14:useLocalDpi xmlns:a14="http://schemas.microsoft.com/office/drawing/2010/main" val="0"/>
+              </a:ext>
+            </a:extLst>
+          </a:blip>
+          <a:stretch>
+            <a:fillRect/>
+          </a:stretch>
+        </p:blipFill>
+        <p:spPr>
+          <a:xfrm>
+            <a:off x="107504" y="5510965"/>
+            <a:ext cx="1197825" cy="1216838"/>
+          </a:xfrm>
+          <a:prstGeom prst="rect">
+            <a:avLst/>
+          </a:prstGeom>
+        </p:spPr>
+      </p:pic>
+    </p:spTree>
+    <p:extLst>
+      <p:ext uri="{BB962C8B-B14F-4D97-AF65-F5344CB8AC3E}">
+        <p14:creationId xmlns:p14="http://schemas.microsoft.com/office/powerpoint/2010/main" val="4127529639"/>
+      </p:ext>
+    </p:extLst>
+  </p:cSld>
+  <p:clrMapOvr>
+    <a:masterClrMapping/>
+  </p:clrMapOvr>
+  <p:timing>
+    <p:tnLst>
+      <p:par>
+        <p:cTn id="1" dur="indefinite" restart="never" nodeType="tmRoot"/>
+      </p:par>
+    </p:tnLst>
+  </p:timing>
+</p:sld>
+</file>
+
+<file path=ppt/slides/slide27.xml><?xml version="1.0" encoding="utf-8"?>
+<p:sld xmlns:a="http://schemas.openxmlformats.org/drawingml/2006/main" xmlns:r="http://schemas.openxmlformats.org/officeDocument/2006/relationships" xmlns:p="http://schemas.openxmlformats.org/presentationml/2006/main">
+  <p:cSld>
+    <p:spTree>
+      <p:nvGrpSpPr>
+        <p:cNvPr id="1" name=""/>
+        <p:cNvGrpSpPr/>
+        <p:nvPr/>
+      </p:nvGrpSpPr>
+      <p:grpSpPr>
+        <a:xfrm>
+          <a:off x="0" y="0"/>
+          <a:ext cx="0" cy="0"/>
+          <a:chOff x="0" y="0"/>
+          <a:chExt cx="0" cy="0"/>
+        </a:xfrm>
+      </p:grpSpPr>
+      <p:sp>
+        <p:nvSpPr>
+          <p:cNvPr id="5" name="Título 1"/>
+          <p:cNvSpPr txBox="1">
+            <a:spLocks/>
+          </p:cNvSpPr>
+          <p:nvPr/>
+        </p:nvSpPr>
+        <p:spPr>
+          <a:xfrm>
+            <a:off x="611560" y="476672"/>
+            <a:ext cx="8193596" cy="1143000"/>
+          </a:xfrm>
+          <a:prstGeom prst="rect">
+            <a:avLst/>
+          </a:prstGeom>
+        </p:spPr>
+        <p:txBody>
+          <a:bodyPr vert="horz" lIns="91440" tIns="45720" rIns="91440" bIns="45720" rtlCol="0" anchor="ctr">
+            <a:normAutofit/>
+          </a:bodyPr>
+          <a:lstStyle>
+            <a:lvl1pPr algn="ctr" defTabSz="914400" rtl="0" eaLnBrk="1" latinLnBrk="0" hangingPunct="1">
+              <a:spcBef>
+                <a:spcPct val="0"/>
+              </a:spcBef>
+              <a:buNone/>
+              <a:defRPr sz="4400" kern="1200">
+                <a:solidFill>
+                  <a:schemeClr val="tx1"/>
+                </a:solidFill>
+                <a:latin typeface="+mj-lt"/>
+                <a:ea typeface="+mj-ea"/>
+                <a:cs typeface="+mj-cs"/>
+              </a:defRPr>
+            </a:lvl1pPr>
+          </a:lstStyle>
+          <a:p>
+            <a:pPr algn="l"/>
+            <a:r>
+              <a:rPr lang="pt-BR" sz="2000" b="1" dirty="0" smtClean="0"/>
+              <a:t>Diagrama de Processo – Resolução CONAMA nº 237</a:t>
+            </a:r>
+            <a:endParaRPr lang="pt-BR" sz="2000" b="1" dirty="0"/>
+          </a:p>
+        </p:txBody>
+      </p:sp>
+      <p:pic>
+        <p:nvPicPr>
+          <p:cNvPr id="6" name="Imagem 5"/>
+          <p:cNvPicPr>
+            <a:picLocks noChangeAspect="1"/>
+          </p:cNvPicPr>
+          <p:nvPr/>
+        </p:nvPicPr>
+        <p:blipFill>
+          <a:blip r:embed="rId2" cstate="print">
+            <a:extLst>
+              <a:ext uri="{28A0092B-C50C-407E-A947-70E740481C1C}">
+                <a14:useLocalDpi xmlns:a14="http://schemas.microsoft.com/office/drawing/2010/main" val="0"/>
+              </a:ext>
+            </a:extLst>
+          </a:blip>
+          <a:stretch>
+            <a:fillRect/>
+          </a:stretch>
+        </p:blipFill>
+        <p:spPr>
+          <a:xfrm>
+            <a:off x="107504" y="5510965"/>
+            <a:ext cx="1197825" cy="1216838"/>
+          </a:xfrm>
+          <a:prstGeom prst="rect">
+            <a:avLst/>
+          </a:prstGeom>
+        </p:spPr>
+      </p:pic>
+      <p:pic>
+        <p:nvPicPr>
+          <p:cNvPr id="7" name="Imagem 6" descr="Tela de computador com texto preto sobre fundo branco&#10;&#10;Descrição gerada automaticamente"/>
+          <p:cNvPicPr/>
+          <p:nvPr/>
+        </p:nvPicPr>
+        <p:blipFill>
+          <a:blip r:embed="rId3"/>
+          <a:stretch>
+            <a:fillRect/>
+          </a:stretch>
+        </p:blipFill>
+        <p:spPr bwMode="auto">
+          <a:xfrm>
+            <a:off x="611560" y="1196753"/>
+            <a:ext cx="7776864" cy="4464496"/>
+          </a:xfrm>
+          <a:prstGeom prst="rect">
+            <a:avLst/>
+          </a:prstGeom>
+        </p:spPr>
+      </p:pic>
+    </p:spTree>
+    <p:extLst>
+      <p:ext uri="{BB962C8B-B14F-4D97-AF65-F5344CB8AC3E}">
+        <p14:creationId xmlns:p14="http://schemas.microsoft.com/office/powerpoint/2010/main" val="1506789625"/>
+      </p:ext>
+    </p:extLst>
+  </p:cSld>
+  <p:clrMapOvr>
+    <a:masterClrMapping/>
+  </p:clrMapOvr>
+  <p:timing>
+    <p:tnLst>
+      <p:par>
+        <p:cTn id="1" dur="indefinite" restart="never" nodeType="tmRoot"/>
+      </p:par>
+    </p:tnLst>
+  </p:timing>
+</p:sld>
+</file>
+
+<file path=ppt/slides/slide28.xml><?xml version="1.0" encoding="utf-8"?>
+<p:sld xmlns:a="http://schemas.openxmlformats.org/drawingml/2006/main" xmlns:r="http://schemas.openxmlformats.org/officeDocument/2006/relationships" xmlns:p="http://schemas.openxmlformats.org/presentationml/2006/main">
+  <p:cSld>
+    <p:spTree>
+      <p:nvGrpSpPr>
+        <p:cNvPr id="1" name=""/>
+        <p:cNvGrpSpPr/>
+        <p:nvPr/>
+      </p:nvGrpSpPr>
+      <p:grpSpPr>
+        <a:xfrm>
+          <a:off x="0" y="0"/>
+          <a:ext cx="0" cy="0"/>
+          <a:chOff x="0" y="0"/>
+          <a:chExt cx="0" cy="0"/>
+        </a:xfrm>
+      </p:grpSpPr>
+      <p:pic>
+        <p:nvPicPr>
+          <p:cNvPr id="4" name="Imagem 3"/>
+          <p:cNvPicPr>
+            <a:picLocks noChangeAspect="1"/>
+          </p:cNvPicPr>
+          <p:nvPr/>
+        </p:nvPicPr>
+        <p:blipFill>
+          <a:blip r:embed="rId2" cstate="print">
+            <a:extLst>
+              <a:ext uri="{28A0092B-C50C-407E-A947-70E740481C1C}">
+                <a14:useLocalDpi xmlns:a14="http://schemas.microsoft.com/office/drawing/2010/main" val="0"/>
+              </a:ext>
+            </a:extLst>
+          </a:blip>
+          <a:stretch>
+            <a:fillRect/>
+          </a:stretch>
+        </p:blipFill>
+        <p:spPr>
+          <a:xfrm>
+            <a:off x="107504" y="5510965"/>
+            <a:ext cx="1197825" cy="1216838"/>
+          </a:xfrm>
+          <a:prstGeom prst="rect">
+            <a:avLst/>
+          </a:prstGeom>
+        </p:spPr>
+      </p:pic>
+      <p:sp>
+        <p:nvSpPr>
           <p:cNvPr id="5" name="Título 1"/>
           <p:cNvSpPr>
             <a:spLocks noGrp="1"/>
@@ -5177,7 +6825,7 @@
         </p:spPr>
         <p:txBody>
           <a:bodyPr>
-            <a:normAutofit lnSpcReduction="10000"/>
+            <a:normAutofit fontScale="85000" lnSpcReduction="10000"/>
           </a:bodyPr>
           <a:lstStyle/>
           <a:p>
@@ -5234,8 +6882,36 @@
             </a:r>
             <a:r>
               <a:rPr lang="pt-BR" sz="2000" dirty="0" smtClean="0"/>
-              <a:t>para mensageria – interação com outros sistemas</a:t>
-            </a:r>
+              <a:t>para mensageria – interação com outros </a:t>
+            </a:r>
+            <a:r>
+              <a:rPr lang="pt-BR" sz="2000" dirty="0" smtClean="0"/>
+              <a:t>sistemas</a:t>
+            </a:r>
+          </a:p>
+          <a:p>
+            <a:pPr algn="just"/>
+            <a:r>
+              <a:rPr lang="pt-BR" sz="2000" dirty="0" smtClean="0"/>
+              <a:t>Adoção de Sonar para o controle de qualidade e o </a:t>
+            </a:r>
+            <a:r>
+              <a:rPr lang="pt-BR" sz="2000" dirty="0" err="1" smtClean="0"/>
+              <a:t>Jenkins</a:t>
+            </a:r>
+            <a:r>
+              <a:rPr lang="pt-BR" sz="2000" dirty="0" smtClean="0"/>
+              <a:t> para o </a:t>
+            </a:r>
+            <a:r>
+              <a:rPr lang="pt-BR" sz="2000" i="1" dirty="0" err="1" smtClean="0"/>
+              <a:t>deploy</a:t>
+            </a:r>
+            <a:r>
+              <a:rPr lang="pt-BR" sz="2000" dirty="0" smtClean="0"/>
+              <a:t> da aplicação</a:t>
+            </a:r>
+            <a:endParaRPr lang="pt-BR" sz="2000" dirty="0" smtClean="0"/>
           </a:p>
           <a:p>
             <a:pPr algn="just"/>
@@ -5247,6 +6923,108 @@
     <p:extLst>
       <p:ext uri="{BB962C8B-B14F-4D97-AF65-F5344CB8AC3E}">
         <p14:creationId xmlns:p14="http://schemas.microsoft.com/office/powerpoint/2010/main" val="2958693604"/>
+      </p:ext>
+    </p:extLst>
+  </p:cSld>
+  <p:clrMapOvr>
+    <a:masterClrMapping/>
+  </p:clrMapOvr>
+  <p:timing>
+    <p:tnLst>
+      <p:par>
+        <p:cTn id="1" dur="indefinite" restart="never" nodeType="tmRoot"/>
+      </p:par>
+    </p:tnLst>
+  </p:timing>
+</p:sld>
+</file>
+
+<file path=ppt/slides/slide29.xml><?xml version="1.0" encoding="utf-8"?>
+<p:sld xmlns:a="http://schemas.openxmlformats.org/drawingml/2006/main" xmlns:r="http://schemas.openxmlformats.org/officeDocument/2006/relationships" xmlns:p="http://schemas.openxmlformats.org/presentationml/2006/main">
+  <p:cSld>
+    <p:spTree>
+      <p:nvGrpSpPr>
+        <p:cNvPr id="1" name=""/>
+        <p:cNvGrpSpPr/>
+        <p:nvPr/>
+      </p:nvGrpSpPr>
+      <p:grpSpPr>
+        <a:xfrm>
+          <a:off x="0" y="0"/>
+          <a:ext cx="0" cy="0"/>
+          <a:chOff x="0" y="0"/>
+          <a:chExt cx="0" cy="0"/>
+        </a:xfrm>
+      </p:grpSpPr>
+      <p:pic>
+        <p:nvPicPr>
+          <p:cNvPr id="4" name="Imagem 3"/>
+          <p:cNvPicPr>
+            <a:picLocks noChangeAspect="1"/>
+          </p:cNvPicPr>
+          <p:nvPr/>
+        </p:nvPicPr>
+        <p:blipFill>
+          <a:blip r:embed="rId2" cstate="print">
+            <a:extLst>
+              <a:ext uri="{28A0092B-C50C-407E-A947-70E740481C1C}">
+                <a14:useLocalDpi xmlns:a14="http://schemas.microsoft.com/office/drawing/2010/main" val="0"/>
+              </a:ext>
+            </a:extLst>
+          </a:blip>
+          <a:stretch>
+            <a:fillRect/>
+          </a:stretch>
+        </p:blipFill>
+        <p:spPr>
+          <a:xfrm>
+            <a:off x="107504" y="5510965"/>
+            <a:ext cx="1197825" cy="1216838"/>
+          </a:xfrm>
+          <a:prstGeom prst="rect">
+            <a:avLst/>
+          </a:prstGeom>
+        </p:spPr>
+      </p:pic>
+      <p:sp>
+        <p:nvSpPr>
+          <p:cNvPr id="5" name="Título 1"/>
+          <p:cNvSpPr>
+            <a:spLocks noGrp="1"/>
+          </p:cNvSpPr>
+          <p:nvPr>
+            <p:ph type="title"/>
+          </p:nvPr>
+        </p:nvSpPr>
+        <p:spPr>
+          <a:xfrm>
+            <a:off x="3275856" y="2708920"/>
+            <a:ext cx="2952328" cy="688930"/>
+          </a:xfrm>
+        </p:spPr>
+        <p:txBody>
+          <a:bodyPr>
+            <a:noAutofit/>
+          </a:bodyPr>
+          <a:lstStyle/>
+          <a:p>
+            <a:pPr algn="l"/>
+            <a:r>
+              <a:rPr lang="pt-BR" sz="3000" b="1" dirty="0" smtClean="0">
+                <a:latin typeface="Arial Black" panose="020B0A04020102020204" pitchFamily="34" charset="0"/>
+              </a:rPr>
+              <a:t>Obrigado!</a:t>
+            </a:r>
+            <a:endParaRPr lang="pt-BR" sz="3000" b="1" dirty="0">
+              <a:latin typeface="Arial Black" panose="020B0A04020102020204" pitchFamily="34" charset="0"/>
+            </a:endParaRPr>
+          </a:p>
+        </p:txBody>
+      </p:sp>
+    </p:spTree>
+    <p:extLst>
+      <p:ext uri="{BB962C8B-B14F-4D97-AF65-F5344CB8AC3E}">
+        <p14:creationId xmlns:p14="http://schemas.microsoft.com/office/powerpoint/2010/main" val="2717066860"/>
       </p:ext>
     </p:extLst>
   </p:cSld>
@@ -5312,6 +7090,132 @@
       </p:pic>
       <p:sp>
         <p:nvSpPr>
+          <p:cNvPr id="6" name="CaixaDeTexto 5"/>
+          <p:cNvSpPr txBox="1"/>
+          <p:nvPr/>
+        </p:nvSpPr>
+        <p:spPr>
+          <a:xfrm>
+            <a:off x="535646" y="1237610"/>
+            <a:ext cx="8068801" cy="400110"/>
+          </a:xfrm>
+          <a:prstGeom prst="rect">
+            <a:avLst/>
+          </a:prstGeom>
+          <a:noFill/>
+        </p:spPr>
+        <p:txBody>
+          <a:bodyPr wrap="square" rtlCol="0">
+            <a:spAutoFit/>
+          </a:bodyPr>
+          <a:lstStyle/>
+          <a:p>
+            <a:pPr algn="just"/>
+            <a:r>
+              <a:rPr lang="pt-BR" sz="2000" dirty="0" smtClean="0">
+                <a:latin typeface="Arial Black" panose="020B0A04020102020204" pitchFamily="34" charset="0"/>
+              </a:rPr>
+              <a:t>1. Módulo de autenticação</a:t>
+            </a:r>
+          </a:p>
+        </p:txBody>
+      </p:sp>
+      <p:sp>
+        <p:nvSpPr>
+          <p:cNvPr id="7" name="CaixaDeTexto 6"/>
+          <p:cNvSpPr txBox="1"/>
+          <p:nvPr/>
+        </p:nvSpPr>
+        <p:spPr>
+          <a:xfrm>
+            <a:off x="518343" y="1794590"/>
+            <a:ext cx="8068801" cy="2246769"/>
+          </a:xfrm>
+          <a:prstGeom prst="rect">
+            <a:avLst/>
+          </a:prstGeom>
+          <a:noFill/>
+        </p:spPr>
+        <p:txBody>
+          <a:bodyPr wrap="square" rtlCol="0">
+            <a:spAutoFit/>
+          </a:bodyPr>
+          <a:lstStyle/>
+          <a:p>
+            <a:pPr marL="342900" indent="-342900" algn="just">
+              <a:buFont typeface="Arial" panose="020B0604020202020204" pitchFamily="34" charset="0"/>
+              <a:buChar char="•"/>
+            </a:pPr>
+            <a:r>
+              <a:rPr lang="pt-BR" sz="2000" dirty="0" smtClean="0">
+                <a:latin typeface="Arial" panose="020B0604020202020204" pitchFamily="34" charset="0"/>
+                <a:cs typeface="Arial" panose="020B0604020202020204" pitchFamily="34" charset="0"/>
+              </a:rPr>
+              <a:t>O sistema deverá possuir um método seguro de autenticação e autorização de forma a proteger contra ataques e outras formas de intrusão</a:t>
+            </a:r>
+            <a:endParaRPr lang="pt-BR" sz="2000" dirty="0">
+              <a:latin typeface="Arial" panose="020B0604020202020204" pitchFamily="34" charset="0"/>
+              <a:cs typeface="Arial" panose="020B0604020202020204" pitchFamily="34" charset="0"/>
+            </a:endParaRPr>
+          </a:p>
+          <a:p>
+            <a:pPr marL="342900" indent="-342900" algn="just">
+              <a:buFont typeface="Arial" panose="020B0604020202020204" pitchFamily="34" charset="0"/>
+              <a:buChar char="•"/>
+            </a:pPr>
+            <a:r>
+              <a:rPr lang="pt-BR" sz="2000" dirty="0" smtClean="0">
+                <a:latin typeface="Arial" panose="020B0604020202020204" pitchFamily="34" charset="0"/>
+                <a:cs typeface="Arial" panose="020B0604020202020204" pitchFamily="34" charset="0"/>
+              </a:rPr>
+              <a:t>O sistema deverá utilizar um mecanismo de autorização que permita integração com outras formas de autorização</a:t>
+            </a:r>
+          </a:p>
+          <a:p>
+            <a:pPr marL="342900" indent="-342900" algn="just">
+              <a:buFont typeface="Arial" panose="020B0604020202020204" pitchFamily="34" charset="0"/>
+              <a:buChar char="•"/>
+            </a:pPr>
+            <a:r>
+              <a:rPr lang="pt-BR" sz="2000" dirty="0" smtClean="0">
+                <a:latin typeface="Arial" panose="020B0604020202020204" pitchFamily="34" charset="0"/>
+                <a:cs typeface="Arial" panose="020B0604020202020204" pitchFamily="34" charset="0"/>
+              </a:rPr>
+              <a:t>A tecnologia escolhida foi o </a:t>
+            </a:r>
+            <a:r>
+              <a:rPr lang="pt-BR" sz="2000" i="1" dirty="0" smtClean="0">
+                <a:latin typeface="Arial" panose="020B0604020202020204" pitchFamily="34" charset="0"/>
+                <a:cs typeface="Arial" panose="020B0604020202020204" pitchFamily="34" charset="0"/>
+              </a:rPr>
+              <a:t>Spring Security</a:t>
+            </a:r>
+            <a:r>
+              <a:rPr lang="pt-BR" sz="2000" dirty="0" smtClean="0">
+                <a:latin typeface="Arial" panose="020B0604020202020204" pitchFamily="34" charset="0"/>
+                <a:cs typeface="Arial" panose="020B0604020202020204" pitchFamily="34" charset="0"/>
+              </a:rPr>
+              <a:t>, vamos utilizar uma implementação do </a:t>
+            </a:r>
+            <a:r>
+              <a:rPr lang="pt-BR" sz="2000" dirty="0" err="1" smtClean="0">
+                <a:latin typeface="Arial" panose="020B0604020202020204" pitchFamily="34" charset="0"/>
+                <a:cs typeface="Arial" panose="020B0604020202020204" pitchFamily="34" charset="0"/>
+              </a:rPr>
+              <a:t>Oauth</a:t>
+            </a:r>
+            <a:r>
+              <a:rPr lang="pt-BR" sz="2000" dirty="0" smtClean="0">
+                <a:latin typeface="Arial" panose="020B0604020202020204" pitchFamily="34" charset="0"/>
+                <a:cs typeface="Arial" panose="020B0604020202020204" pitchFamily="34" charset="0"/>
+              </a:rPr>
+              <a:t> 2.0</a:t>
+            </a:r>
+          </a:p>
+        </p:txBody>
+      </p:sp>
+      <p:sp>
+        <p:nvSpPr>
           <p:cNvPr id="5" name="Título 1"/>
           <p:cNvSpPr txBox="1">
             <a:spLocks/>
@@ -5362,75 +7266,10 @@
           </a:p>
         </p:txBody>
       </p:sp>
-      <p:sp>
-        <p:nvSpPr>
-          <p:cNvPr id="6" name="CaixaDeTexto 5"/>
-          <p:cNvSpPr txBox="1"/>
-          <p:nvPr/>
-        </p:nvSpPr>
-        <p:spPr>
-          <a:xfrm>
-            <a:off x="535646" y="1237610"/>
-            <a:ext cx="8068801" cy="400110"/>
-          </a:xfrm>
-          <a:prstGeom prst="rect">
-            <a:avLst/>
-          </a:prstGeom>
-          <a:noFill/>
-        </p:spPr>
-        <p:txBody>
-          <a:bodyPr wrap="square" rtlCol="0">
-            <a:spAutoFit/>
-          </a:bodyPr>
-          <a:lstStyle/>
-          <a:p>
-            <a:pPr algn="just"/>
-            <a:r>
-              <a:rPr lang="pt-BR" sz="2000" dirty="0" smtClean="0">
-                <a:latin typeface="Arial Black" panose="020B0A04020102020204" pitchFamily="34" charset="0"/>
-              </a:rPr>
-              <a:t>1. Módulo de autenticação</a:t>
-            </a:r>
-          </a:p>
-        </p:txBody>
-      </p:sp>
-      <p:pic>
-        <p:nvPicPr>
-          <p:cNvPr id="7" name="Imagem 6"/>
-          <p:cNvPicPr/>
-          <p:nvPr/>
-        </p:nvPicPr>
-        <p:blipFill>
-          <a:blip r:embed="rId3">
-            <a:extLst>
-              <a:ext uri="{28A0092B-C50C-407E-A947-70E740481C1C}">
-                <a14:useLocalDpi xmlns:a14="http://schemas.microsoft.com/office/drawing/2010/main" val="0"/>
-              </a:ext>
-            </a:extLst>
-          </a:blip>
-          <a:srcRect/>
-          <a:stretch>
-            <a:fillRect/>
-          </a:stretch>
-        </p:blipFill>
-        <p:spPr bwMode="auto">
-          <a:xfrm>
-            <a:off x="706416" y="1576164"/>
-            <a:ext cx="7961250" cy="3941068"/>
-          </a:xfrm>
-          <a:prstGeom prst="rect">
-            <a:avLst/>
-          </a:prstGeom>
-          <a:noFill/>
-          <a:ln>
-            <a:noFill/>
-          </a:ln>
-        </p:spPr>
-      </p:pic>
     </p:spTree>
     <p:extLst>
       <p:ext uri="{BB962C8B-B14F-4D97-AF65-F5344CB8AC3E}">
-        <p14:creationId xmlns:p14="http://schemas.microsoft.com/office/powerpoint/2010/main" val="3164084410"/>
+        <p14:creationId xmlns:p14="http://schemas.microsoft.com/office/powerpoint/2010/main" val="2681372623"/>
       </p:ext>
     </p:extLst>
   </p:cSld>
@@ -5526,104 +7365,43 @@
           </a:p>
         </p:txBody>
       </p:sp>
-      <p:sp>
-        <p:nvSpPr>
-          <p:cNvPr id="7" name="CaixaDeTexto 6"/>
-          <p:cNvSpPr txBox="1"/>
+      <p:pic>
+        <p:nvPicPr>
+          <p:cNvPr id="7" name="Imagem 6"/>
+          <p:cNvPicPr/>
           <p:nvPr/>
-        </p:nvSpPr>
-        <p:spPr>
-          <a:xfrm>
-            <a:off x="518343" y="1794590"/>
-            <a:ext cx="8068801" cy="2246769"/>
+        </p:nvPicPr>
+        <p:blipFill>
+          <a:blip r:embed="rId3">
+            <a:extLst>
+              <a:ext uri="{28A0092B-C50C-407E-A947-70E740481C1C}">
+                <a14:useLocalDpi xmlns:a14="http://schemas.microsoft.com/office/drawing/2010/main" val="0"/>
+              </a:ext>
+            </a:extLst>
+          </a:blip>
+          <a:srcRect/>
+          <a:stretch>
+            <a:fillRect/>
+          </a:stretch>
+        </p:blipFill>
+        <p:spPr bwMode="auto">
+          <a:xfrm>
+            <a:off x="706416" y="1576164"/>
+            <a:ext cx="7961250" cy="3941068"/>
           </a:xfrm>
           <a:prstGeom prst="rect">
             <a:avLst/>
           </a:prstGeom>
           <a:noFill/>
-        </p:spPr>
-        <p:txBody>
-          <a:bodyPr wrap="square" rtlCol="0">
-            <a:spAutoFit/>
-          </a:bodyPr>
-          <a:lstStyle/>
-          <a:p>
-            <a:pPr marL="342900" indent="-342900" algn="just">
-              <a:buFont typeface="Arial" panose="020B0604020202020204" pitchFamily="34" charset="0"/>
-              <a:buChar char="•"/>
-            </a:pPr>
-            <a:r>
-              <a:rPr lang="pt-BR" sz="2000" dirty="0" smtClean="0">
-                <a:latin typeface="Arial" panose="020B0604020202020204" pitchFamily="34" charset="0"/>
-                <a:cs typeface="Arial" panose="020B0604020202020204" pitchFamily="34" charset="0"/>
-              </a:rPr>
-              <a:t>O sistema deverá possuir um método seguro de autenticação e autorização de forma a proteger contra ataques e outras formas de intrusão</a:t>
-            </a:r>
-            <a:endParaRPr lang="pt-BR" sz="2000" dirty="0">
-              <a:latin typeface="Arial" panose="020B0604020202020204" pitchFamily="34" charset="0"/>
-              <a:cs typeface="Arial" panose="020B0604020202020204" pitchFamily="34" charset="0"/>
-            </a:endParaRPr>
-          </a:p>
-          <a:p>
-            <a:pPr marL="342900" indent="-342900" algn="just">
-              <a:buFont typeface="Arial" panose="020B0604020202020204" pitchFamily="34" charset="0"/>
-              <a:buChar char="•"/>
-            </a:pPr>
-            <a:r>
-              <a:rPr lang="pt-BR" sz="2000" dirty="0" smtClean="0">
-                <a:latin typeface="Arial" panose="020B0604020202020204" pitchFamily="34" charset="0"/>
-                <a:cs typeface="Arial" panose="020B0604020202020204" pitchFamily="34" charset="0"/>
-              </a:rPr>
-              <a:t>O sistema deverá utilizar um mecanismo de autorização que permita integração com outras formas de autorização</a:t>
-            </a:r>
-          </a:p>
-          <a:p>
-            <a:pPr marL="342900" indent="-342900" algn="just">
-              <a:buFont typeface="Arial" panose="020B0604020202020204" pitchFamily="34" charset="0"/>
-              <a:buChar char="•"/>
-            </a:pPr>
-            <a:r>
-              <a:rPr lang="pt-BR" sz="2000" dirty="0" smtClean="0">
-                <a:latin typeface="Arial" panose="020B0604020202020204" pitchFamily="34" charset="0"/>
-                <a:cs typeface="Arial" panose="020B0604020202020204" pitchFamily="34" charset="0"/>
-              </a:rPr>
-              <a:t>A tecnologia escolhida foi o </a:t>
-            </a:r>
-            <a:r>
-              <a:rPr lang="pt-BR" sz="2000" i="1" dirty="0" smtClean="0">
-                <a:latin typeface="Arial" panose="020B0604020202020204" pitchFamily="34" charset="0"/>
-                <a:cs typeface="Arial" panose="020B0604020202020204" pitchFamily="34" charset="0"/>
-              </a:rPr>
-              <a:t>Spring Security</a:t>
-            </a:r>
-            <a:r>
-              <a:rPr lang="pt-BR" sz="2000" dirty="0" smtClean="0">
-                <a:latin typeface="Arial" panose="020B0604020202020204" pitchFamily="34" charset="0"/>
-                <a:cs typeface="Arial" panose="020B0604020202020204" pitchFamily="34" charset="0"/>
-              </a:rPr>
-              <a:t>, vamos utilizar uma implementação do </a:t>
-            </a:r>
-            <a:r>
-              <a:rPr lang="pt-BR" sz="2000" dirty="0" err="1" smtClean="0">
-                <a:latin typeface="Arial" panose="020B0604020202020204" pitchFamily="34" charset="0"/>
-                <a:cs typeface="Arial" panose="020B0604020202020204" pitchFamily="34" charset="0"/>
-              </a:rPr>
-              <a:t>Oauth</a:t>
-            </a:r>
-            <a:r>
-              <a:rPr lang="pt-BR" sz="2000" dirty="0" smtClean="0">
-                <a:latin typeface="Arial" panose="020B0604020202020204" pitchFamily="34" charset="0"/>
-                <a:cs typeface="Arial" panose="020B0604020202020204" pitchFamily="34" charset="0"/>
-              </a:rPr>
-              <a:t> 2.0</a:t>
-            </a:r>
-          </a:p>
-        </p:txBody>
-      </p:sp>
+          <a:ln>
+            <a:noFill/>
+          </a:ln>
+        </p:spPr>
+      </p:pic>
     </p:spTree>
     <p:extLst>
       <p:ext uri="{BB962C8B-B14F-4D97-AF65-F5344CB8AC3E}">
-        <p14:creationId xmlns:p14="http://schemas.microsoft.com/office/powerpoint/2010/main" val="2681372623"/>
+        <p14:creationId xmlns:p14="http://schemas.microsoft.com/office/powerpoint/2010/main" val="3164084410"/>
       </p:ext>
     </p:extLst>
   </p:cSld>

</xml_diff>